<commit_message>
Inelastic workflow + sim and fitting
</commit_message>
<xml_diff>
--- a/Presentations/ICNS_2013/VatesPresentation.pptx
+++ b/Presentations/ICNS_2013/VatesPresentation.pptx
@@ -226,7 +226,7 @@
             <a:fld id="{E78E1D5F-7523-4815-A670-60864F601D30}" type="datetimeFigureOut">
               <a:rPr lang="en-GB" smtClean="0"/>
               <a:pPr/>
-              <a:t>01/07/2013</a:t>
+              <a:t>02/07/2013</a:t>
             </a:fld>
             <a:endParaRPr lang="en-GB"/>
           </a:p>
@@ -393,7 +393,7 @@
             <a:fld id="{376B4F07-E738-4DFD-883D-BE3839CD703B}" type="datetimeFigureOut">
               <a:rPr lang="en-GB" smtClean="0"/>
               <a:pPr/>
-              <a:t>01/07/2013</a:t>
+              <a:t>02/07/2013</a:t>
             </a:fld>
             <a:endParaRPr lang="en-GB"/>
           </a:p>
@@ -3153,14 +3153,14 @@
           <p:nvPr>
             <p:extLst>
               <p:ext uri="{D42A27DB-BD31-4B8C-83A1-F6EECF244321}">
-                <p14:modId xmlns:p14="http://schemas.microsoft.com/office/powerpoint/2010/main" val="558208901"/>
+                <p14:modId xmlns:p14="http://schemas.microsoft.com/office/powerpoint/2010/main" val="1380353687"/>
               </p:ext>
             </p:extLst>
           </p:nvPr>
         </p:nvGraphicFramePr>
         <p:xfrm>
           <a:off x="1066800" y="8610599"/>
-          <a:ext cx="28194000" cy="39441156"/>
+          <a:ext cx="28194000" cy="42214840"/>
         </p:xfrm>
         <a:graphic>
           <a:graphicData uri="http://schemas.openxmlformats.org/drawingml/2006/table">
@@ -3171,7 +3171,7 @@
                 <a:gridCol w="9398000"/>
                 <a:gridCol w="9398000"/>
               </a:tblGrid>
-              <a:tr h="30505249">
+              <a:tr h="33457578">
                 <a:tc>
                   <a:txBody>
                     <a:bodyPr/>
@@ -3246,10 +3246,10 @@
                           <a:ea typeface="+mn-ea"/>
                           <a:cs typeface="Arial"/>
                         </a:rPr>
-                        <a:t>The </a:t>
-                      </a:r>
-                      <a:r>
-                        <a:rPr lang="en-GB" sz="2400" kern="1200" dirty="0" err="1" smtClean="0">
+                        <a:t>The VATES project (Visualisation and Analysis Toolkit</a:t>
+                      </a:r>
+                      <a:r>
+                        <a:rPr lang="en-GB" sz="2400" kern="1200" baseline="0" dirty="0" smtClean="0">
                           <a:solidFill>
                             <a:schemeClr val="tx1"/>
                           </a:solidFill>
@@ -3258,7 +3258,31 @@
                           <a:ea typeface="+mn-ea"/>
                           <a:cs typeface="Arial"/>
                         </a:rPr>
-                        <a:t>Vates</a:t>
+                        <a:t> </a:t>
+                      </a:r>
+                      <a:r>
+                        <a:rPr lang="en-GB" sz="2400" kern="1200" baseline="0" dirty="0" err="1" smtClean="0">
+                          <a:solidFill>
+                            <a:schemeClr val="tx1"/>
+                          </a:solidFill>
+                          <a:effectLst/>
+                          <a:latin typeface="Arial"/>
+                          <a:ea typeface="+mn-ea"/>
+                          <a:cs typeface="Arial"/>
+                        </a:rPr>
+                        <a:t>ExensionS</a:t>
+                      </a:r>
+                      <a:r>
+                        <a:rPr lang="en-GB" sz="2400" kern="1200" baseline="0" dirty="0" smtClean="0">
+                          <a:solidFill>
+                            <a:schemeClr val="tx1"/>
+                          </a:solidFill>
+                          <a:effectLst/>
+                          <a:latin typeface="Arial"/>
+                          <a:ea typeface="+mn-ea"/>
+                          <a:cs typeface="Arial"/>
+                        </a:rPr>
+                        <a:t>)</a:t>
                       </a:r>
                       <a:r>
                         <a:rPr lang="en-GB" sz="2400" kern="1200" dirty="0" smtClean="0">
@@ -3270,19 +3294,7 @@
                           <a:ea typeface="+mn-ea"/>
                           <a:cs typeface="Arial"/>
                         </a:rPr>
-                        <a:t> project delivers advanced tools for visualisation and analysis of large neutron scattering datasets. The project is an international collaboration between ISIS at RAL and the SNS at Oakridge</a:t>
-                      </a:r>
-                      <a:r>
-                        <a:rPr lang="en-GB" sz="2400" kern="1200" dirty="0" smtClean="0">
-                          <a:solidFill>
-                            <a:schemeClr val="tx1"/>
-                          </a:solidFill>
-                          <a:effectLst/>
-                          <a:latin typeface="Arial"/>
-                          <a:ea typeface="+mn-ea"/>
-                          <a:cs typeface="Arial"/>
-                        </a:rPr>
-                        <a:t>.</a:t>
+                        <a:t> delivers advanced tools for visualisation and analysis of large neutron scattering datasets. The project is an international collaboration between ISIS at RAL and the SNS at Oakridge.</a:t>
                       </a:r>
                       <a:endParaRPr kumimoji="0" lang="en-GB" sz="2400" b="0" i="0" u="none" strike="noStrike" kern="1200" cap="none" normalizeH="0" baseline="0" dirty="0" smtClean="0">
                         <a:ln>
@@ -3328,579 +3340,328 @@
                         </a:rPr>
                         <a:t>Frameworks</a:t>
                       </a:r>
-                      <a:endParaRPr kumimoji="0" lang="en-US" sz="5000" b="0" i="0" u="none" strike="noStrike" kern="0" cap="none" normalizeH="0" baseline="0" dirty="0" smtClean="0">
+                    </a:p>
+                    <a:p>
+                      <a:r>
+                        <a:rPr lang="en-GB" sz="2400" kern="1200" dirty="0" smtClean="0">
+                          <a:solidFill>
+                            <a:schemeClr val="tx1"/>
+                          </a:solidFill>
+                          <a:effectLst/>
+                          <a:latin typeface="Arial"/>
+                          <a:ea typeface="+mn-ea"/>
+                          <a:cs typeface="Arial"/>
+                        </a:rPr>
+                        <a:t>The VATES project has been developed in parallel to the </a:t>
+                      </a:r>
+                      <a:r>
+                        <a:rPr lang="en-GB" sz="2400" kern="1200" dirty="0" err="1" smtClean="0">
+                          <a:solidFill>
+                            <a:schemeClr val="tx1"/>
+                          </a:solidFill>
+                          <a:effectLst/>
+                          <a:latin typeface="Arial"/>
+                          <a:ea typeface="+mn-ea"/>
+                          <a:cs typeface="Arial"/>
+                        </a:rPr>
+                        <a:t>Mantid</a:t>
+                      </a:r>
+                      <a:r>
+                        <a:rPr lang="en-GB" sz="2400" kern="1200" dirty="0" smtClean="0">
+                          <a:solidFill>
+                            <a:schemeClr val="tx1"/>
+                          </a:solidFill>
+                          <a:effectLst/>
+                          <a:latin typeface="Arial"/>
+                          <a:ea typeface="+mn-ea"/>
+                          <a:cs typeface="Arial"/>
+                        </a:rPr>
+                        <a:t> Framework. </a:t>
+                      </a:r>
+                      <a:r>
+                        <a:rPr lang="en-GB" sz="2400" kern="1200" dirty="0" err="1" smtClean="0">
+                          <a:solidFill>
+                            <a:schemeClr val="tx1"/>
+                          </a:solidFill>
+                          <a:effectLst/>
+                          <a:latin typeface="Arial"/>
+                          <a:ea typeface="+mn-ea"/>
+                          <a:cs typeface="Arial"/>
+                        </a:rPr>
+                        <a:t>Mantid</a:t>
+                      </a:r>
+                      <a:r>
+                        <a:rPr lang="en-GB" sz="2400" kern="1200" dirty="0" smtClean="0">
+                          <a:solidFill>
+                            <a:schemeClr val="tx1"/>
+                          </a:solidFill>
+                          <a:effectLst/>
+                          <a:latin typeface="Arial"/>
+                          <a:ea typeface="+mn-ea"/>
+                          <a:cs typeface="Arial"/>
+                        </a:rPr>
+                        <a:t> is an extensible framework for neutron and </a:t>
+                      </a:r>
+                      <a:r>
+                        <a:rPr lang="en-GB" sz="2400" kern="1200" dirty="0" err="1" smtClean="0">
+                          <a:solidFill>
+                            <a:schemeClr val="tx1"/>
+                          </a:solidFill>
+                          <a:effectLst/>
+                          <a:latin typeface="Arial"/>
+                          <a:ea typeface="+mn-ea"/>
+                          <a:cs typeface="Arial"/>
+                        </a:rPr>
+                        <a:t>muon</a:t>
+                      </a:r>
+                      <a:r>
+                        <a:rPr lang="en-GB" sz="2400" kern="1200" dirty="0" smtClean="0">
+                          <a:solidFill>
+                            <a:schemeClr val="tx1"/>
+                          </a:solidFill>
+                          <a:effectLst/>
+                          <a:latin typeface="Arial"/>
+                          <a:ea typeface="+mn-ea"/>
+                          <a:cs typeface="Arial"/>
+                        </a:rPr>
+                        <a:t> data reduction and analysis</a:t>
+                      </a:r>
+                      <a:r>
+                        <a:rPr lang="en-GB" sz="2400" kern="1200" baseline="30000" dirty="0" smtClean="0">
+                          <a:solidFill>
+                            <a:schemeClr val="tx1"/>
+                          </a:solidFill>
+                          <a:effectLst/>
+                          <a:latin typeface="Arial"/>
+                          <a:ea typeface="+mn-ea"/>
+                          <a:cs typeface="Arial"/>
+                        </a:rPr>
+                        <a:t>1</a:t>
+                      </a:r>
+                      <a:r>
+                        <a:rPr lang="en-GB" sz="2400" kern="1200" dirty="0" smtClean="0">
+                          <a:solidFill>
+                            <a:schemeClr val="tx1"/>
+                          </a:solidFill>
+                          <a:effectLst/>
+                          <a:latin typeface="Arial"/>
+                          <a:ea typeface="+mn-ea"/>
+                          <a:cs typeface="Arial"/>
+                        </a:rPr>
+                        <a:t>. The </a:t>
+                      </a:r>
+                      <a:r>
+                        <a:rPr lang="en-GB" sz="2400" kern="1200" dirty="0" err="1" smtClean="0">
+                          <a:solidFill>
+                            <a:schemeClr val="tx1"/>
+                          </a:solidFill>
+                          <a:effectLst/>
+                          <a:latin typeface="Arial"/>
+                          <a:ea typeface="+mn-ea"/>
+                          <a:cs typeface="Arial"/>
+                        </a:rPr>
+                        <a:t>mantid</a:t>
+                      </a:r>
+                      <a:r>
+                        <a:rPr lang="en-GB" sz="2400" kern="1200" dirty="0" smtClean="0">
+                          <a:solidFill>
+                            <a:schemeClr val="tx1"/>
+                          </a:solidFill>
+                          <a:effectLst/>
+                          <a:latin typeface="Arial"/>
+                          <a:ea typeface="+mn-ea"/>
+                          <a:cs typeface="Arial"/>
+                        </a:rPr>
+                        <a:t> framework is mature and deployed on approximately [40] instruments at [3] facilities.</a:t>
+                      </a:r>
+                    </a:p>
+                    <a:p>
+                      <a:r>
+                        <a:rPr lang="en-GB" sz="2400" kern="1200" dirty="0" smtClean="0">
+                          <a:solidFill>
+                            <a:schemeClr val="tx1"/>
+                          </a:solidFill>
+                          <a:effectLst/>
+                          <a:latin typeface="Arial"/>
+                          <a:ea typeface="+mn-ea"/>
+                          <a:cs typeface="Arial"/>
+                        </a:rPr>
+                        <a:t> </a:t>
+                      </a:r>
+                    </a:p>
+                    <a:p>
+                      <a:r>
+                        <a:rPr lang="en-GB" sz="2400" kern="1200" dirty="0" smtClean="0">
+                          <a:solidFill>
+                            <a:schemeClr val="tx1"/>
+                          </a:solidFill>
+                          <a:effectLst/>
+                          <a:latin typeface="Arial"/>
+                          <a:ea typeface="+mn-ea"/>
+                          <a:cs typeface="Arial"/>
+                        </a:rPr>
+                        <a:t>For n-dimensional visualisation, the VATES project uses ParaView</a:t>
+                      </a:r>
+                      <a:r>
+                        <a:rPr lang="en-GB" sz="2400" kern="1200" baseline="30000" dirty="0" smtClean="0">
+                          <a:solidFill>
+                            <a:schemeClr val="tx1"/>
+                          </a:solidFill>
+                          <a:effectLst/>
+                          <a:latin typeface="Arial"/>
+                          <a:ea typeface="+mn-ea"/>
+                          <a:cs typeface="Arial"/>
+                        </a:rPr>
+                        <a:t>2</a:t>
+                      </a:r>
+                      <a:r>
+                        <a:rPr lang="en-GB" sz="2400" kern="1200" dirty="0" smtClean="0">
+                          <a:solidFill>
+                            <a:schemeClr val="tx1"/>
+                          </a:solidFill>
+                          <a:effectLst/>
+                          <a:latin typeface="Arial"/>
+                          <a:ea typeface="+mn-ea"/>
+                          <a:cs typeface="Arial"/>
+                        </a:rPr>
+                        <a:t>, an advanced VTK based visualisation engine. In brief, the VATES project binds </a:t>
+                      </a:r>
+                      <a:r>
+                        <a:rPr lang="en-GB" sz="2400" kern="1200" dirty="0" err="1" smtClean="0">
+                          <a:solidFill>
+                            <a:schemeClr val="tx1"/>
+                          </a:solidFill>
+                          <a:effectLst/>
+                          <a:latin typeface="Arial"/>
+                          <a:ea typeface="+mn-ea"/>
+                          <a:cs typeface="Arial"/>
+                        </a:rPr>
+                        <a:t>Mantid</a:t>
+                      </a:r>
+                      <a:r>
+                        <a:rPr lang="en-GB" sz="2400" kern="1200" dirty="0" smtClean="0">
+                          <a:solidFill>
+                            <a:schemeClr val="tx1"/>
+                          </a:solidFill>
+                          <a:effectLst/>
+                          <a:latin typeface="Arial"/>
+                          <a:ea typeface="+mn-ea"/>
+                          <a:cs typeface="Arial"/>
+                        </a:rPr>
+                        <a:t> to </a:t>
+                      </a:r>
+                      <a:r>
+                        <a:rPr lang="en-GB" sz="2400" kern="1200" dirty="0" err="1" smtClean="0">
+                          <a:solidFill>
+                            <a:schemeClr val="tx1"/>
+                          </a:solidFill>
+                          <a:effectLst/>
+                          <a:latin typeface="Arial"/>
+                          <a:ea typeface="+mn-ea"/>
+                          <a:cs typeface="Arial"/>
+                        </a:rPr>
+                        <a:t>ParaView</a:t>
+                      </a:r>
+                      <a:r>
+                        <a:rPr lang="en-GB" sz="2400" kern="1200" dirty="0" smtClean="0">
+                          <a:solidFill>
+                            <a:schemeClr val="tx1"/>
+                          </a:solidFill>
+                          <a:effectLst/>
+                          <a:latin typeface="Arial"/>
+                          <a:ea typeface="+mn-ea"/>
+                          <a:cs typeface="Arial"/>
+                        </a:rPr>
+                        <a:t> via the introduction of multidimensional data structures and algorithms. In addition, we utilise </a:t>
+                      </a:r>
+                      <a:r>
+                        <a:rPr lang="en-GB" sz="2400" kern="1200" dirty="0" err="1" smtClean="0">
+                          <a:solidFill>
+                            <a:schemeClr val="tx1"/>
+                          </a:solidFill>
+                          <a:effectLst/>
+                          <a:latin typeface="Arial"/>
+                          <a:ea typeface="+mn-ea"/>
+                          <a:cs typeface="Arial"/>
+                        </a:rPr>
+                        <a:t>ParaView’s</a:t>
+                      </a:r>
+                      <a:r>
+                        <a:rPr lang="en-GB" sz="2400" kern="1200" dirty="0" smtClean="0">
+                          <a:solidFill>
+                            <a:schemeClr val="tx1"/>
+                          </a:solidFill>
+                          <a:effectLst/>
+                          <a:latin typeface="Arial"/>
+                          <a:ea typeface="+mn-ea"/>
+                          <a:cs typeface="Arial"/>
+                        </a:rPr>
+                        <a:t> plugin mechanism to provide customised tools for neutron scattering. We also deliver two-way interaction between </a:t>
+                      </a:r>
+                      <a:r>
+                        <a:rPr lang="en-GB" sz="2400" kern="1200" dirty="0" err="1" smtClean="0">
+                          <a:solidFill>
+                            <a:schemeClr val="tx1"/>
+                          </a:solidFill>
+                          <a:effectLst/>
+                          <a:latin typeface="Arial"/>
+                          <a:ea typeface="+mn-ea"/>
+                          <a:cs typeface="Arial"/>
+                        </a:rPr>
+                        <a:t>ParaView</a:t>
+                      </a:r>
+                      <a:r>
+                        <a:rPr lang="en-GB" sz="2400" kern="1200" dirty="0" smtClean="0">
+                          <a:solidFill>
+                            <a:schemeClr val="tx1"/>
+                          </a:solidFill>
+                          <a:effectLst/>
+                          <a:latin typeface="Arial"/>
+                          <a:ea typeface="+mn-ea"/>
+                          <a:cs typeface="Arial"/>
+                        </a:rPr>
+                        <a:t> and </a:t>
+                      </a:r>
+                      <a:r>
+                        <a:rPr lang="en-GB" sz="2400" kern="1200" dirty="0" err="1" smtClean="0">
+                          <a:solidFill>
+                            <a:schemeClr val="tx1"/>
+                          </a:solidFill>
+                          <a:effectLst/>
+                          <a:latin typeface="Arial"/>
+                          <a:ea typeface="+mn-ea"/>
+                          <a:cs typeface="Arial"/>
+                        </a:rPr>
+                        <a:t>Mantid</a:t>
+                      </a:r>
+                      <a:r>
+                        <a:rPr lang="en-GB" sz="2400" kern="1200" dirty="0" smtClean="0">
+                          <a:solidFill>
+                            <a:schemeClr val="tx1"/>
+                          </a:solidFill>
+                          <a:effectLst/>
+                          <a:latin typeface="Arial"/>
+                          <a:ea typeface="+mn-ea"/>
+                          <a:cs typeface="Arial"/>
+                        </a:rPr>
+                        <a:t> so that users can visually drive the data reduction and analysis process.</a:t>
+                      </a:r>
+                    </a:p>
+                    <a:p>
+                      <a:endParaRPr kumimoji="0" lang="en-GB" sz="2400" b="0" i="0" u="none" strike="noStrike" kern="1200" cap="none" normalizeH="0" baseline="0" dirty="0" smtClean="0">
                         <a:ln>
                           <a:noFill/>
                         </a:ln>
                         <a:solidFill>
-                          <a:srgbClr val="002D55"/>
-                        </a:solidFill>
-                        <a:effectLst/>
-                        <a:latin typeface="Corisande" pitchFamily="2" charset="0"/>
-                      </a:endParaRPr>
-                    </a:p>
-                    <a:p>
-                      <a:r>
-                        <a:rPr lang="en-GB" sz="2400" kern="1200" dirty="0" smtClean="0">
-                          <a:solidFill>
-                            <a:schemeClr val="tx1"/>
-                          </a:solidFill>
-                          <a:effectLst/>
-                          <a:latin typeface="Arial"/>
-                          <a:ea typeface="+mn-ea"/>
-                          <a:cs typeface="Arial"/>
-                        </a:rPr>
-                        <a:t>The </a:t>
-                      </a:r>
-                      <a:r>
-                        <a:rPr lang="en-GB" sz="2400" kern="1200" dirty="0" err="1" smtClean="0">
-                          <a:solidFill>
-                            <a:schemeClr val="tx1"/>
-                          </a:solidFill>
-                          <a:effectLst/>
-                          <a:latin typeface="Arial"/>
-                          <a:ea typeface="+mn-ea"/>
-                          <a:cs typeface="Arial"/>
-                        </a:rPr>
-                        <a:t>Vates</a:t>
-                      </a:r>
-                      <a:r>
-                        <a:rPr lang="en-GB" sz="2400" kern="1200" dirty="0" smtClean="0">
-                          <a:solidFill>
-                            <a:schemeClr val="tx1"/>
-                          </a:solidFill>
-                          <a:effectLst/>
-                          <a:latin typeface="Arial"/>
-                          <a:ea typeface="+mn-ea"/>
-                          <a:cs typeface="Arial"/>
-                        </a:rPr>
-                        <a:t> project has been developed in parallel to the </a:t>
-                      </a:r>
-                      <a:r>
-                        <a:rPr lang="en-GB" sz="2400" kern="1200" dirty="0" err="1" smtClean="0">
-                          <a:solidFill>
-                            <a:schemeClr val="tx1"/>
-                          </a:solidFill>
-                          <a:effectLst/>
-                          <a:latin typeface="Arial"/>
-                          <a:ea typeface="+mn-ea"/>
-                          <a:cs typeface="Arial"/>
-                        </a:rPr>
-                        <a:t>Mantid</a:t>
-                      </a:r>
-                      <a:r>
-                        <a:rPr lang="en-GB" sz="2400" kern="1200" dirty="0" smtClean="0">
-                          <a:solidFill>
-                            <a:schemeClr val="tx1"/>
-                          </a:solidFill>
-                          <a:effectLst/>
-                          <a:latin typeface="Arial"/>
-                          <a:ea typeface="+mn-ea"/>
-                          <a:cs typeface="Arial"/>
-                        </a:rPr>
-                        <a:t> Framework. </a:t>
-                      </a:r>
-                      <a:r>
-                        <a:rPr lang="en-GB" sz="2400" kern="1200" dirty="0" err="1" smtClean="0">
-                          <a:solidFill>
-                            <a:schemeClr val="tx1"/>
-                          </a:solidFill>
-                          <a:effectLst/>
-                          <a:latin typeface="Arial"/>
-                          <a:ea typeface="+mn-ea"/>
-                          <a:cs typeface="Arial"/>
-                        </a:rPr>
-                        <a:t>Mantid</a:t>
-                      </a:r>
-                      <a:r>
-                        <a:rPr lang="en-GB" sz="2400" kern="1200" dirty="0" smtClean="0">
-                          <a:solidFill>
-                            <a:schemeClr val="tx1"/>
-                          </a:solidFill>
-                          <a:effectLst/>
-                          <a:latin typeface="Arial"/>
-                          <a:ea typeface="+mn-ea"/>
-                          <a:cs typeface="Arial"/>
-                        </a:rPr>
-                        <a:t> is an extensible framework for neutron and </a:t>
-                      </a:r>
-                      <a:r>
-                        <a:rPr lang="en-GB" sz="2400" kern="1200" dirty="0" err="1" smtClean="0">
-                          <a:solidFill>
-                            <a:schemeClr val="tx1"/>
-                          </a:solidFill>
-                          <a:effectLst/>
-                          <a:latin typeface="Arial"/>
-                          <a:ea typeface="+mn-ea"/>
-                          <a:cs typeface="Arial"/>
-                        </a:rPr>
-                        <a:t>muon</a:t>
-                      </a:r>
-                      <a:r>
-                        <a:rPr lang="en-GB" sz="2400" kern="1200" dirty="0" smtClean="0">
-                          <a:solidFill>
-                            <a:schemeClr val="tx1"/>
-                          </a:solidFill>
-                          <a:effectLst/>
-                          <a:latin typeface="Arial"/>
-                          <a:ea typeface="+mn-ea"/>
-                          <a:cs typeface="Arial"/>
-                        </a:rPr>
-                        <a:t> data reduction and analysis</a:t>
-                      </a:r>
-                      <a:r>
-                        <a:rPr lang="en-GB" sz="2400" kern="1200" baseline="30000" dirty="0" smtClean="0">
-                          <a:solidFill>
-                            <a:schemeClr val="tx1"/>
-                          </a:solidFill>
-                          <a:effectLst/>
-                          <a:latin typeface="Arial"/>
-                          <a:ea typeface="+mn-ea"/>
-                          <a:cs typeface="Arial"/>
-                        </a:rPr>
-                        <a:t>1</a:t>
-                      </a:r>
-                      <a:r>
-                        <a:rPr lang="en-GB" sz="2400" kern="1200" dirty="0" smtClean="0">
-                          <a:solidFill>
-                            <a:schemeClr val="tx1"/>
-                          </a:solidFill>
-                          <a:effectLst/>
-                          <a:latin typeface="Arial"/>
-                          <a:ea typeface="+mn-ea"/>
-                          <a:cs typeface="Arial"/>
-                        </a:rPr>
-                        <a:t>. The </a:t>
-                      </a:r>
-                      <a:r>
-                        <a:rPr lang="en-GB" sz="2400" kern="1200" dirty="0" err="1" smtClean="0">
-                          <a:solidFill>
-                            <a:schemeClr val="tx1"/>
-                          </a:solidFill>
-                          <a:effectLst/>
-                          <a:latin typeface="Arial"/>
-                          <a:ea typeface="+mn-ea"/>
-                          <a:cs typeface="Arial"/>
-                        </a:rPr>
-                        <a:t>mantid</a:t>
-                      </a:r>
-                      <a:r>
-                        <a:rPr lang="en-GB" sz="2400" kern="1200" dirty="0" smtClean="0">
-                          <a:solidFill>
-                            <a:schemeClr val="tx1"/>
-                          </a:solidFill>
-                          <a:effectLst/>
-                          <a:latin typeface="Arial"/>
-                          <a:ea typeface="+mn-ea"/>
-                          <a:cs typeface="Arial"/>
-                        </a:rPr>
-                        <a:t> framework is mature and deployed on approximately [40] instruments at [3] </a:t>
-                      </a:r>
-                      <a:r>
-                        <a:rPr lang="en-GB" sz="2400" kern="1200" dirty="0" err="1" smtClean="0">
-                          <a:solidFill>
-                            <a:schemeClr val="tx1"/>
-                          </a:solidFill>
-                          <a:effectLst/>
-                          <a:latin typeface="Arial"/>
-                          <a:ea typeface="+mn-ea"/>
-                          <a:cs typeface="Arial"/>
-                        </a:rPr>
-                        <a:t>facililities</a:t>
-                      </a:r>
-                      <a:r>
-                        <a:rPr lang="en-GB" sz="2400" kern="1200" dirty="0" smtClean="0">
-                          <a:solidFill>
-                            <a:schemeClr val="tx1"/>
-                          </a:solidFill>
-                          <a:effectLst/>
-                          <a:latin typeface="Arial"/>
-                          <a:ea typeface="+mn-ea"/>
-                          <a:cs typeface="Arial"/>
-                        </a:rPr>
-                        <a:t>.</a:t>
-                      </a:r>
-                    </a:p>
-                    <a:p>
-                      <a:r>
-                        <a:rPr lang="en-GB" sz="2400" kern="1200" dirty="0" smtClean="0">
-                          <a:solidFill>
-                            <a:schemeClr val="tx1"/>
-                          </a:solidFill>
-                          <a:effectLst/>
-                          <a:latin typeface="Arial"/>
-                          <a:ea typeface="+mn-ea"/>
-                          <a:cs typeface="Arial"/>
-                        </a:rPr>
-                        <a:t> </a:t>
-                      </a:r>
-                    </a:p>
-                    <a:p>
-                      <a:r>
-                        <a:rPr lang="en-GB" sz="2400" kern="1200" dirty="0" smtClean="0">
-                          <a:solidFill>
-                            <a:schemeClr val="tx1"/>
-                          </a:solidFill>
-                          <a:effectLst/>
-                          <a:latin typeface="Arial"/>
-                          <a:ea typeface="+mn-ea"/>
-                          <a:cs typeface="Arial"/>
-                        </a:rPr>
-                        <a:t>For n-dimensional visualisation, the </a:t>
-                      </a:r>
-                      <a:r>
-                        <a:rPr lang="en-GB" sz="2400" kern="1200" dirty="0" err="1" smtClean="0">
-                          <a:solidFill>
-                            <a:schemeClr val="tx1"/>
-                          </a:solidFill>
-                          <a:effectLst/>
-                          <a:latin typeface="Arial"/>
-                          <a:ea typeface="+mn-ea"/>
-                          <a:cs typeface="Arial"/>
-                        </a:rPr>
-                        <a:t>Vates</a:t>
-                      </a:r>
-                      <a:r>
-                        <a:rPr lang="en-GB" sz="2400" kern="1200" dirty="0" smtClean="0">
-                          <a:solidFill>
-                            <a:schemeClr val="tx1"/>
-                          </a:solidFill>
-                          <a:effectLst/>
-                          <a:latin typeface="Arial"/>
-                          <a:ea typeface="+mn-ea"/>
-                          <a:cs typeface="Arial"/>
-                        </a:rPr>
-                        <a:t> project uses ParaView</a:t>
-                      </a:r>
-                      <a:r>
-                        <a:rPr lang="en-GB" sz="2400" kern="1200" baseline="30000" dirty="0" smtClean="0">
-                          <a:solidFill>
-                            <a:schemeClr val="tx1"/>
-                          </a:solidFill>
-                          <a:effectLst/>
-                          <a:latin typeface="Arial"/>
-                          <a:ea typeface="+mn-ea"/>
-                          <a:cs typeface="Arial"/>
-                        </a:rPr>
-                        <a:t>2</a:t>
-                      </a:r>
-                      <a:r>
-                        <a:rPr lang="en-GB" sz="2400" kern="1200" dirty="0" smtClean="0">
-                          <a:solidFill>
-                            <a:schemeClr val="tx1"/>
-                          </a:solidFill>
-                          <a:effectLst/>
-                          <a:latin typeface="Arial"/>
-                          <a:ea typeface="+mn-ea"/>
-                          <a:cs typeface="Arial"/>
-                        </a:rPr>
-                        <a:t>, an advanced VTK based visualisation engine. In brief, the </a:t>
-                      </a:r>
-                      <a:r>
-                        <a:rPr lang="en-GB" sz="2400" kern="1200" dirty="0" err="1" smtClean="0">
-                          <a:solidFill>
-                            <a:schemeClr val="tx1"/>
-                          </a:solidFill>
-                          <a:effectLst/>
-                          <a:latin typeface="Arial"/>
-                          <a:ea typeface="+mn-ea"/>
-                          <a:cs typeface="Arial"/>
-                        </a:rPr>
-                        <a:t>Vates</a:t>
-                      </a:r>
-                      <a:r>
-                        <a:rPr lang="en-GB" sz="2400" kern="1200" dirty="0" smtClean="0">
-                          <a:solidFill>
-                            <a:schemeClr val="tx1"/>
-                          </a:solidFill>
-                          <a:effectLst/>
-                          <a:latin typeface="Arial"/>
-                          <a:ea typeface="+mn-ea"/>
-                          <a:cs typeface="Arial"/>
-                        </a:rPr>
-                        <a:t> project binds </a:t>
-                      </a:r>
-                      <a:r>
-                        <a:rPr lang="en-GB" sz="2400" kern="1200" dirty="0" err="1" smtClean="0">
-                          <a:solidFill>
-                            <a:schemeClr val="tx1"/>
-                          </a:solidFill>
-                          <a:effectLst/>
-                          <a:latin typeface="Arial"/>
-                          <a:ea typeface="+mn-ea"/>
-                          <a:cs typeface="Arial"/>
-                        </a:rPr>
-                        <a:t>Mantid</a:t>
-                      </a:r>
-                      <a:r>
-                        <a:rPr lang="en-GB" sz="2400" kern="1200" dirty="0" smtClean="0">
-                          <a:solidFill>
-                            <a:schemeClr val="tx1"/>
-                          </a:solidFill>
-                          <a:effectLst/>
-                          <a:latin typeface="Arial"/>
-                          <a:ea typeface="+mn-ea"/>
-                          <a:cs typeface="Arial"/>
-                        </a:rPr>
-                        <a:t> to </a:t>
-                      </a:r>
-                      <a:r>
-                        <a:rPr lang="en-GB" sz="2400" kern="1200" dirty="0" err="1" smtClean="0">
-                          <a:solidFill>
-                            <a:schemeClr val="tx1"/>
-                          </a:solidFill>
-                          <a:effectLst/>
-                          <a:latin typeface="Arial"/>
-                          <a:ea typeface="+mn-ea"/>
-                          <a:cs typeface="Arial"/>
-                        </a:rPr>
-                        <a:t>ParaView</a:t>
-                      </a:r>
-                      <a:r>
-                        <a:rPr lang="en-GB" sz="2400" kern="1200" dirty="0" smtClean="0">
-                          <a:solidFill>
-                            <a:schemeClr val="tx1"/>
-                          </a:solidFill>
-                          <a:effectLst/>
-                          <a:latin typeface="Arial"/>
-                          <a:ea typeface="+mn-ea"/>
-                          <a:cs typeface="Arial"/>
-                        </a:rPr>
-                        <a:t> via the introduction of multidimensional data </a:t>
-                      </a:r>
-                      <a:r>
-                        <a:rPr lang="en-GB" sz="2400" kern="1200" dirty="0" smtClean="0">
-                          <a:solidFill>
-                            <a:schemeClr val="tx1"/>
-                          </a:solidFill>
-                          <a:effectLst/>
-                          <a:latin typeface="Arial"/>
-                          <a:ea typeface="+mn-ea"/>
-                          <a:cs typeface="Arial"/>
-                        </a:rPr>
-                        <a:t>structures </a:t>
-                      </a:r>
-                      <a:r>
-                        <a:rPr lang="en-GB" sz="2400" kern="1200" dirty="0" smtClean="0">
-                          <a:solidFill>
-                            <a:schemeClr val="tx1"/>
-                          </a:solidFill>
-                          <a:effectLst/>
-                          <a:latin typeface="Arial"/>
-                          <a:ea typeface="+mn-ea"/>
-                          <a:cs typeface="Arial"/>
-                        </a:rPr>
-                        <a:t>and algorithms. In addition, we utilise </a:t>
-                      </a:r>
-                      <a:r>
-                        <a:rPr lang="en-GB" sz="2400" kern="1200" dirty="0" err="1" smtClean="0">
-                          <a:solidFill>
-                            <a:schemeClr val="tx1"/>
-                          </a:solidFill>
-                          <a:effectLst/>
-                          <a:latin typeface="Arial"/>
-                          <a:ea typeface="+mn-ea"/>
-                          <a:cs typeface="Arial"/>
-                        </a:rPr>
-                        <a:t>ParaView’s</a:t>
-                      </a:r>
-                      <a:r>
-                        <a:rPr lang="en-GB" sz="2400" kern="1200" dirty="0" smtClean="0">
-                          <a:solidFill>
-                            <a:schemeClr val="tx1"/>
-                          </a:solidFill>
-                          <a:effectLst/>
-                          <a:latin typeface="Arial"/>
-                          <a:ea typeface="+mn-ea"/>
-                          <a:cs typeface="Arial"/>
-                        </a:rPr>
-                        <a:t> plugin mechanism to provide customised tools for neutron scattering. We also deliver two-way interaction between </a:t>
-                      </a:r>
-                      <a:r>
-                        <a:rPr lang="en-GB" sz="2400" kern="1200" dirty="0" err="1" smtClean="0">
-                          <a:solidFill>
-                            <a:schemeClr val="tx1"/>
-                          </a:solidFill>
-                          <a:effectLst/>
-                          <a:latin typeface="Arial"/>
-                          <a:ea typeface="+mn-ea"/>
-                          <a:cs typeface="Arial"/>
-                        </a:rPr>
-                        <a:t>ParaView</a:t>
-                      </a:r>
-                      <a:r>
-                        <a:rPr lang="en-GB" sz="2400" kern="1200" dirty="0" smtClean="0">
-                          <a:solidFill>
-                            <a:schemeClr val="tx1"/>
-                          </a:solidFill>
-                          <a:effectLst/>
-                          <a:latin typeface="Arial"/>
-                          <a:ea typeface="+mn-ea"/>
-                          <a:cs typeface="Arial"/>
-                        </a:rPr>
-                        <a:t> and </a:t>
-                      </a:r>
-                      <a:r>
-                        <a:rPr lang="en-GB" sz="2400" kern="1200" dirty="0" err="1" smtClean="0">
-                          <a:solidFill>
-                            <a:schemeClr val="tx1"/>
-                          </a:solidFill>
-                          <a:effectLst/>
-                          <a:latin typeface="Arial"/>
-                          <a:ea typeface="+mn-ea"/>
-                          <a:cs typeface="Arial"/>
-                        </a:rPr>
-                        <a:t>Mantid</a:t>
-                      </a:r>
-                      <a:r>
-                        <a:rPr lang="en-GB" sz="2400" kern="1200" dirty="0" smtClean="0">
-                          <a:solidFill>
-                            <a:schemeClr val="tx1"/>
-                          </a:solidFill>
-                          <a:effectLst/>
-                          <a:latin typeface="Arial"/>
-                          <a:ea typeface="+mn-ea"/>
-                          <a:cs typeface="Arial"/>
-                        </a:rPr>
-                        <a:t> so that users can visually drive the data reduction and analysis process.</a:t>
-                      </a:r>
-                    </a:p>
-                    <a:p>
-                      <a:r>
-                        <a:rPr lang="en-GB" sz="2400" kern="1200" dirty="0" smtClean="0">
-                          <a:solidFill>
-                            <a:schemeClr val="tx1"/>
-                          </a:solidFill>
-                          <a:effectLst/>
-                          <a:latin typeface="Arial"/>
-                          <a:ea typeface="+mn-ea"/>
-                          <a:cs typeface="Arial"/>
-                        </a:rPr>
-                        <a:t> </a:t>
-                      </a:r>
-                    </a:p>
-                    <a:p>
-                      <a:r>
-                        <a:rPr lang="en-GB" sz="2400" kern="1200" dirty="0" smtClean="0">
-                          <a:solidFill>
-                            <a:schemeClr val="tx1"/>
-                          </a:solidFill>
-                          <a:effectLst/>
-                          <a:latin typeface="Arial"/>
-                          <a:ea typeface="+mn-ea"/>
-                          <a:cs typeface="Arial"/>
-                        </a:rPr>
-                        <a:t>The </a:t>
-                      </a:r>
-                      <a:r>
-                        <a:rPr lang="en-GB" sz="2400" kern="1200" dirty="0" err="1" smtClean="0">
-                          <a:solidFill>
-                            <a:schemeClr val="tx1"/>
-                          </a:solidFill>
-                          <a:effectLst/>
-                          <a:latin typeface="Arial"/>
-                          <a:ea typeface="+mn-ea"/>
-                          <a:cs typeface="Arial"/>
-                        </a:rPr>
-                        <a:t>Vates</a:t>
-                      </a:r>
-                      <a:r>
-                        <a:rPr lang="en-GB" sz="2400" kern="1200" dirty="0" smtClean="0">
-                          <a:solidFill>
-                            <a:schemeClr val="tx1"/>
-                          </a:solidFill>
-                          <a:effectLst/>
-                          <a:latin typeface="Arial"/>
-                          <a:ea typeface="+mn-ea"/>
-                          <a:cs typeface="Arial"/>
-                        </a:rPr>
-                        <a:t> Simple Interface, is our customised front-end to the n-dimensional </a:t>
-                      </a:r>
-                      <a:r>
-                        <a:rPr lang="en-GB" sz="2400" kern="1200" dirty="0" err="1" smtClean="0">
-                          <a:solidFill>
-                            <a:schemeClr val="tx1"/>
-                          </a:solidFill>
-                          <a:effectLst/>
-                          <a:latin typeface="Arial"/>
-                          <a:ea typeface="+mn-ea"/>
-                          <a:cs typeface="Arial"/>
-                        </a:rPr>
-                        <a:t>ParaView</a:t>
-                      </a:r>
-                      <a:r>
-                        <a:rPr lang="en-GB" sz="2400" kern="1200" dirty="0" smtClean="0">
-                          <a:solidFill>
-                            <a:schemeClr val="tx1"/>
-                          </a:solidFill>
-                          <a:effectLst/>
-                          <a:latin typeface="Arial"/>
-                          <a:ea typeface="+mn-ea"/>
-                          <a:cs typeface="Arial"/>
-                        </a:rPr>
-                        <a:t> tools. It provides a minimalistic user interface, with key tools and representations ready at hand.</a:t>
-                      </a:r>
-                    </a:p>
-                    <a:p>
-                      <a:r>
-                        <a:rPr lang="en-GB" sz="2400" kern="1200" dirty="0" smtClean="0">
-                          <a:solidFill>
-                            <a:schemeClr val="tx1"/>
-                          </a:solidFill>
-                          <a:effectLst/>
-                          <a:latin typeface="Arial"/>
-                          <a:ea typeface="+mn-ea"/>
-                          <a:cs typeface="Arial"/>
-                        </a:rPr>
-                        <a:t> </a:t>
-                      </a:r>
-                    </a:p>
-                    <a:p>
-                      <a:r>
-                        <a:rPr lang="en-GB" sz="2400" kern="1200" dirty="0" smtClean="0">
-                          <a:solidFill>
-                            <a:schemeClr val="tx1"/>
-                          </a:solidFill>
-                          <a:effectLst/>
-                          <a:latin typeface="Arial"/>
-                          <a:ea typeface="+mn-ea"/>
-                          <a:cs typeface="Arial"/>
-                        </a:rPr>
-                        <a:t>The Slice Viewer provides very fast 2D projections through the n-dimensional data. We’ve equipped it with a suite of tools for working with 2D projections through n-dimensional data.</a:t>
-                      </a:r>
-                    </a:p>
-                    <a:p>
-                      <a:r>
-                        <a:rPr lang="en-GB" sz="2400" kern="1200" dirty="0" smtClean="0">
-                          <a:solidFill>
-                            <a:schemeClr val="tx1"/>
-                          </a:solidFill>
-                          <a:effectLst/>
-                          <a:latin typeface="Arial"/>
-                          <a:ea typeface="+mn-ea"/>
-                          <a:cs typeface="Arial"/>
-                        </a:rPr>
-                        <a:t> </a:t>
-                      </a:r>
-                    </a:p>
-                    <a:p>
-                      <a:pPr marL="0" marR="0" lvl="0" indent="0" algn="l" defTabSz="4173538" rtl="0" eaLnBrk="1" fontAlgn="base" latinLnBrk="0" hangingPunct="1">
-                        <a:lnSpc>
-                          <a:spcPct val="100000"/>
-                        </a:lnSpc>
-                        <a:spcBef>
-                          <a:spcPct val="20000"/>
-                        </a:spcBef>
-                        <a:spcAft>
-                          <a:spcPct val="0"/>
-                        </a:spcAft>
-                        <a:buClrTx/>
-                        <a:buSzTx/>
-                        <a:buFontTx/>
-                        <a:buNone/>
-                        <a:tabLst/>
-                        <a:defRPr/>
-                      </a:pPr>
+                          <a:schemeClr val="tx1"/>
+                        </a:solidFill>
+                        <a:effectLst/>
+                        <a:latin typeface="Arial"/>
+                        <a:ea typeface="+mn-ea"/>
+                        <a:cs typeface="Arial"/>
+                      </a:endParaRPr>
+                    </a:p>
+                    <a:p>
                       <a:r>
                         <a:rPr kumimoji="0" lang="en-US" sz="5000" b="0" i="0" u="none" strike="noStrike" kern="0" cap="none" normalizeH="0" baseline="0" dirty="0" smtClean="0">
                           <a:ln>
@@ -3912,20 +3673,7 @@
                           <a:effectLst/>
                           <a:latin typeface="Corisande" pitchFamily="2" charset="0"/>
                         </a:rPr>
-                        <a:t>Single Crystal </a:t>
-                      </a:r>
-                      <a:r>
-                        <a:rPr kumimoji="0" lang="en-US" sz="5000" b="0" i="0" u="none" strike="noStrike" kern="0" cap="none" normalizeH="0" baseline="0" dirty="0" smtClean="0">
-                          <a:ln>
-                            <a:noFill/>
-                          </a:ln>
-                          <a:solidFill>
-                            <a:srgbClr val="002D55"/>
-                          </a:solidFill>
-                          <a:effectLst/>
-                          <a:latin typeface="Corisande" pitchFamily="2" charset="0"/>
-                        </a:rPr>
-                        <a:t>Diffraction</a:t>
+                        <a:t>Single Crystal Diffraction</a:t>
                       </a:r>
                       <a:endParaRPr kumimoji="0" lang="en-US" sz="2400" b="0" i="0" u="none" strike="noStrike" kern="0" cap="none" normalizeH="0" baseline="0" dirty="0" smtClean="0">
                         <a:ln>
@@ -3940,6 +3688,154 @@
                       </a:endParaRPr>
                     </a:p>
                     <a:p>
+                      <a:r>
+                        <a:rPr lang="en-GB" sz="2400" kern="1200" dirty="0" smtClean="0">
+                          <a:solidFill>
+                            <a:schemeClr val="tx1"/>
+                          </a:solidFill>
+                          <a:effectLst/>
+                          <a:latin typeface="+mn-lt"/>
+                          <a:ea typeface="+mn-ea"/>
+                          <a:cs typeface="+mn-cs"/>
+                        </a:rPr>
+                        <a:t>A key hurdle is the ability to identify Peaks, which we can do automatically. We use a hierarchical, recursive data structure, to store our n-dimensional data, which is particularly effective, as it gives higher resolution in the regions of the Bragg peaks at an overall low memory cost. </a:t>
+                      </a:r>
+                    </a:p>
+                    <a:p>
+                      <a:r>
+                        <a:rPr lang="en-GB" sz="2400" kern="1200" dirty="0" smtClean="0">
+                          <a:solidFill>
+                            <a:schemeClr val="tx1"/>
+                          </a:solidFill>
+                          <a:effectLst/>
+                          <a:latin typeface="+mn-lt"/>
+                          <a:ea typeface="+mn-ea"/>
+                          <a:cs typeface="+mn-cs"/>
+                        </a:rPr>
+                        <a:t> </a:t>
+                      </a:r>
+                    </a:p>
+                    <a:p>
+                      <a:r>
+                        <a:rPr lang="en-GB" sz="2400" kern="1200" dirty="0" smtClean="0">
+                          <a:solidFill>
+                            <a:schemeClr val="tx1"/>
+                          </a:solidFill>
+                          <a:effectLst/>
+                          <a:latin typeface="+mn-lt"/>
+                          <a:ea typeface="+mn-ea"/>
+                          <a:cs typeface="+mn-cs"/>
+                        </a:rPr>
+                        <a:t>UB matrix finding and optimisation functions are now well established. We have adapted, and built upon concepts from the </a:t>
+                      </a:r>
+                      <a:r>
+                        <a:rPr lang="en-GB" sz="2400" kern="1200" dirty="0" smtClean="0">
+                          <a:solidFill>
+                            <a:schemeClr val="tx1"/>
+                          </a:solidFill>
+                          <a:effectLst/>
+                          <a:latin typeface="+mn-lt"/>
+                          <a:ea typeface="+mn-ea"/>
+                          <a:cs typeface="+mn-cs"/>
+                        </a:rPr>
+                        <a:t>ISAW</a:t>
+                      </a:r>
+                      <a:r>
+                        <a:rPr lang="en-GB" sz="2400" kern="1200" baseline="30000" dirty="0" smtClean="0">
+                          <a:solidFill>
+                            <a:schemeClr val="tx1"/>
+                          </a:solidFill>
+                          <a:effectLst/>
+                          <a:latin typeface="+mn-lt"/>
+                          <a:ea typeface="+mn-ea"/>
+                          <a:cs typeface="+mn-cs"/>
+                        </a:rPr>
+                        <a:t>3</a:t>
+                      </a:r>
+                      <a:r>
+                        <a:rPr lang="en-GB" sz="2400" kern="1200" dirty="0" smtClean="0">
+                          <a:solidFill>
+                            <a:schemeClr val="tx1"/>
+                          </a:solidFill>
+                          <a:effectLst/>
+                          <a:latin typeface="+mn-lt"/>
+                          <a:ea typeface="+mn-ea"/>
+                          <a:cs typeface="+mn-cs"/>
+                        </a:rPr>
+                        <a:t> </a:t>
+                      </a:r>
+                      <a:r>
+                        <a:rPr lang="en-GB" sz="2400" kern="1200" dirty="0" smtClean="0">
+                          <a:solidFill>
+                            <a:schemeClr val="tx1"/>
+                          </a:solidFill>
+                          <a:effectLst/>
+                          <a:latin typeface="+mn-lt"/>
+                          <a:ea typeface="+mn-ea"/>
+                          <a:cs typeface="+mn-cs"/>
+                        </a:rPr>
+                        <a:t>framework using specialist knowledge from that team. Work in this area is on-going, for example, we have recently extended the workflow options to include elliptical peak integration and sample placement optimisation.</a:t>
+                      </a:r>
+                    </a:p>
+                    <a:p>
+                      <a:r>
+                        <a:rPr lang="en-GB" sz="2400" kern="1200" dirty="0" smtClean="0">
+                          <a:solidFill>
+                            <a:schemeClr val="tx1"/>
+                          </a:solidFill>
+                          <a:effectLst/>
+                          <a:latin typeface="+mn-lt"/>
+                          <a:ea typeface="+mn-ea"/>
+                          <a:cs typeface="+mn-cs"/>
+                        </a:rPr>
+                        <a:t> </a:t>
+                      </a:r>
+                    </a:p>
+                    <a:p>
+                      <a:r>
+                        <a:rPr lang="en-GB" sz="2400" kern="1200" dirty="0" smtClean="0">
+                          <a:solidFill>
+                            <a:schemeClr val="tx1"/>
+                          </a:solidFill>
+                          <a:effectLst/>
+                          <a:latin typeface="+mn-lt"/>
+                          <a:ea typeface="+mn-ea"/>
+                          <a:cs typeface="+mn-cs"/>
+                        </a:rPr>
+                        <a:t>Almost all aspects of this workflow have been developed as part of the VATES project. The workflow is very flexible, with options for manual intervention, visualisation of algorithmic results, as well as a range of alternative functions should the default not be suitable. We have even started running multi-threaded algorithms on the fly as part of the interactive Slice Viewer modes to give very fast 2D slices through single crystal data.</a:t>
+                      </a:r>
+                    </a:p>
+                    <a:p>
+                      <a:pPr marL="0" marR="0" lvl="0" indent="0" algn="l" defTabSz="4173538" rtl="0" eaLnBrk="1" fontAlgn="base" latinLnBrk="0" hangingPunct="1">
+                        <a:lnSpc>
+                          <a:spcPct val="100000"/>
+                        </a:lnSpc>
+                        <a:spcBef>
+                          <a:spcPct val="20000"/>
+                        </a:spcBef>
+                        <a:spcAft>
+                          <a:spcPct val="0"/>
+                        </a:spcAft>
+                        <a:buClrTx/>
+                        <a:buSzTx/>
+                        <a:buFontTx/>
+                        <a:buNone/>
+                        <a:tabLst/>
+                        <a:defRPr/>
+                      </a:pPr>
+                      <a:endParaRPr kumimoji="0" lang="en-US" sz="2400" b="0" i="0" u="none" strike="noStrike" kern="0" cap="none" normalizeH="0" baseline="0" dirty="0" smtClean="0">
+                        <a:ln>
+                          <a:noFill/>
+                        </a:ln>
+                        <a:solidFill>
+                          <a:schemeClr val="tx1"/>
+                        </a:solidFill>
+                        <a:effectLst/>
+                        <a:latin typeface="Arial"/>
+                        <a:cs typeface="Arial"/>
+                      </a:endParaRPr>
+                    </a:p>
+                    <a:p>
                       <a:pPr marL="0" marR="0" lvl="0" indent="0" algn="l" defTabSz="4173538" rtl="0" eaLnBrk="1" fontAlgn="base" latinLnBrk="0" hangingPunct="1">
                         <a:lnSpc>
                           <a:spcPct val="100000"/>
@@ -3963,13 +3859,69 @@
                             <a:noFill/>
                           </a:ln>
                           <a:solidFill>
-                            <a:srgbClr val="002D55"/>
-                          </a:solidFill>
-                          <a:effectLst/>
-                          <a:latin typeface="Arial"/>
-                          <a:cs typeface="Arial"/>
-                        </a:rPr>
-                        <a:t>Strong involvement by both the SNS and ISIS on single crystal diffraction has driven the development of a entire suite of workflows, algorithms, and scripts.</a:t>
+                            <a:schemeClr val="tx1"/>
+                          </a:solidFill>
+                          <a:effectLst/>
+                          <a:latin typeface="Arial"/>
+                          <a:cs typeface="Arial"/>
+                        </a:rPr>
+                        <a:t>Putting VATES to the test; our users challenged us to accurately determine the lattice parameters of a single crystal sample analyzed on SXD at ISIS. Just a few lines of code are required to complete the full analysis (see below). A pending publication involving ISIS used these features for </a:t>
+                      </a:r>
+                      <a:r>
+                        <a:rPr kumimoji="0" lang="en-US" sz="2400" b="0" i="0" u="none" strike="noStrike" kern="0" cap="none" normalizeH="0" baseline="0" dirty="0" smtClean="0">
+                          <a:ln>
+                            <a:noFill/>
+                          </a:ln>
+                          <a:solidFill>
+                            <a:schemeClr val="tx1"/>
+                          </a:solidFill>
+                          <a:effectLst/>
+                          <a:latin typeface="Arial"/>
+                          <a:cs typeface="Arial"/>
+                        </a:rPr>
+                        <a:t>all the </a:t>
+                      </a:r>
+                      <a:r>
+                        <a:rPr kumimoji="0" lang="en-US" sz="2400" b="0" i="0" u="none" strike="noStrike" kern="0" cap="none" normalizeH="0" baseline="0" dirty="0" smtClean="0">
+                          <a:ln>
+                            <a:noFill/>
+                          </a:ln>
+                          <a:solidFill>
+                            <a:schemeClr val="tx1"/>
+                          </a:solidFill>
+                          <a:effectLst/>
+                          <a:latin typeface="Arial"/>
+                          <a:cs typeface="Arial"/>
+                        </a:rPr>
+                        <a:t>data processing</a:t>
+                      </a:r>
+                      <a:r>
+                        <a:rPr kumimoji="0" lang="en-US" sz="2400" b="0" i="0" u="none" strike="noStrike" kern="0" cap="none" normalizeH="0" baseline="30000" dirty="0" smtClean="0">
+                          <a:ln>
+                            <a:noFill/>
+                          </a:ln>
+                          <a:solidFill>
+                            <a:schemeClr val="tx1"/>
+                          </a:solidFill>
+                          <a:effectLst/>
+                          <a:latin typeface="Arial"/>
+                          <a:cs typeface="Arial"/>
+                        </a:rPr>
+                        <a:t>4</a:t>
+                      </a:r>
+                      <a:r>
+                        <a:rPr kumimoji="0" lang="en-US" sz="2400" b="0" i="0" u="none" strike="noStrike" kern="0" cap="none" normalizeH="0" baseline="0" dirty="0" smtClean="0">
+                          <a:ln>
+                            <a:noFill/>
+                          </a:ln>
+                          <a:solidFill>
+                            <a:schemeClr val="tx1"/>
+                          </a:solidFill>
+                          <a:effectLst/>
+                          <a:latin typeface="Arial"/>
+                          <a:cs typeface="Arial"/>
+                        </a:rPr>
+                        <a:t>.</a:t>
                       </a:r>
                     </a:p>
                     <a:p>
@@ -4020,62 +3972,6 @@
                         <a:tabLst/>
                         <a:defRPr/>
                       </a:pPr>
-                      <a:r>
-                        <a:rPr kumimoji="0" lang="en-US" sz="2400" b="0" i="0" u="none" strike="noStrike" kern="0" cap="none" normalizeH="0" baseline="0" dirty="0" smtClean="0">
-                          <a:ln>
-                            <a:noFill/>
-                          </a:ln>
-                          <a:solidFill>
-                            <a:srgbClr val="002D55"/>
-                          </a:solidFill>
-                          <a:effectLst/>
-                          <a:latin typeface="Arial"/>
-                          <a:cs typeface="Arial"/>
-                        </a:rPr>
-                        <a:t>Putting </a:t>
-                      </a:r>
-                      <a:r>
-                        <a:rPr kumimoji="0" lang="en-US" sz="2400" b="0" i="0" u="none" strike="noStrike" kern="0" cap="none" normalizeH="0" baseline="0" dirty="0" err="1" smtClean="0">
-                          <a:ln>
-                            <a:noFill/>
-                          </a:ln>
-                          <a:solidFill>
-                            <a:srgbClr val="002D55"/>
-                          </a:solidFill>
-                          <a:effectLst/>
-                          <a:latin typeface="Arial"/>
-                          <a:cs typeface="Arial"/>
-                        </a:rPr>
-                        <a:t>Vates</a:t>
-                      </a:r>
-                      <a:r>
-                        <a:rPr kumimoji="0" lang="en-US" sz="2400" b="0" i="0" u="none" strike="noStrike" kern="0" cap="none" normalizeH="0" baseline="0" dirty="0" smtClean="0">
-                          <a:ln>
-                            <a:noFill/>
-                          </a:ln>
-                          <a:solidFill>
-                            <a:srgbClr val="002D55"/>
-                          </a:solidFill>
-                          <a:effectLst/>
-                          <a:latin typeface="Arial"/>
-                          <a:cs typeface="Arial"/>
-                        </a:rPr>
-                        <a:t> to the test; our users challenged us to accurately determine the lattice parameters of a single crystal sample analyzed on SXD at ISIS. Just a few lines of code are required to complete the full analysis</a:t>
-                      </a:r>
-                      <a:r>
-                        <a:rPr kumimoji="0" lang="en-US" sz="2400" b="0" i="0" u="none" strike="noStrike" kern="0" cap="none" normalizeH="0" baseline="0" dirty="0" smtClean="0">
-                          <a:ln>
-                            <a:noFill/>
-                          </a:ln>
-                          <a:solidFill>
-                            <a:srgbClr val="002D55"/>
-                          </a:solidFill>
-                          <a:effectLst/>
-                          <a:latin typeface="Arial"/>
-                          <a:cs typeface="Arial"/>
-                        </a:rPr>
-                        <a:t>.</a:t>
-                      </a:r>
                       <a:endParaRPr kumimoji="0" lang="en-US" sz="2400" b="0" i="0" u="none" strike="noStrike" kern="0" cap="none" normalizeH="0" baseline="0" dirty="0" smtClean="0">
                         <a:ln>
                           <a:noFill/>
@@ -4346,6 +4242,245 @@
                         <a:tabLst/>
                         <a:defRPr/>
                       </a:pPr>
+                      <a:endParaRPr kumimoji="0" lang="en-US" sz="2400" b="0" i="1" u="none" strike="noStrike" kern="0" cap="none" normalizeH="0" baseline="0" dirty="0" smtClean="0">
+                        <a:ln>
+                          <a:noFill/>
+                        </a:ln>
+                        <a:solidFill>
+                          <a:srgbClr val="002D55"/>
+                        </a:solidFill>
+                        <a:effectLst/>
+                        <a:latin typeface="Arial"/>
+                        <a:cs typeface="Arial"/>
+                      </a:endParaRPr>
+                    </a:p>
+                    <a:p>
+                      <a:pPr marL="0" marR="0" lvl="0" indent="0" algn="l" defTabSz="4173538" rtl="0" eaLnBrk="1" fontAlgn="base" latinLnBrk="0" hangingPunct="1">
+                        <a:lnSpc>
+                          <a:spcPct val="100000"/>
+                        </a:lnSpc>
+                        <a:spcBef>
+                          <a:spcPct val="20000"/>
+                        </a:spcBef>
+                        <a:spcAft>
+                          <a:spcPct val="0"/>
+                        </a:spcAft>
+                        <a:buClrTx/>
+                        <a:buSzTx/>
+                        <a:buFontTx/>
+                        <a:buNone/>
+                        <a:tabLst/>
+                        <a:defRPr/>
+                      </a:pPr>
+                      <a:endParaRPr kumimoji="0" lang="en-US" sz="2400" b="0" i="1" u="none" strike="noStrike" kern="0" cap="none" normalizeH="0" baseline="0" dirty="0" smtClean="0">
+                        <a:ln>
+                          <a:noFill/>
+                        </a:ln>
+                        <a:solidFill>
+                          <a:srgbClr val="002D55"/>
+                        </a:solidFill>
+                        <a:effectLst/>
+                        <a:latin typeface="Arial"/>
+                        <a:cs typeface="Arial"/>
+                      </a:endParaRPr>
+                    </a:p>
+                    <a:p>
+                      <a:pPr marL="0" marR="0" lvl="0" indent="0" algn="l" defTabSz="4173538" rtl="0" eaLnBrk="1" fontAlgn="base" latinLnBrk="0" hangingPunct="1">
+                        <a:lnSpc>
+                          <a:spcPct val="100000"/>
+                        </a:lnSpc>
+                        <a:spcBef>
+                          <a:spcPct val="20000"/>
+                        </a:spcBef>
+                        <a:spcAft>
+                          <a:spcPct val="0"/>
+                        </a:spcAft>
+                        <a:buClrTx/>
+                        <a:buSzTx/>
+                        <a:buFontTx/>
+                        <a:buNone/>
+                        <a:tabLst/>
+                        <a:defRPr/>
+                      </a:pPr>
+                      <a:endParaRPr kumimoji="0" lang="en-US" sz="2400" b="0" i="1" u="none" strike="noStrike" kern="0" cap="none" normalizeH="0" baseline="0" dirty="0" smtClean="0">
+                        <a:ln>
+                          <a:noFill/>
+                        </a:ln>
+                        <a:solidFill>
+                          <a:srgbClr val="002D55"/>
+                        </a:solidFill>
+                        <a:effectLst/>
+                        <a:latin typeface="Arial"/>
+                        <a:cs typeface="Arial"/>
+                      </a:endParaRPr>
+                    </a:p>
+                    <a:p>
+                      <a:pPr marL="0" marR="0" lvl="0" indent="0" algn="l" defTabSz="4173538" rtl="0" eaLnBrk="1" fontAlgn="base" latinLnBrk="0" hangingPunct="1">
+                        <a:lnSpc>
+                          <a:spcPct val="100000"/>
+                        </a:lnSpc>
+                        <a:spcBef>
+                          <a:spcPct val="20000"/>
+                        </a:spcBef>
+                        <a:spcAft>
+                          <a:spcPct val="0"/>
+                        </a:spcAft>
+                        <a:buClrTx/>
+                        <a:buSzTx/>
+                        <a:buFontTx/>
+                        <a:buNone/>
+                        <a:tabLst/>
+                        <a:defRPr/>
+                      </a:pPr>
+                      <a:endParaRPr kumimoji="0" lang="en-US" sz="2400" b="0" i="1" u="none" strike="noStrike" kern="0" cap="none" normalizeH="0" baseline="0" dirty="0" smtClean="0">
+                        <a:ln>
+                          <a:noFill/>
+                        </a:ln>
+                        <a:solidFill>
+                          <a:srgbClr val="002D55"/>
+                        </a:solidFill>
+                        <a:effectLst/>
+                        <a:latin typeface="Arial"/>
+                        <a:cs typeface="Arial"/>
+                      </a:endParaRPr>
+                    </a:p>
+                    <a:p>
+                      <a:pPr marL="0" marR="0" lvl="0" indent="0" algn="l" defTabSz="4173538" rtl="0" eaLnBrk="1" fontAlgn="base" latinLnBrk="0" hangingPunct="1">
+                        <a:lnSpc>
+                          <a:spcPct val="100000"/>
+                        </a:lnSpc>
+                        <a:spcBef>
+                          <a:spcPct val="20000"/>
+                        </a:spcBef>
+                        <a:spcAft>
+                          <a:spcPct val="0"/>
+                        </a:spcAft>
+                        <a:buClrTx/>
+                        <a:buSzTx/>
+                        <a:buFontTx/>
+                        <a:buNone/>
+                        <a:tabLst/>
+                        <a:defRPr/>
+                      </a:pPr>
+                      <a:endParaRPr kumimoji="0" lang="en-US" sz="2400" b="0" i="1" u="none" strike="noStrike" kern="0" cap="none" normalizeH="0" baseline="0" dirty="0" smtClean="0">
+                        <a:ln>
+                          <a:noFill/>
+                        </a:ln>
+                        <a:solidFill>
+                          <a:srgbClr val="002D55"/>
+                        </a:solidFill>
+                        <a:effectLst/>
+                        <a:latin typeface="Arial"/>
+                        <a:cs typeface="Arial"/>
+                      </a:endParaRPr>
+                    </a:p>
+                    <a:p>
+                      <a:pPr marL="0" marR="0" lvl="0" indent="0" algn="l" defTabSz="4173538" rtl="0" eaLnBrk="1" fontAlgn="base" latinLnBrk="0" hangingPunct="1">
+                        <a:lnSpc>
+                          <a:spcPct val="100000"/>
+                        </a:lnSpc>
+                        <a:spcBef>
+                          <a:spcPct val="20000"/>
+                        </a:spcBef>
+                        <a:spcAft>
+                          <a:spcPct val="0"/>
+                        </a:spcAft>
+                        <a:buClrTx/>
+                        <a:buSzTx/>
+                        <a:buFontTx/>
+                        <a:buNone/>
+                        <a:tabLst/>
+                        <a:defRPr/>
+                      </a:pPr>
+                      <a:r>
+                        <a:rPr kumimoji="0" lang="en-US" sz="2400" b="0" i="1" u="none" strike="noStrike" kern="0" cap="none" normalizeH="0" baseline="0" dirty="0" smtClean="0">
+                          <a:ln>
+                            <a:noFill/>
+                          </a:ln>
+                          <a:solidFill>
+                            <a:srgbClr val="000000"/>
+                          </a:solidFill>
+                          <a:effectLst/>
+                          <a:latin typeface="Arial"/>
+                          <a:cs typeface="Arial"/>
+                        </a:rPr>
+                        <a:t>Detector-space peak picking and visualization tools. </a:t>
+                      </a:r>
+                      <a:r>
+                        <a:rPr kumimoji="0" lang="en-US" sz="2400" b="0" i="1" u="none" strike="noStrike" kern="0" cap="none" normalizeH="0" baseline="0" dirty="0" err="1" smtClean="0">
+                          <a:ln>
+                            <a:noFill/>
+                          </a:ln>
+                          <a:solidFill>
+                            <a:srgbClr val="000000"/>
+                          </a:solidFill>
+                          <a:effectLst/>
+                          <a:latin typeface="Arial"/>
+                          <a:cs typeface="Arial"/>
+                        </a:rPr>
+                        <a:t>NaCl</a:t>
+                      </a:r>
+                      <a:r>
+                        <a:rPr kumimoji="0" lang="en-US" sz="2400" b="0" i="1" u="none" strike="noStrike" kern="0" cap="none" normalizeH="0" baseline="0" dirty="0" smtClean="0">
+                          <a:ln>
+                            <a:noFill/>
+                          </a:ln>
+                          <a:solidFill>
+                            <a:srgbClr val="000000"/>
+                          </a:solidFill>
+                          <a:effectLst/>
+                          <a:latin typeface="Arial"/>
+                          <a:cs typeface="Arial"/>
+                        </a:rPr>
+                        <a:t> </a:t>
+                      </a:r>
+                      <a:r>
+                        <a:rPr kumimoji="0" lang="en-US" sz="2400" b="0" i="1" u="none" strike="noStrike" kern="0" cap="none" normalizeH="0" baseline="0" dirty="0" smtClean="0">
+                          <a:ln>
+                            <a:noFill/>
+                          </a:ln>
+                          <a:solidFill>
+                            <a:srgbClr val="000000"/>
+                          </a:solidFill>
+                          <a:effectLst/>
+                          <a:latin typeface="Arial"/>
+                          <a:cs typeface="Arial"/>
+                        </a:rPr>
+                        <a:t>sample measured </a:t>
+                      </a:r>
+                      <a:r>
+                        <a:rPr kumimoji="0" lang="en-US" sz="2400" b="0" i="1" u="none" strike="noStrike" kern="0" cap="none" normalizeH="0" baseline="0" dirty="0" smtClean="0">
+                          <a:ln>
+                            <a:noFill/>
+                          </a:ln>
+                          <a:solidFill>
+                            <a:srgbClr val="000000"/>
+                          </a:solidFill>
+                          <a:effectLst/>
+                          <a:latin typeface="Arial"/>
+                          <a:cs typeface="Arial"/>
+                        </a:rPr>
+                        <a:t>on SXD. Indexed peaks over a flattened spherical projection of SXD.</a:t>
+                      </a:r>
+                    </a:p>
+                    <a:p>
+                      <a:pPr marL="0" marR="0" lvl="0" indent="0" algn="l" defTabSz="4173538" rtl="0" eaLnBrk="1" fontAlgn="base" latinLnBrk="0" hangingPunct="1">
+                        <a:lnSpc>
+                          <a:spcPct val="100000"/>
+                        </a:lnSpc>
+                        <a:spcBef>
+                          <a:spcPct val="20000"/>
+                        </a:spcBef>
+                        <a:spcAft>
+                          <a:spcPct val="0"/>
+                        </a:spcAft>
+                        <a:buClrTx/>
+                        <a:buSzTx/>
+                        <a:buFontTx/>
+                        <a:buNone/>
+                        <a:tabLst/>
+                        <a:defRPr/>
+                      </a:pPr>
                       <a:endParaRPr kumimoji="0" lang="en-US" sz="2400" b="0" i="0" u="none" strike="noStrike" kern="0" cap="none" normalizeH="0" baseline="0" dirty="0" smtClean="0">
                         <a:ln>
                           <a:noFill/>
@@ -4496,48 +4631,6 @@
                         <a:tabLst/>
                         <a:defRPr/>
                       </a:pPr>
-                      <a:r>
-                        <a:rPr kumimoji="0" lang="en-US" sz="2400" b="0" i="0" u="none" strike="noStrike" kern="0" cap="none" normalizeH="0" baseline="0" dirty="0" smtClean="0">
-                          <a:ln>
-                            <a:noFill/>
-                          </a:ln>
-                          <a:solidFill>
-                            <a:srgbClr val="002D55"/>
-                          </a:solidFill>
-                          <a:effectLst/>
-                          <a:latin typeface="Arial"/>
-                          <a:cs typeface="Arial"/>
-                        </a:rPr>
-                        <a:t>Detector-space peak picking and visualization tools. </a:t>
-                      </a:r>
-                      <a:r>
-                        <a:rPr kumimoji="0" lang="en-US" sz="2400" b="0" i="0" u="none" strike="noStrike" kern="0" cap="none" normalizeH="0" baseline="0" dirty="0" err="1" smtClean="0">
-                          <a:ln>
-                            <a:noFill/>
-                          </a:ln>
-                          <a:solidFill>
-                            <a:srgbClr val="002D55"/>
-                          </a:solidFill>
-                          <a:effectLst/>
-                          <a:latin typeface="Arial"/>
-                          <a:cs typeface="Arial"/>
-                        </a:rPr>
-                        <a:t>NaCl</a:t>
-                      </a:r>
-                      <a:r>
-                        <a:rPr kumimoji="0" lang="en-US" sz="2400" b="0" i="0" u="none" strike="noStrike" kern="0" cap="none" normalizeH="0" baseline="0" dirty="0" smtClean="0">
-                          <a:ln>
-                            <a:noFill/>
-                          </a:ln>
-                          <a:solidFill>
-                            <a:srgbClr val="002D55"/>
-                          </a:solidFill>
-                          <a:effectLst/>
-                          <a:latin typeface="Arial"/>
-                          <a:cs typeface="Arial"/>
-                        </a:rPr>
-                        <a:t> measured on SXD. Indexed peaks over a flattened spherical projection of SXD.</a:t>
-                      </a:r>
                       <a:endParaRPr kumimoji="0" lang="en-US" sz="2400" b="0" i="0" u="none" strike="noStrike" kern="0" cap="none" normalizeH="0" baseline="0" dirty="0" smtClean="0">
                         <a:ln>
                           <a:noFill/>
@@ -4639,303 +4732,6 @@
                         <a:latin typeface="Arial"/>
                         <a:cs typeface="Arial"/>
                       </a:endParaRPr>
-                    </a:p>
-                    <a:p>
-                      <a:pPr marL="0" marR="0" lvl="0" indent="0" algn="l" defTabSz="4173538" rtl="0" eaLnBrk="1" fontAlgn="base" latinLnBrk="0" hangingPunct="1">
-                        <a:lnSpc>
-                          <a:spcPct val="100000"/>
-                        </a:lnSpc>
-                        <a:spcBef>
-                          <a:spcPct val="20000"/>
-                        </a:spcBef>
-                        <a:spcAft>
-                          <a:spcPct val="0"/>
-                        </a:spcAft>
-                        <a:buClrTx/>
-                        <a:buSzTx/>
-                        <a:buFontTx/>
-                        <a:buNone/>
-                        <a:tabLst/>
-                        <a:defRPr/>
-                      </a:pPr>
-                      <a:endParaRPr kumimoji="0" lang="en-US" sz="2400" b="0" i="0" u="none" strike="noStrike" kern="0" cap="none" normalizeH="0" baseline="0" dirty="0" smtClean="0">
-                        <a:ln>
-                          <a:noFill/>
-                        </a:ln>
-                        <a:solidFill>
-                          <a:srgbClr val="002D55"/>
-                        </a:solidFill>
-                        <a:effectLst/>
-                        <a:latin typeface="Arial"/>
-                        <a:cs typeface="Arial"/>
-                      </a:endParaRPr>
-                    </a:p>
-                    <a:p>
-                      <a:pPr marL="0" marR="0" lvl="0" indent="0" algn="l" defTabSz="4173538" rtl="0" eaLnBrk="1" fontAlgn="base" latinLnBrk="0" hangingPunct="1">
-                        <a:lnSpc>
-                          <a:spcPct val="100000"/>
-                        </a:lnSpc>
-                        <a:spcBef>
-                          <a:spcPct val="20000"/>
-                        </a:spcBef>
-                        <a:spcAft>
-                          <a:spcPct val="0"/>
-                        </a:spcAft>
-                        <a:buClrTx/>
-                        <a:buSzTx/>
-                        <a:buFontTx/>
-                        <a:buNone/>
-                        <a:tabLst/>
-                        <a:defRPr/>
-                      </a:pPr>
-                      <a:endParaRPr kumimoji="0" lang="en-US" sz="2400" b="0" i="0" u="none" strike="noStrike" kern="0" cap="none" normalizeH="0" baseline="0" dirty="0" smtClean="0">
-                        <a:ln>
-                          <a:noFill/>
-                        </a:ln>
-                        <a:solidFill>
-                          <a:srgbClr val="002D55"/>
-                        </a:solidFill>
-                        <a:effectLst/>
-                        <a:latin typeface="Arial"/>
-                        <a:cs typeface="Arial"/>
-                      </a:endParaRPr>
-                    </a:p>
-                    <a:p>
-                      <a:pPr marL="0" marR="0" lvl="0" indent="0" algn="l" defTabSz="4173538" rtl="0" eaLnBrk="1" fontAlgn="base" latinLnBrk="0" hangingPunct="1">
-                        <a:lnSpc>
-                          <a:spcPct val="100000"/>
-                        </a:lnSpc>
-                        <a:spcBef>
-                          <a:spcPct val="20000"/>
-                        </a:spcBef>
-                        <a:spcAft>
-                          <a:spcPct val="0"/>
-                        </a:spcAft>
-                        <a:buClrTx/>
-                        <a:buSzTx/>
-                        <a:buFontTx/>
-                        <a:buNone/>
-                        <a:tabLst/>
-                        <a:defRPr/>
-                      </a:pPr>
-                      <a:endParaRPr kumimoji="0" lang="en-US" sz="2400" b="0" i="0" u="none" strike="noStrike" kern="0" cap="none" normalizeH="0" baseline="0" dirty="0" smtClean="0">
-                        <a:ln>
-                          <a:noFill/>
-                        </a:ln>
-                        <a:solidFill>
-                          <a:srgbClr val="002D55"/>
-                        </a:solidFill>
-                        <a:effectLst/>
-                        <a:latin typeface="Arial"/>
-                        <a:cs typeface="Arial"/>
-                      </a:endParaRPr>
-                    </a:p>
-                    <a:p>
-                      <a:pPr marL="0" marR="0" lvl="0" indent="0" algn="l" defTabSz="4173538" rtl="0" eaLnBrk="1" fontAlgn="base" latinLnBrk="0" hangingPunct="1">
-                        <a:lnSpc>
-                          <a:spcPct val="100000"/>
-                        </a:lnSpc>
-                        <a:spcBef>
-                          <a:spcPct val="20000"/>
-                        </a:spcBef>
-                        <a:spcAft>
-                          <a:spcPct val="0"/>
-                        </a:spcAft>
-                        <a:buClrTx/>
-                        <a:buSzTx/>
-                        <a:buFontTx/>
-                        <a:buNone/>
-                        <a:tabLst/>
-                        <a:defRPr/>
-                      </a:pPr>
-                      <a:endParaRPr kumimoji="0" lang="en-US" sz="2400" b="0" i="0" u="none" strike="noStrike" kern="0" cap="none" normalizeH="0" baseline="0" dirty="0" smtClean="0">
-                        <a:ln>
-                          <a:noFill/>
-                        </a:ln>
-                        <a:solidFill>
-                          <a:srgbClr val="002D55"/>
-                        </a:solidFill>
-                        <a:effectLst/>
-                        <a:latin typeface="Arial"/>
-                        <a:cs typeface="Arial"/>
-                      </a:endParaRPr>
-                    </a:p>
-                    <a:p>
-                      <a:pPr marL="0" marR="0" lvl="0" indent="0" algn="l" defTabSz="4173538" rtl="0" eaLnBrk="1" fontAlgn="base" latinLnBrk="0" hangingPunct="1">
-                        <a:lnSpc>
-                          <a:spcPct val="100000"/>
-                        </a:lnSpc>
-                        <a:spcBef>
-                          <a:spcPct val="20000"/>
-                        </a:spcBef>
-                        <a:spcAft>
-                          <a:spcPct val="0"/>
-                        </a:spcAft>
-                        <a:buClrTx/>
-                        <a:buSzTx/>
-                        <a:buFontTx/>
-                        <a:buNone/>
-                        <a:tabLst/>
-                        <a:defRPr/>
-                      </a:pPr>
-                      <a:endParaRPr kumimoji="0" lang="en-US" sz="2400" b="0" i="0" u="none" strike="noStrike" kern="0" cap="none" normalizeH="0" baseline="0" dirty="0" smtClean="0">
-                        <a:ln>
-                          <a:noFill/>
-                        </a:ln>
-                        <a:solidFill>
-                          <a:srgbClr val="002D55"/>
-                        </a:solidFill>
-                        <a:effectLst/>
-                        <a:latin typeface="Arial"/>
-                        <a:cs typeface="Arial"/>
-                      </a:endParaRPr>
-                    </a:p>
-                    <a:p>
-                      <a:pPr marL="0" marR="0" lvl="0" indent="0" algn="l" defTabSz="4173538" rtl="0" eaLnBrk="1" fontAlgn="base" latinLnBrk="0" hangingPunct="1">
-                        <a:lnSpc>
-                          <a:spcPct val="100000"/>
-                        </a:lnSpc>
-                        <a:spcBef>
-                          <a:spcPct val="20000"/>
-                        </a:spcBef>
-                        <a:spcAft>
-                          <a:spcPct val="0"/>
-                        </a:spcAft>
-                        <a:buClrTx/>
-                        <a:buSzTx/>
-                        <a:buFontTx/>
-                        <a:buNone/>
-                        <a:tabLst/>
-                        <a:defRPr/>
-                      </a:pPr>
-                      <a:endParaRPr kumimoji="0" lang="en-US" sz="2400" b="0" i="0" u="none" strike="noStrike" kern="0" cap="none" normalizeH="0" baseline="0" dirty="0" smtClean="0">
-                        <a:ln>
-                          <a:noFill/>
-                        </a:ln>
-                        <a:solidFill>
-                          <a:srgbClr val="002D55"/>
-                        </a:solidFill>
-                        <a:effectLst/>
-                        <a:latin typeface="Arial"/>
-                        <a:cs typeface="Arial"/>
-                      </a:endParaRPr>
-                    </a:p>
-                    <a:p>
-                      <a:pPr marL="0" marR="0" lvl="0" indent="0" algn="l" defTabSz="4173538" rtl="0" eaLnBrk="1" fontAlgn="base" latinLnBrk="0" hangingPunct="1">
-                        <a:lnSpc>
-                          <a:spcPct val="100000"/>
-                        </a:lnSpc>
-                        <a:spcBef>
-                          <a:spcPct val="20000"/>
-                        </a:spcBef>
-                        <a:spcAft>
-                          <a:spcPct val="0"/>
-                        </a:spcAft>
-                        <a:buClrTx/>
-                        <a:buSzTx/>
-                        <a:buFontTx/>
-                        <a:buNone/>
-                        <a:tabLst/>
-                        <a:defRPr/>
-                      </a:pPr>
-                      <a:r>
-                        <a:rPr kumimoji="0" lang="en-US" sz="2400" b="0" i="0" u="none" strike="noStrike" kern="0" cap="none" normalizeH="0" baseline="0" dirty="0" smtClean="0">
-                          <a:ln>
-                            <a:noFill/>
-                          </a:ln>
-                          <a:solidFill>
-                            <a:srgbClr val="002D55"/>
-                          </a:solidFill>
-                          <a:effectLst/>
-                          <a:latin typeface="Arial"/>
-                          <a:cs typeface="Arial"/>
-                        </a:rPr>
-                        <a:t>Left: Slice through an multi-</a:t>
-                      </a:r>
-                      <a:r>
-                        <a:rPr kumimoji="0" lang="en-US" sz="2400" b="0" i="0" u="none" strike="noStrike" kern="0" cap="none" normalizeH="0" baseline="0" dirty="0" err="1" smtClean="0">
-                          <a:ln>
-                            <a:noFill/>
-                          </a:ln>
-                          <a:solidFill>
-                            <a:srgbClr val="002D55"/>
-                          </a:solidFill>
-                          <a:effectLst/>
-                          <a:latin typeface="Arial"/>
-                          <a:cs typeface="Arial"/>
-                        </a:rPr>
-                        <a:t>dimentional</a:t>
-                      </a:r>
-                      <a:r>
-                        <a:rPr kumimoji="0" lang="en-US" sz="2400" b="0" i="0" u="none" strike="noStrike" kern="0" cap="none" normalizeH="0" baseline="0" dirty="0" smtClean="0">
-                          <a:ln>
-                            <a:noFill/>
-                          </a:ln>
-                          <a:solidFill>
-                            <a:srgbClr val="002D55"/>
-                          </a:solidFill>
-                          <a:effectLst/>
-                          <a:latin typeface="Arial"/>
-                          <a:cs typeface="Arial"/>
-                        </a:rPr>
-                        <a:t> workspace in Q-lab. Algorithmic output fed into visualization to show spherically integrated regions. Right: 3D representation of integration regions with Bragg peaks in </a:t>
-                      </a:r>
-                      <a:r>
-                        <a:rPr kumimoji="0" lang="en-US" sz="2400" b="0" i="0" u="none" strike="noStrike" kern="0" cap="none" normalizeH="0" baseline="0" dirty="0" err="1" smtClean="0">
-                          <a:ln>
-                            <a:noFill/>
-                          </a:ln>
-                          <a:solidFill>
-                            <a:srgbClr val="002D55"/>
-                          </a:solidFill>
-                          <a:effectLst/>
-                          <a:latin typeface="Arial"/>
-                          <a:cs typeface="Arial"/>
-                        </a:rPr>
-                        <a:t>Qlab</a:t>
-                      </a:r>
-                      <a:r>
-                        <a:rPr kumimoji="0" lang="en-US" sz="2400" b="0" i="0" u="none" strike="noStrike" kern="0" cap="none" normalizeH="0" baseline="0" dirty="0" smtClean="0">
-                          <a:ln>
-                            <a:noFill/>
-                          </a:ln>
-                          <a:solidFill>
-                            <a:srgbClr val="002D55"/>
-                          </a:solidFill>
-                          <a:effectLst/>
-                          <a:latin typeface="Arial"/>
-                          <a:cs typeface="Arial"/>
-                        </a:rPr>
-                        <a:t>. Both from </a:t>
-                      </a:r>
-                      <a:r>
-                        <a:rPr kumimoji="0" lang="en-US" sz="2400" b="0" i="0" u="none" strike="noStrike" kern="0" cap="none" normalizeH="0" baseline="0" dirty="0" err="1" smtClean="0">
-                          <a:ln>
-                            <a:noFill/>
-                          </a:ln>
-                          <a:solidFill>
-                            <a:srgbClr val="002D55"/>
-                          </a:solidFill>
-                          <a:effectLst/>
-                          <a:latin typeface="Arial"/>
-                          <a:cs typeface="Arial"/>
-                        </a:rPr>
-                        <a:t>NaCL</a:t>
-                      </a:r>
-                      <a:r>
-                        <a:rPr kumimoji="0" lang="en-US" sz="2400" b="0" i="0" u="none" strike="noStrike" kern="0" cap="none" normalizeH="0" baseline="0" dirty="0" smtClean="0">
-                          <a:ln>
-                            <a:noFill/>
-                          </a:ln>
-                          <a:solidFill>
-                            <a:srgbClr val="002D55"/>
-                          </a:solidFill>
-                          <a:effectLst/>
-                          <a:latin typeface="Arial"/>
-                          <a:cs typeface="Arial"/>
-                        </a:rPr>
-                        <a:t> on SXD.</a:t>
-                      </a:r>
                     </a:p>
                     <a:p>
                       <a:pPr marL="0" marR="0" lvl="0" indent="0" algn="l" defTabSz="4173538" rtl="0" eaLnBrk="1" fontAlgn="base" latinLnBrk="0" hangingPunct="1">
@@ -5565,6 +5361,479 @@
                         <a:tabLst/>
                         <a:defRPr/>
                       </a:pPr>
+                      <a:endParaRPr kumimoji="0" lang="en-US" sz="2400" b="0" i="0" u="none" strike="noStrike" kern="0" cap="none" normalizeH="0" baseline="0" dirty="0" smtClean="0">
+                        <a:ln>
+                          <a:noFill/>
+                        </a:ln>
+                        <a:solidFill>
+                          <a:schemeClr val="tx1"/>
+                        </a:solidFill>
+                        <a:effectLst/>
+                        <a:latin typeface="Arial" pitchFamily="34" charset="0"/>
+                        <a:cs typeface="Arial" pitchFamily="34" charset="0"/>
+                      </a:endParaRPr>
+                    </a:p>
+                    <a:p>
+                      <a:pPr marL="0" marR="0" lvl="0" indent="0" algn="l" defTabSz="4173538" rtl="0" eaLnBrk="1" fontAlgn="base" latinLnBrk="0" hangingPunct="1">
+                        <a:lnSpc>
+                          <a:spcPct val="100000"/>
+                        </a:lnSpc>
+                        <a:spcBef>
+                          <a:spcPct val="20000"/>
+                        </a:spcBef>
+                        <a:spcAft>
+                          <a:spcPct val="0"/>
+                        </a:spcAft>
+                        <a:buClrTx/>
+                        <a:buSzTx/>
+                        <a:buFontTx/>
+                        <a:buNone/>
+                        <a:tabLst/>
+                        <a:defRPr/>
+                      </a:pPr>
+                      <a:endParaRPr kumimoji="0" lang="en-US" sz="2400" b="0" i="0" u="none" strike="noStrike" kern="0" cap="none" normalizeH="0" baseline="0" dirty="0" smtClean="0">
+                        <a:ln>
+                          <a:noFill/>
+                        </a:ln>
+                        <a:solidFill>
+                          <a:schemeClr val="tx1"/>
+                        </a:solidFill>
+                        <a:effectLst/>
+                        <a:latin typeface="Arial" pitchFamily="34" charset="0"/>
+                        <a:cs typeface="Arial" pitchFamily="34" charset="0"/>
+                      </a:endParaRPr>
+                    </a:p>
+                    <a:p>
+                      <a:pPr marL="0" marR="0" lvl="0" indent="0" algn="l" defTabSz="4173538" rtl="0" eaLnBrk="1" fontAlgn="base" latinLnBrk="0" hangingPunct="1">
+                        <a:lnSpc>
+                          <a:spcPct val="100000"/>
+                        </a:lnSpc>
+                        <a:spcBef>
+                          <a:spcPct val="20000"/>
+                        </a:spcBef>
+                        <a:spcAft>
+                          <a:spcPct val="0"/>
+                        </a:spcAft>
+                        <a:buClrTx/>
+                        <a:buSzTx/>
+                        <a:buFontTx/>
+                        <a:buNone/>
+                        <a:tabLst/>
+                        <a:defRPr/>
+                      </a:pPr>
+                      <a:endParaRPr kumimoji="0" lang="en-US" sz="2400" b="0" i="0" u="none" strike="noStrike" kern="0" cap="none" normalizeH="0" baseline="0" dirty="0" smtClean="0">
+                        <a:ln>
+                          <a:noFill/>
+                        </a:ln>
+                        <a:solidFill>
+                          <a:schemeClr val="tx1"/>
+                        </a:solidFill>
+                        <a:effectLst/>
+                        <a:latin typeface="Arial" pitchFamily="34" charset="0"/>
+                        <a:cs typeface="Arial" pitchFamily="34" charset="0"/>
+                      </a:endParaRPr>
+                    </a:p>
+                    <a:p>
+                      <a:pPr marL="0" marR="0" lvl="0" indent="0" algn="l" defTabSz="4173538" rtl="0" eaLnBrk="1" fontAlgn="base" latinLnBrk="0" hangingPunct="1">
+                        <a:lnSpc>
+                          <a:spcPct val="100000"/>
+                        </a:lnSpc>
+                        <a:spcBef>
+                          <a:spcPct val="20000"/>
+                        </a:spcBef>
+                        <a:spcAft>
+                          <a:spcPct val="0"/>
+                        </a:spcAft>
+                        <a:buClrTx/>
+                        <a:buSzTx/>
+                        <a:buFontTx/>
+                        <a:buNone/>
+                        <a:tabLst/>
+                        <a:defRPr/>
+                      </a:pPr>
+                      <a:endParaRPr kumimoji="0" lang="en-US" sz="2400" b="0" i="0" u="none" strike="noStrike" kern="0" cap="none" normalizeH="0" baseline="0" dirty="0" smtClean="0">
+                        <a:ln>
+                          <a:noFill/>
+                        </a:ln>
+                        <a:solidFill>
+                          <a:schemeClr val="tx1"/>
+                        </a:solidFill>
+                        <a:effectLst/>
+                        <a:latin typeface="Arial" pitchFamily="34" charset="0"/>
+                        <a:cs typeface="Arial" pitchFamily="34" charset="0"/>
+                      </a:endParaRPr>
+                    </a:p>
+                    <a:p>
+                      <a:pPr marL="0" marR="0" lvl="0" indent="0" algn="l" defTabSz="4173538" rtl="0" eaLnBrk="1" fontAlgn="base" latinLnBrk="0" hangingPunct="1">
+                        <a:lnSpc>
+                          <a:spcPct val="100000"/>
+                        </a:lnSpc>
+                        <a:spcBef>
+                          <a:spcPct val="20000"/>
+                        </a:spcBef>
+                        <a:spcAft>
+                          <a:spcPct val="0"/>
+                        </a:spcAft>
+                        <a:buClrTx/>
+                        <a:buSzTx/>
+                        <a:buFontTx/>
+                        <a:buNone/>
+                        <a:tabLst/>
+                        <a:defRPr/>
+                      </a:pPr>
+                      <a:endParaRPr kumimoji="0" lang="en-US" sz="2400" b="0" i="0" u="none" strike="noStrike" kern="0" cap="none" normalizeH="0" baseline="0" dirty="0" smtClean="0">
+                        <a:ln>
+                          <a:noFill/>
+                        </a:ln>
+                        <a:solidFill>
+                          <a:srgbClr val="002D55"/>
+                        </a:solidFill>
+                        <a:effectLst/>
+                        <a:latin typeface="Arial"/>
+                        <a:cs typeface="Arial"/>
+                      </a:endParaRPr>
+                    </a:p>
+                    <a:p>
+                      <a:pPr marL="0" marR="0" lvl="0" indent="0" algn="l" defTabSz="4173538" rtl="0" eaLnBrk="1" fontAlgn="base" latinLnBrk="0" hangingPunct="1">
+                        <a:lnSpc>
+                          <a:spcPct val="100000"/>
+                        </a:lnSpc>
+                        <a:spcBef>
+                          <a:spcPct val="20000"/>
+                        </a:spcBef>
+                        <a:spcAft>
+                          <a:spcPct val="0"/>
+                        </a:spcAft>
+                        <a:buClrTx/>
+                        <a:buSzTx/>
+                        <a:buFontTx/>
+                        <a:buNone/>
+                        <a:tabLst/>
+                        <a:defRPr/>
+                      </a:pPr>
+                      <a:endParaRPr kumimoji="0" lang="en-US" sz="2400" b="0" i="0" u="none" strike="noStrike" kern="0" cap="none" normalizeH="0" baseline="0" dirty="0" smtClean="0">
+                        <a:ln>
+                          <a:noFill/>
+                        </a:ln>
+                        <a:solidFill>
+                          <a:srgbClr val="002D55"/>
+                        </a:solidFill>
+                        <a:effectLst/>
+                        <a:latin typeface="Arial"/>
+                        <a:cs typeface="Arial"/>
+                      </a:endParaRPr>
+                    </a:p>
+                    <a:p>
+                      <a:pPr marL="0" marR="0" lvl="0" indent="0" algn="l" defTabSz="4173538" rtl="0" eaLnBrk="1" fontAlgn="base" latinLnBrk="0" hangingPunct="1">
+                        <a:lnSpc>
+                          <a:spcPct val="100000"/>
+                        </a:lnSpc>
+                        <a:spcBef>
+                          <a:spcPct val="20000"/>
+                        </a:spcBef>
+                        <a:spcAft>
+                          <a:spcPct val="0"/>
+                        </a:spcAft>
+                        <a:buClrTx/>
+                        <a:buSzTx/>
+                        <a:buFontTx/>
+                        <a:buNone/>
+                        <a:tabLst/>
+                        <a:defRPr/>
+                      </a:pPr>
+                      <a:endParaRPr kumimoji="0" lang="en-US" sz="2400" b="0" i="0" u="none" strike="noStrike" kern="0" cap="none" normalizeH="0" baseline="0" dirty="0" smtClean="0">
+                        <a:ln>
+                          <a:noFill/>
+                        </a:ln>
+                        <a:solidFill>
+                          <a:srgbClr val="002D55"/>
+                        </a:solidFill>
+                        <a:effectLst/>
+                        <a:latin typeface="Arial"/>
+                        <a:cs typeface="Arial"/>
+                      </a:endParaRPr>
+                    </a:p>
+                    <a:p>
+                      <a:pPr marL="0" marR="0" lvl="0" indent="0" algn="l" defTabSz="4173538" rtl="0" eaLnBrk="1" fontAlgn="base" latinLnBrk="0" hangingPunct="1">
+                        <a:lnSpc>
+                          <a:spcPct val="100000"/>
+                        </a:lnSpc>
+                        <a:spcBef>
+                          <a:spcPct val="20000"/>
+                        </a:spcBef>
+                        <a:spcAft>
+                          <a:spcPct val="0"/>
+                        </a:spcAft>
+                        <a:buClrTx/>
+                        <a:buSzTx/>
+                        <a:buFontTx/>
+                        <a:buNone/>
+                        <a:tabLst/>
+                        <a:defRPr/>
+                      </a:pPr>
+                      <a:endParaRPr kumimoji="0" lang="en-US" sz="2400" b="0" i="0" u="none" strike="noStrike" kern="0" cap="none" normalizeH="0" baseline="0" dirty="0" smtClean="0">
+                        <a:ln>
+                          <a:noFill/>
+                        </a:ln>
+                        <a:solidFill>
+                          <a:srgbClr val="002D55"/>
+                        </a:solidFill>
+                        <a:effectLst/>
+                        <a:latin typeface="Arial"/>
+                        <a:cs typeface="Arial"/>
+                      </a:endParaRPr>
+                    </a:p>
+                    <a:p>
+                      <a:pPr marL="0" marR="0" lvl="0" indent="0" algn="l" defTabSz="4173538" rtl="0" eaLnBrk="1" fontAlgn="base" latinLnBrk="0" hangingPunct="1">
+                        <a:lnSpc>
+                          <a:spcPct val="100000"/>
+                        </a:lnSpc>
+                        <a:spcBef>
+                          <a:spcPct val="20000"/>
+                        </a:spcBef>
+                        <a:spcAft>
+                          <a:spcPct val="0"/>
+                        </a:spcAft>
+                        <a:buClrTx/>
+                        <a:buSzTx/>
+                        <a:buFontTx/>
+                        <a:buNone/>
+                        <a:tabLst/>
+                        <a:defRPr/>
+                      </a:pPr>
+                      <a:endParaRPr kumimoji="0" lang="en-US" sz="2400" b="0" i="1" u="none" strike="noStrike" kern="0" cap="none" normalizeH="0" baseline="0" dirty="0" smtClean="0">
+                        <a:ln>
+                          <a:noFill/>
+                        </a:ln>
+                        <a:solidFill>
+                          <a:srgbClr val="000000"/>
+                        </a:solidFill>
+                        <a:effectLst/>
+                        <a:latin typeface="Arial"/>
+                        <a:cs typeface="Arial"/>
+                      </a:endParaRPr>
+                    </a:p>
+                    <a:p>
+                      <a:pPr marL="0" marR="0" lvl="0" indent="0" algn="l" defTabSz="4173538" rtl="0" eaLnBrk="1" fontAlgn="base" latinLnBrk="0" hangingPunct="1">
+                        <a:lnSpc>
+                          <a:spcPct val="100000"/>
+                        </a:lnSpc>
+                        <a:spcBef>
+                          <a:spcPct val="20000"/>
+                        </a:spcBef>
+                        <a:spcAft>
+                          <a:spcPct val="0"/>
+                        </a:spcAft>
+                        <a:buClrTx/>
+                        <a:buSzTx/>
+                        <a:buFontTx/>
+                        <a:buNone/>
+                        <a:tabLst/>
+                        <a:defRPr/>
+                      </a:pPr>
+                      <a:r>
+                        <a:rPr kumimoji="0" lang="en-US" sz="2400" b="0" i="1" u="none" strike="noStrike" kern="0" cap="none" normalizeH="0" baseline="0" dirty="0" smtClean="0">
+                          <a:ln>
+                            <a:noFill/>
+                          </a:ln>
+                          <a:solidFill>
+                            <a:srgbClr val="000000"/>
+                          </a:solidFill>
+                          <a:effectLst/>
+                          <a:latin typeface="Arial"/>
+                          <a:cs typeface="Arial"/>
+                        </a:rPr>
+                        <a:t>Left: Slice through an multi-</a:t>
+                      </a:r>
+                      <a:r>
+                        <a:rPr kumimoji="0" lang="en-US" sz="2400" b="0" i="1" u="none" strike="noStrike" kern="0" cap="none" normalizeH="0" baseline="0" dirty="0" err="1" smtClean="0">
+                          <a:ln>
+                            <a:noFill/>
+                          </a:ln>
+                          <a:solidFill>
+                            <a:srgbClr val="000000"/>
+                          </a:solidFill>
+                          <a:effectLst/>
+                          <a:latin typeface="Arial"/>
+                          <a:cs typeface="Arial"/>
+                        </a:rPr>
+                        <a:t>dimentional</a:t>
+                      </a:r>
+                      <a:r>
+                        <a:rPr kumimoji="0" lang="en-US" sz="2400" b="0" i="1" u="none" strike="noStrike" kern="0" cap="none" normalizeH="0" baseline="0" dirty="0" smtClean="0">
+                          <a:ln>
+                            <a:noFill/>
+                          </a:ln>
+                          <a:solidFill>
+                            <a:srgbClr val="000000"/>
+                          </a:solidFill>
+                          <a:effectLst/>
+                          <a:latin typeface="Arial"/>
+                          <a:cs typeface="Arial"/>
+                        </a:rPr>
+                        <a:t> workspace in Q-lab. Algorithmic output fed into visualization to show spherically integrated regions. Right: 3D representation of integration regions with Bragg peaks in </a:t>
+                      </a:r>
+                      <a:r>
+                        <a:rPr kumimoji="0" lang="en-US" sz="2400" b="0" i="1" u="none" strike="noStrike" kern="0" cap="none" normalizeH="0" baseline="0" dirty="0" err="1" smtClean="0">
+                          <a:ln>
+                            <a:noFill/>
+                          </a:ln>
+                          <a:solidFill>
+                            <a:srgbClr val="000000"/>
+                          </a:solidFill>
+                          <a:effectLst/>
+                          <a:latin typeface="Arial"/>
+                          <a:cs typeface="Arial"/>
+                        </a:rPr>
+                        <a:t>Qlab</a:t>
+                      </a:r>
+                      <a:r>
+                        <a:rPr kumimoji="0" lang="en-US" sz="2400" b="0" i="1" u="none" strike="noStrike" kern="0" cap="none" normalizeH="0" baseline="0" dirty="0" smtClean="0">
+                          <a:ln>
+                            <a:noFill/>
+                          </a:ln>
+                          <a:solidFill>
+                            <a:srgbClr val="000000"/>
+                          </a:solidFill>
+                          <a:effectLst/>
+                          <a:latin typeface="Arial"/>
+                          <a:cs typeface="Arial"/>
+                        </a:rPr>
+                        <a:t>. Both </a:t>
+                      </a:r>
+                      <a:r>
+                        <a:rPr kumimoji="0" lang="en-US" sz="2400" b="0" i="1" u="none" strike="noStrike" kern="0" cap="none" normalizeH="0" baseline="0" dirty="0" smtClean="0">
+                          <a:ln>
+                            <a:noFill/>
+                          </a:ln>
+                          <a:solidFill>
+                            <a:srgbClr val="000000"/>
+                          </a:solidFill>
+                          <a:effectLst/>
+                          <a:latin typeface="Arial"/>
+                          <a:cs typeface="Arial"/>
+                        </a:rPr>
+                        <a:t>from </a:t>
+                      </a:r>
+                      <a:r>
+                        <a:rPr kumimoji="0" lang="en-US" sz="2400" b="0" i="1" u="none" strike="noStrike" kern="0" cap="none" normalizeH="0" baseline="0" dirty="0" err="1" smtClean="0">
+                          <a:ln>
+                            <a:noFill/>
+                          </a:ln>
+                          <a:solidFill>
+                            <a:srgbClr val="000000"/>
+                          </a:solidFill>
+                          <a:effectLst/>
+                          <a:latin typeface="Arial"/>
+                          <a:cs typeface="Arial"/>
+                        </a:rPr>
+                        <a:t>cublic</a:t>
+                      </a:r>
+                      <a:r>
+                        <a:rPr kumimoji="0" lang="en-US" sz="2400" b="0" i="1" u="none" strike="noStrike" kern="0" cap="none" normalizeH="0" baseline="0" dirty="0" smtClean="0">
+                          <a:ln>
+                            <a:noFill/>
+                          </a:ln>
+                          <a:solidFill>
+                            <a:srgbClr val="000000"/>
+                          </a:solidFill>
+                          <a:effectLst/>
+                          <a:latin typeface="Arial"/>
+                          <a:cs typeface="Arial"/>
+                        </a:rPr>
+                        <a:t> </a:t>
+                      </a:r>
+                      <a:r>
+                        <a:rPr kumimoji="0" lang="en-US" sz="2400" b="0" i="1" u="none" strike="noStrike" kern="0" cap="none" normalizeH="0" baseline="0" dirty="0" err="1" smtClean="0">
+                          <a:ln>
+                            <a:noFill/>
+                          </a:ln>
+                          <a:solidFill>
+                            <a:srgbClr val="000000"/>
+                          </a:solidFill>
+                          <a:effectLst/>
+                          <a:latin typeface="Arial"/>
+                          <a:cs typeface="Arial"/>
+                        </a:rPr>
+                        <a:t>NaCl</a:t>
+                      </a:r>
+                      <a:r>
+                        <a:rPr kumimoji="0" lang="en-US" sz="2400" b="0" i="1" u="none" strike="noStrike" kern="0" cap="none" normalizeH="0" baseline="0" dirty="0" smtClean="0">
+                          <a:ln>
+                            <a:noFill/>
+                          </a:ln>
+                          <a:solidFill>
+                            <a:srgbClr val="000000"/>
+                          </a:solidFill>
+                          <a:effectLst/>
+                          <a:latin typeface="Arial"/>
+                          <a:cs typeface="Arial"/>
+                        </a:rPr>
+                        <a:t> </a:t>
+                      </a:r>
+                      <a:r>
+                        <a:rPr kumimoji="0" lang="en-US" sz="2400" b="0" i="1" u="none" strike="noStrike" kern="0" cap="none" normalizeH="0" baseline="0" dirty="0" smtClean="0">
+                          <a:ln>
+                            <a:noFill/>
+                          </a:ln>
+                          <a:solidFill>
+                            <a:srgbClr val="000000"/>
+                          </a:solidFill>
+                          <a:effectLst/>
+                          <a:latin typeface="Arial"/>
+                          <a:cs typeface="Arial"/>
+                        </a:rPr>
+                        <a:t>on SXD.</a:t>
+                      </a:r>
+                    </a:p>
+                    <a:p>
+                      <a:pPr marL="0" marR="0" lvl="0" indent="0" algn="l" defTabSz="4173538" rtl="0" eaLnBrk="1" fontAlgn="base" latinLnBrk="0" hangingPunct="1">
+                        <a:lnSpc>
+                          <a:spcPct val="100000"/>
+                        </a:lnSpc>
+                        <a:spcBef>
+                          <a:spcPct val="20000"/>
+                        </a:spcBef>
+                        <a:spcAft>
+                          <a:spcPct val="0"/>
+                        </a:spcAft>
+                        <a:buClrTx/>
+                        <a:buSzTx/>
+                        <a:buFontTx/>
+                        <a:buNone/>
+                        <a:tabLst/>
+                        <a:defRPr/>
+                      </a:pPr>
+                      <a:endParaRPr kumimoji="0" lang="en-US" sz="2400" b="0" i="0" u="none" strike="noStrike" kern="0" cap="none" normalizeH="0" baseline="0" dirty="0" smtClean="0">
+                        <a:ln>
+                          <a:noFill/>
+                        </a:ln>
+                        <a:solidFill>
+                          <a:schemeClr val="tx1"/>
+                        </a:solidFill>
+                        <a:effectLst/>
+                        <a:latin typeface="Arial" pitchFamily="34" charset="0"/>
+                        <a:cs typeface="Arial" pitchFamily="34" charset="0"/>
+                      </a:endParaRPr>
+                    </a:p>
+                    <a:p>
+                      <a:pPr marL="0" marR="0" lvl="0" indent="0" algn="l" defTabSz="4173538" rtl="0" eaLnBrk="1" fontAlgn="base" latinLnBrk="0" hangingPunct="1">
+                        <a:lnSpc>
+                          <a:spcPct val="100000"/>
+                        </a:lnSpc>
+                        <a:spcBef>
+                          <a:spcPct val="20000"/>
+                        </a:spcBef>
+                        <a:spcAft>
+                          <a:spcPct val="0"/>
+                        </a:spcAft>
+                        <a:buClrTx/>
+                        <a:buSzTx/>
+                        <a:buFontTx/>
+                        <a:buNone/>
+                        <a:tabLst/>
+                        <a:defRPr/>
+                      </a:pPr>
                       <a:r>
                         <a:rPr kumimoji="0" lang="en-US" sz="2400" b="0" i="0" u="none" strike="noStrike" kern="0" cap="none" normalizeH="0" baseline="0" dirty="0" smtClean="0">
                           <a:ln>
@@ -5577,7 +5846,35 @@
                           <a:latin typeface="Arial" pitchFamily="34" charset="0"/>
                           <a:cs typeface="Arial" pitchFamily="34" charset="0"/>
                         </a:rPr>
-                        <a:t>The toolset is common to both the SNS and ISIS. Results of analysis TOPAZ data from part of our automated test suite. </a:t>
+                        <a:t>The toolset is common to both the SNS and ISIS. Results of analysis TOPAZ data </a:t>
+                      </a:r>
+                      <a:r>
+                        <a:rPr kumimoji="0" lang="en-US" sz="2400" b="0" i="0" u="none" strike="noStrike" kern="0" cap="none" normalizeH="0" baseline="0" dirty="0" smtClean="0">
+                          <a:ln>
+                            <a:noFill/>
+                          </a:ln>
+                          <a:solidFill>
+                            <a:schemeClr val="tx1"/>
+                          </a:solidFill>
+                          <a:effectLst/>
+                          <a:latin typeface="Arial" pitchFamily="34" charset="0"/>
+                          <a:cs typeface="Arial" pitchFamily="34" charset="0"/>
+                        </a:rPr>
+                        <a:t>form </a:t>
+                      </a:r>
+                      <a:r>
+                        <a:rPr kumimoji="0" lang="en-US" sz="2400" b="0" i="0" u="none" strike="noStrike" kern="0" cap="none" normalizeH="0" baseline="0" dirty="0" smtClean="0">
+                          <a:ln>
+                            <a:noFill/>
+                          </a:ln>
+                          <a:solidFill>
+                            <a:schemeClr val="tx1"/>
+                          </a:solidFill>
+                          <a:effectLst/>
+                          <a:latin typeface="Arial" pitchFamily="34" charset="0"/>
+                          <a:cs typeface="Arial" pitchFamily="34" charset="0"/>
+                        </a:rPr>
+                        <a:t>part of our automated test suite. </a:t>
                       </a:r>
                     </a:p>
                     <a:p>
@@ -5666,8 +5963,8 @@
                           <a:schemeClr val="tx1"/>
                         </a:solidFill>
                         <a:effectLst/>
-                        <a:latin typeface="Arial" pitchFamily="34" charset="0"/>
-                        <a:cs typeface="Arial" pitchFamily="34" charset="0"/>
+                        <a:latin typeface="Arial"/>
+                        <a:cs typeface="Arial"/>
                       </a:endParaRPr>
                     </a:p>
                     <a:p>
@@ -5696,8 +5993,8 @@
                           <a:schemeClr val="tx1"/>
                         </a:solidFill>
                         <a:effectLst/>
-                        <a:latin typeface="Arial" pitchFamily="34" charset="0"/>
-                        <a:cs typeface="Arial" pitchFamily="34" charset="0"/>
+                        <a:latin typeface="Arial"/>
+                        <a:cs typeface="Arial"/>
                       </a:endParaRPr>
                     </a:p>
                     <a:p>
@@ -5726,8 +6023,8 @@
                           <a:schemeClr val="tx1"/>
                         </a:solidFill>
                         <a:effectLst/>
-                        <a:latin typeface="Arial" pitchFamily="34" charset="0"/>
-                        <a:cs typeface="Arial" pitchFamily="34" charset="0"/>
+                        <a:latin typeface="Arial"/>
+                        <a:cs typeface="Arial"/>
                       </a:endParaRPr>
                     </a:p>
                     <a:p>
@@ -5756,8 +6053,8 @@
                           <a:schemeClr val="tx1"/>
                         </a:solidFill>
                         <a:effectLst/>
-                        <a:latin typeface="Arial" pitchFamily="34" charset="0"/>
-                        <a:cs typeface="Arial" pitchFamily="34" charset="0"/>
+                        <a:latin typeface="Arial"/>
+                        <a:cs typeface="Arial"/>
                       </a:endParaRPr>
                     </a:p>
                     <a:p>
@@ -5786,8 +6083,8 @@
                           <a:schemeClr val="tx1"/>
                         </a:solidFill>
                         <a:effectLst/>
-                        <a:latin typeface="Arial" pitchFamily="34" charset="0"/>
-                        <a:cs typeface="Arial" pitchFamily="34" charset="0"/>
+                        <a:latin typeface="Arial"/>
+                        <a:cs typeface="Arial"/>
                       </a:endParaRPr>
                     </a:p>
                     <a:p>
@@ -5816,8 +6113,8 @@
                           <a:schemeClr val="tx1"/>
                         </a:solidFill>
                         <a:effectLst/>
-                        <a:latin typeface="Arial" pitchFamily="34" charset="0"/>
-                        <a:cs typeface="Arial" pitchFamily="34" charset="0"/>
+                        <a:latin typeface="Arial"/>
+                        <a:cs typeface="Arial"/>
                       </a:endParaRPr>
                     </a:p>
                     <a:p>
@@ -5846,8 +6143,8 @@
                           <a:schemeClr val="tx1"/>
                         </a:solidFill>
                         <a:effectLst/>
-                        <a:latin typeface="Arial" pitchFamily="34" charset="0"/>
-                        <a:cs typeface="Arial" pitchFamily="34" charset="0"/>
+                        <a:latin typeface="Arial"/>
+                        <a:cs typeface="Arial"/>
                       </a:endParaRPr>
                     </a:p>
                     <a:p>
@@ -5876,8 +6173,8 @@
                           <a:schemeClr val="tx1"/>
                         </a:solidFill>
                         <a:effectLst/>
-                        <a:latin typeface="Arial" pitchFamily="34" charset="0"/>
-                        <a:cs typeface="Arial" pitchFamily="34" charset="0"/>
+                        <a:latin typeface="Arial"/>
+                        <a:cs typeface="Arial"/>
                       </a:endParaRPr>
                     </a:p>
                     <a:p>
@@ -5898,6 +6195,235 @@
                         <a:tabLst/>
                         <a:defRPr/>
                       </a:pPr>
+                      <a:r>
+                        <a:rPr kumimoji="0" lang="en-US" sz="2400" b="0" i="1" u="none" strike="noStrike" kern="0" cap="none" normalizeH="0" baseline="0" dirty="0" smtClean="0">
+                          <a:ln>
+                            <a:noFill/>
+                          </a:ln>
+                          <a:solidFill>
+                            <a:schemeClr val="tx1"/>
+                          </a:solidFill>
+                          <a:effectLst/>
+                          <a:latin typeface="Arial"/>
+                          <a:cs typeface="Arial"/>
+                        </a:rPr>
+                        <a:t>Orthogonal HKL visualization of </a:t>
+                      </a:r>
+                      <a:r>
+                        <a:rPr kumimoji="0" lang="en-US" sz="2400" b="0" i="1" u="none" strike="noStrike" kern="0" cap="none" normalizeH="0" baseline="0" dirty="0" err="1" smtClean="0">
+                          <a:ln>
+                            <a:noFill/>
+                          </a:ln>
+                          <a:solidFill>
+                            <a:schemeClr val="tx1"/>
+                          </a:solidFill>
+                          <a:effectLst/>
+                          <a:latin typeface="Arial"/>
+                          <a:cs typeface="Arial"/>
+                        </a:rPr>
+                        <a:t>Triphylite</a:t>
+                      </a:r>
+                      <a:r>
+                        <a:rPr kumimoji="0" lang="en-US" sz="2400" b="0" i="1" u="none" strike="noStrike" kern="0" cap="none" normalizeH="0" baseline="0" dirty="0" smtClean="0">
+                          <a:ln>
+                            <a:noFill/>
+                          </a:ln>
+                          <a:solidFill>
+                            <a:schemeClr val="tx1"/>
+                          </a:solidFill>
+                          <a:effectLst/>
+                          <a:latin typeface="Arial"/>
+                          <a:cs typeface="Arial"/>
+                        </a:rPr>
+                        <a:t> Crystal analyzed on TOPAZ. Visualization using a 3-slice mode on the VATES Simple Interface.</a:t>
+                      </a:r>
+                    </a:p>
+                    <a:p>
+                      <a:pPr marL="0" marR="0" lvl="0" indent="0" algn="l" defTabSz="4173538" rtl="0" eaLnBrk="1" fontAlgn="base" latinLnBrk="0" hangingPunct="1">
+                        <a:lnSpc>
+                          <a:spcPct val="100000"/>
+                        </a:lnSpc>
+                        <a:spcBef>
+                          <a:spcPct val="20000"/>
+                        </a:spcBef>
+                        <a:spcAft>
+                          <a:spcPct val="0"/>
+                        </a:spcAft>
+                        <a:buClrTx/>
+                        <a:buSzTx/>
+                        <a:buFontTx/>
+                        <a:buNone/>
+                        <a:tabLst/>
+                        <a:defRPr/>
+                      </a:pPr>
+                      <a:r>
+                        <a:rPr kumimoji="0" lang="en-US" sz="5000" b="0" i="0" u="none" strike="noStrike" kern="0" cap="none" normalizeH="0" baseline="0" dirty="0" smtClean="0">
+                          <a:ln>
+                            <a:noFill/>
+                          </a:ln>
+                          <a:solidFill>
+                            <a:srgbClr val="002D55"/>
+                          </a:solidFill>
+                          <a:effectLst/>
+                          <a:latin typeface="+mj-lt"/>
+                          <a:cs typeface="Arial" pitchFamily="34" charset="0"/>
+                        </a:rPr>
+                        <a:t>Inelastic Workflows</a:t>
+                      </a:r>
+                    </a:p>
+                    <a:p>
+                      <a:pPr marL="0" marR="0" lvl="0" indent="0" algn="l" defTabSz="4173538" rtl="0" eaLnBrk="1" fontAlgn="base" latinLnBrk="0" hangingPunct="1">
+                        <a:lnSpc>
+                          <a:spcPct val="100000"/>
+                        </a:lnSpc>
+                        <a:spcBef>
+                          <a:spcPct val="20000"/>
+                        </a:spcBef>
+                        <a:spcAft>
+                          <a:spcPct val="0"/>
+                        </a:spcAft>
+                        <a:buClrTx/>
+                        <a:buSzTx/>
+                        <a:buFontTx/>
+                        <a:buNone/>
+                        <a:tabLst/>
+                        <a:defRPr/>
+                      </a:pPr>
+                      <a:r>
+                        <a:rPr kumimoji="0" lang="en-US" sz="2400" b="0" i="0" u="none" strike="noStrike" kern="0" cap="none" normalizeH="0" baseline="0" dirty="0" smtClean="0">
+                          <a:ln>
+                            <a:noFill/>
+                          </a:ln>
+                          <a:solidFill>
+                            <a:schemeClr val="tx1"/>
+                          </a:solidFill>
+                          <a:effectLst/>
+                          <a:latin typeface="Arial"/>
+                          <a:cs typeface="Arial"/>
+                        </a:rPr>
+                        <a:t>The inelastic workflows have hinged on the ability to represent  n-dimensional data.</a:t>
+                      </a:r>
+                      <a:r>
+                        <a:rPr lang="en-US" sz="2400" kern="1200" dirty="0" smtClean="0">
+                          <a:solidFill>
+                            <a:schemeClr val="tx1"/>
+                          </a:solidFill>
+                          <a:latin typeface="Arial"/>
+                          <a:ea typeface="+mn-ea"/>
+                          <a:cs typeface="Arial"/>
+                        </a:rPr>
+                        <a:t> The inelastic analysis workflow begins by taking raw data, S(phi, TOF) and converting it into S(phi, E) using a standard methodology implemented in the </a:t>
+                      </a:r>
+                      <a:r>
+                        <a:rPr lang="en-US" sz="2400" kern="1200" dirty="0" err="1" smtClean="0">
+                          <a:solidFill>
+                            <a:schemeClr val="tx1"/>
+                          </a:solidFill>
+                          <a:latin typeface="Arial"/>
+                          <a:ea typeface="+mn-ea"/>
+                          <a:cs typeface="Arial"/>
+                        </a:rPr>
+                        <a:t>Mantid</a:t>
+                      </a:r>
+                      <a:r>
+                        <a:rPr lang="en-US" sz="2400" kern="1200" dirty="0" smtClean="0">
+                          <a:solidFill>
+                            <a:schemeClr val="tx1"/>
+                          </a:solidFill>
+                          <a:latin typeface="Arial"/>
+                          <a:ea typeface="+mn-ea"/>
+                          <a:cs typeface="Arial"/>
+                        </a:rPr>
+                        <a:t> code base. Once the inelastic data is reduced to S(phi, E), it is necessary to convert the data to other coordinates for analysis. Typical examples are S(Q, E), S(</a:t>
+                      </a:r>
+                      <a:r>
+                        <a:rPr lang="en-US" sz="2400" b="1" kern="1200" dirty="0" smtClean="0">
+                          <a:solidFill>
+                            <a:schemeClr val="tx1"/>
+                          </a:solidFill>
+                          <a:latin typeface="Arial"/>
+                          <a:ea typeface="+mn-ea"/>
+                          <a:cs typeface="Arial"/>
+                        </a:rPr>
+                        <a:t>Q</a:t>
+                      </a:r>
+                      <a:r>
+                        <a:rPr lang="en-US" sz="2400" b="0" kern="1200" dirty="0" smtClean="0">
+                          <a:solidFill>
+                            <a:schemeClr val="tx1"/>
+                          </a:solidFill>
+                          <a:latin typeface="Arial"/>
+                          <a:ea typeface="+mn-ea"/>
+                          <a:cs typeface="Arial"/>
+                        </a:rPr>
+                        <a:t>, E) or S(H, K, L, E). The VATES project provides a single conversion function that can handle these transformations as well as providing the capability for other multidimensional transformations. Transformations along different viewing axes are easily handled by this function. In a typical workflow, the converted data is placed on a regular grid for further analysis. This binning capability is again provided by the VATES project and allows for both axis-aligned and non-axis aligned binning. The binning capability is used to produce the desired cuts (1D) and slices (2D) from the data. Visualization for cuts and slices are provided by the </a:t>
+                      </a:r>
+                      <a:r>
+                        <a:rPr lang="en-US" sz="2400" b="0" kern="1200" dirty="0" err="1" smtClean="0">
+                          <a:solidFill>
+                            <a:schemeClr val="tx1"/>
+                          </a:solidFill>
+                          <a:latin typeface="Arial"/>
+                          <a:ea typeface="+mn-ea"/>
+                          <a:cs typeface="Arial"/>
+                        </a:rPr>
+                        <a:t>SliceViewer</a:t>
+                      </a:r>
+                      <a:r>
+                        <a:rPr lang="en-US" sz="2400" b="0" kern="1200" dirty="0" smtClean="0">
+                          <a:solidFill>
+                            <a:schemeClr val="tx1"/>
+                          </a:solidFill>
+                          <a:latin typeface="Arial"/>
+                          <a:ea typeface="+mn-ea"/>
+                          <a:cs typeface="Arial"/>
+                        </a:rPr>
+                        <a:t> from the VATES project. The </a:t>
+                      </a:r>
+                      <a:r>
+                        <a:rPr lang="en-US" sz="2400" b="0" kern="1200" dirty="0" err="1" smtClean="0">
+                          <a:solidFill>
+                            <a:schemeClr val="tx1"/>
+                          </a:solidFill>
+                          <a:latin typeface="Arial"/>
+                          <a:ea typeface="+mn-ea"/>
+                          <a:cs typeface="Arial"/>
+                        </a:rPr>
+                        <a:t>SliceViewer</a:t>
+                      </a:r>
+                      <a:r>
+                        <a:rPr lang="en-US" sz="2400" b="0" kern="1200" dirty="0" smtClean="0">
+                          <a:solidFill>
+                            <a:schemeClr val="tx1"/>
+                          </a:solidFill>
+                          <a:latin typeface="Arial"/>
+                          <a:ea typeface="+mn-ea"/>
+                          <a:cs typeface="Arial"/>
+                        </a:rPr>
+                        <a:t> allows for easy exploration of the data looking for interesting cuts and/or slices for further analysis. The VATES Simple Interface (VSI) extends this capability to 3D and 4D views of the data. The VSI can be used to browse the data in higher dimensionality, but provides a mechanism for pulling up interesting views in the </a:t>
+                      </a:r>
+                      <a:r>
+                        <a:rPr lang="en-US" sz="2400" b="0" kern="1200" dirty="0" err="1" smtClean="0">
+                          <a:solidFill>
+                            <a:schemeClr val="tx1"/>
+                          </a:solidFill>
+                          <a:latin typeface="Arial"/>
+                          <a:ea typeface="+mn-ea"/>
+                          <a:cs typeface="Arial"/>
+                        </a:rPr>
+                        <a:t>SliceView</a:t>
+                      </a:r>
+                      <a:r>
+                        <a:rPr lang="en-US" sz="2400" b="0" kern="1200" dirty="0" smtClean="0">
+                          <a:solidFill>
+                            <a:schemeClr val="tx1"/>
+                          </a:solidFill>
+                          <a:latin typeface="Arial"/>
+                          <a:ea typeface="+mn-ea"/>
+                          <a:cs typeface="Arial"/>
+                        </a:rPr>
+                        <a:t> for more detailed study. The cuts and slices can then be fit to the various physical models to extract analytical values for the phenomenon under study.</a:t>
+                      </a:r>
                       <a:endParaRPr kumimoji="0" lang="en-US" sz="2400" b="0" i="0" u="none" strike="noStrike" kern="0" cap="none" normalizeH="0" baseline="0" dirty="0" smtClean="0">
                         <a:ln>
                           <a:noFill/>
@@ -5906,192 +6432,9 @@
                           <a:schemeClr val="tx1"/>
                         </a:solidFill>
                         <a:effectLst/>
-                        <a:latin typeface="Arial" pitchFamily="34" charset="0"/>
-                        <a:cs typeface="Arial" pitchFamily="34" charset="0"/>
-                      </a:endParaRPr>
-                    </a:p>
-                    <a:p>
-                      <a:pPr marL="0" marR="0" lvl="0" indent="0" algn="l" defTabSz="4173538" rtl="0" eaLnBrk="1" fontAlgn="base" latinLnBrk="0" hangingPunct="1">
-                        <a:lnSpc>
-                          <a:spcPct val="100000"/>
-                        </a:lnSpc>
-                        <a:spcBef>
-                          <a:spcPct val="20000"/>
-                        </a:spcBef>
-                        <a:spcAft>
-                          <a:spcPct val="0"/>
-                        </a:spcAft>
-                        <a:buClrTx/>
-                        <a:buSzTx/>
-                        <a:buFontTx/>
-                        <a:buNone/>
-                        <a:tabLst/>
-                        <a:defRPr/>
-                      </a:pPr>
-                      <a:r>
-                        <a:rPr kumimoji="0" lang="en-US" sz="2400" b="0" i="0" u="none" strike="noStrike" kern="0" cap="none" normalizeH="0" baseline="0" dirty="0" smtClean="0">
-                          <a:ln>
-                            <a:noFill/>
-                          </a:ln>
-                          <a:solidFill>
-                            <a:schemeClr val="tx1"/>
-                          </a:solidFill>
-                          <a:effectLst/>
-                          <a:latin typeface="Arial"/>
-                          <a:cs typeface="Arial"/>
-                        </a:rPr>
-                        <a:t>Orthogonal HKL visualization of </a:t>
-                      </a:r>
-                      <a:r>
-                        <a:rPr kumimoji="0" lang="en-US" sz="2400" b="0" i="0" u="none" strike="noStrike" kern="0" cap="none" normalizeH="0" baseline="0" dirty="0" err="1" smtClean="0">
-                          <a:ln>
-                            <a:noFill/>
-                          </a:ln>
-                          <a:solidFill>
-                            <a:schemeClr val="tx1"/>
-                          </a:solidFill>
-                          <a:effectLst/>
-                          <a:latin typeface="Arial"/>
-                          <a:cs typeface="Arial"/>
-                        </a:rPr>
-                        <a:t>Triphylite</a:t>
-                      </a:r>
-                      <a:r>
-                        <a:rPr kumimoji="0" lang="en-US" sz="2400" b="0" i="0" u="none" strike="noStrike" kern="0" cap="none" normalizeH="0" baseline="0" dirty="0" smtClean="0">
-                          <a:ln>
-                            <a:noFill/>
-                          </a:ln>
-                          <a:solidFill>
-                            <a:schemeClr val="tx1"/>
-                          </a:solidFill>
-                          <a:effectLst/>
-                          <a:latin typeface="Arial"/>
-                          <a:cs typeface="Arial"/>
-                        </a:rPr>
-                        <a:t> Crystal analyzed on TOPAZ. </a:t>
-                      </a:r>
-                      <a:r>
-                        <a:rPr kumimoji="0" lang="en-US" sz="2400" b="0" i="0" u="none" strike="noStrike" kern="0" cap="none" normalizeH="0" baseline="0" dirty="0" err="1" smtClean="0">
-                          <a:ln>
-                            <a:noFill/>
-                          </a:ln>
-                          <a:solidFill>
-                            <a:schemeClr val="tx1"/>
-                          </a:solidFill>
-                          <a:effectLst/>
-                          <a:latin typeface="Arial"/>
-                          <a:cs typeface="Arial"/>
-                        </a:rPr>
-                        <a:t>Visualation</a:t>
-                      </a:r>
-                      <a:r>
-                        <a:rPr kumimoji="0" lang="en-US" sz="2400" b="0" i="0" u="none" strike="noStrike" kern="0" cap="none" normalizeH="0" baseline="0" dirty="0" smtClean="0">
-                          <a:ln>
-                            <a:noFill/>
-                          </a:ln>
-                          <a:solidFill>
-                            <a:schemeClr val="tx1"/>
-                          </a:solidFill>
-                          <a:effectLst/>
-                          <a:latin typeface="Arial"/>
-                          <a:cs typeface="Arial"/>
-                        </a:rPr>
-                        <a:t> using a 3-slice mode on the </a:t>
-                      </a:r>
-                      <a:r>
-                        <a:rPr kumimoji="0" lang="en-US" sz="2400" b="0" i="0" u="none" strike="noStrike" kern="0" cap="none" normalizeH="0" baseline="0" dirty="0" err="1" smtClean="0">
-                          <a:ln>
-                            <a:noFill/>
-                          </a:ln>
-                          <a:solidFill>
-                            <a:schemeClr val="tx1"/>
-                          </a:solidFill>
-                          <a:effectLst/>
-                          <a:latin typeface="Arial"/>
-                          <a:cs typeface="Arial"/>
-                        </a:rPr>
-                        <a:t>Vates</a:t>
-                      </a:r>
-                      <a:r>
-                        <a:rPr kumimoji="0" lang="en-US" sz="2400" b="0" i="0" u="none" strike="noStrike" kern="0" cap="none" normalizeH="0" baseline="0" dirty="0" smtClean="0">
-                          <a:ln>
-                            <a:noFill/>
-                          </a:ln>
-                          <a:solidFill>
-                            <a:schemeClr val="tx1"/>
-                          </a:solidFill>
-                          <a:effectLst/>
-                          <a:latin typeface="Arial"/>
-                          <a:cs typeface="Arial"/>
-                        </a:rPr>
-                        <a:t> Simple Interface.</a:t>
-                      </a:r>
-                    </a:p>
-                    <a:p>
-                      <a:pPr marL="0" marR="0" lvl="0" indent="0" algn="l" defTabSz="4173538" rtl="0" eaLnBrk="1" fontAlgn="base" latinLnBrk="0" hangingPunct="1">
-                        <a:lnSpc>
-                          <a:spcPct val="100000"/>
-                        </a:lnSpc>
-                        <a:spcBef>
-                          <a:spcPct val="20000"/>
-                        </a:spcBef>
-                        <a:spcAft>
-                          <a:spcPct val="0"/>
-                        </a:spcAft>
-                        <a:buClrTx/>
-                        <a:buSzTx/>
-                        <a:buFontTx/>
-                        <a:buNone/>
-                        <a:tabLst/>
-                        <a:defRPr/>
-                      </a:pPr>
-                      <a:r>
-                        <a:rPr kumimoji="0" lang="en-US" sz="5000" b="0" i="0" u="none" strike="noStrike" kern="0" cap="none" normalizeH="0" baseline="0" dirty="0" smtClean="0">
-                          <a:ln>
-                            <a:noFill/>
-                          </a:ln>
-                          <a:solidFill>
-                            <a:schemeClr val="tx1"/>
-                          </a:solidFill>
-                          <a:effectLst/>
-                          <a:latin typeface="+mj-lt"/>
-                          <a:cs typeface="Arial" pitchFamily="34" charset="0"/>
-                        </a:rPr>
-                        <a:t>Direct Inelastic</a:t>
-                      </a:r>
-                    </a:p>
-                    <a:p>
-                      <a:pPr marL="0" marR="0" lvl="0" indent="0" algn="l" defTabSz="4173538" rtl="0" eaLnBrk="1" fontAlgn="base" latinLnBrk="0" hangingPunct="1">
-                        <a:lnSpc>
-                          <a:spcPct val="100000"/>
-                        </a:lnSpc>
-                        <a:spcBef>
-                          <a:spcPct val="20000"/>
-                        </a:spcBef>
-                        <a:spcAft>
-                          <a:spcPct val="0"/>
-                        </a:spcAft>
-                        <a:buClrTx/>
-                        <a:buSzTx/>
-                        <a:buFontTx/>
-                        <a:buNone/>
-                        <a:tabLst/>
-                        <a:defRPr/>
-                      </a:pPr>
-                      <a:r>
-                        <a:rPr kumimoji="0" lang="en-US" sz="2400" b="0" i="0" u="none" strike="noStrike" kern="0" cap="none" normalizeH="0" baseline="0" dirty="0" smtClean="0">
-                          <a:ln>
-                            <a:noFill/>
-                          </a:ln>
-                          <a:solidFill>
-                            <a:schemeClr val="tx1"/>
-                          </a:solidFill>
-                          <a:effectLst/>
-                          <a:latin typeface="Arial"/>
-                          <a:cs typeface="Arial"/>
-                        </a:rPr>
-                        <a:t>The inelastic workflows have hinged on the ability to represent  n-dimensional data.</a:t>
-                      </a:r>
+                        <a:latin typeface="Arial"/>
+                        <a:cs typeface="Arial"/>
+                      </a:endParaRPr>
                     </a:p>
                     <a:p>
                       <a:pPr marL="0" marR="0" lvl="0" indent="0" algn="l" defTabSz="4173538" rtl="0" eaLnBrk="1" fontAlgn="base" latinLnBrk="0" hangingPunct="1">
@@ -6141,158 +6484,6 @@
                         <a:tabLst/>
                         <a:defRPr/>
                       </a:pPr>
-                      <a:r>
-                        <a:rPr kumimoji="0" lang="en-US" sz="2400" b="0" i="0" u="none" strike="noStrike" kern="0" cap="none" normalizeH="0" baseline="0" dirty="0" smtClean="0">
-                          <a:ln>
-                            <a:noFill/>
-                          </a:ln>
-                          <a:solidFill>
-                            <a:schemeClr val="tx1"/>
-                          </a:solidFill>
-                          <a:effectLst/>
-                          <a:latin typeface="Arial"/>
-                          <a:cs typeface="Arial"/>
-                        </a:rPr>
-                        <a:t>Combination of n-dimensional across many runs leads to massive data volumes, so both algorithm performance, and data compression issues have been critical. </a:t>
-                      </a:r>
-                    </a:p>
-                    <a:p>
-                      <a:pPr marL="0" marR="0" lvl="0" indent="0" algn="l" defTabSz="4173538" rtl="0" eaLnBrk="1" fontAlgn="base" latinLnBrk="0" hangingPunct="1">
-                        <a:lnSpc>
-                          <a:spcPct val="100000"/>
-                        </a:lnSpc>
-                        <a:spcBef>
-                          <a:spcPct val="20000"/>
-                        </a:spcBef>
-                        <a:spcAft>
-                          <a:spcPct val="0"/>
-                        </a:spcAft>
-                        <a:buClrTx/>
-                        <a:buSzTx/>
-                        <a:buFontTx/>
-                        <a:buNone/>
-                        <a:tabLst/>
-                        <a:defRPr/>
-                      </a:pPr>
-                      <a:endParaRPr kumimoji="0" lang="en-US" sz="2400" b="0" i="0" u="none" strike="noStrike" kern="0" cap="none" normalizeH="0" baseline="0" dirty="0" smtClean="0">
-                        <a:ln>
-                          <a:noFill/>
-                        </a:ln>
-                        <a:solidFill>
-                          <a:schemeClr val="tx1"/>
-                        </a:solidFill>
-                        <a:effectLst/>
-                        <a:latin typeface="Arial"/>
-                        <a:cs typeface="Arial"/>
-                      </a:endParaRPr>
-                    </a:p>
-                    <a:p>
-                      <a:pPr marL="0" marR="0" lvl="0" indent="0" algn="l" defTabSz="4173538" rtl="0" eaLnBrk="1" fontAlgn="base" latinLnBrk="0" hangingPunct="1">
-                        <a:lnSpc>
-                          <a:spcPct val="100000"/>
-                        </a:lnSpc>
-                        <a:spcBef>
-                          <a:spcPct val="20000"/>
-                        </a:spcBef>
-                        <a:spcAft>
-                          <a:spcPct val="0"/>
-                        </a:spcAft>
-                        <a:buClrTx/>
-                        <a:buSzTx/>
-                        <a:buFontTx/>
-                        <a:buNone/>
-                        <a:tabLst/>
-                        <a:defRPr/>
-                      </a:pPr>
-                      <a:r>
-                        <a:rPr kumimoji="0" lang="en-US" sz="2400" b="0" i="0" u="none" strike="noStrike" kern="0" cap="none" normalizeH="0" baseline="0" dirty="0" smtClean="0">
-                          <a:ln>
-                            <a:noFill/>
-                          </a:ln>
-                          <a:solidFill>
-                            <a:schemeClr val="tx1"/>
-                          </a:solidFill>
-                          <a:effectLst/>
-                          <a:latin typeface="Arial"/>
-                          <a:cs typeface="Arial"/>
-                        </a:rPr>
-                        <a:t>We have spent several years collaborating with </a:t>
-                      </a:r>
-                      <a:r>
-                        <a:rPr kumimoji="0" lang="en-US" sz="2400" b="0" i="0" u="none" strike="noStrike" kern="0" cap="none" normalizeH="0" baseline="0" dirty="0" err="1" smtClean="0">
-                          <a:ln>
-                            <a:noFill/>
-                          </a:ln>
-                          <a:solidFill>
-                            <a:schemeClr val="tx1"/>
-                          </a:solidFill>
-                          <a:effectLst/>
-                          <a:latin typeface="Arial"/>
-                          <a:cs typeface="Arial"/>
-                        </a:rPr>
-                        <a:t>Kitware</a:t>
-                      </a:r>
-                      <a:r>
-                        <a:rPr kumimoji="0" lang="en-US" sz="2400" b="0" i="0" u="none" strike="noStrike" kern="0" cap="none" normalizeH="0" baseline="0" dirty="0" smtClean="0">
-                          <a:ln>
-                            <a:noFill/>
-                          </a:ln>
-                          <a:solidFill>
-                            <a:schemeClr val="tx1"/>
-                          </a:solidFill>
-                          <a:effectLst/>
-                          <a:latin typeface="Arial"/>
-                          <a:cs typeface="Arial"/>
-                        </a:rPr>
-                        <a:t>, to generalize their 3D </a:t>
-                      </a:r>
-                      <a:r>
-                        <a:rPr kumimoji="0" lang="en-US" sz="2400" b="0" i="0" u="none" strike="noStrike" kern="0" cap="none" normalizeH="0" baseline="0" dirty="0" err="1" smtClean="0">
-                          <a:ln>
-                            <a:noFill/>
-                          </a:ln>
-                          <a:solidFill>
-                            <a:schemeClr val="tx1"/>
-                          </a:solidFill>
-                          <a:effectLst/>
-                          <a:latin typeface="Arial"/>
-                          <a:cs typeface="Arial"/>
-                        </a:rPr>
-                        <a:t>visualisation</a:t>
-                      </a:r>
-                      <a:r>
-                        <a:rPr kumimoji="0" lang="en-US" sz="2400" b="0" i="0" u="none" strike="noStrike" kern="0" cap="none" normalizeH="0" baseline="0" dirty="0" smtClean="0">
-                          <a:ln>
-                            <a:noFill/>
-                          </a:ln>
-                          <a:solidFill>
-                            <a:schemeClr val="tx1"/>
-                          </a:solidFill>
-                          <a:effectLst/>
-                          <a:latin typeface="Arial"/>
-                          <a:cs typeface="Arial"/>
-                        </a:rPr>
-                        <a:t> tools. Three (plus) dimensional data can now be properly represented in our visualization tools </a:t>
-                      </a:r>
-                    </a:p>
-                    <a:p>
-                      <a:pPr marL="0" marR="0" lvl="0" indent="0" algn="l" defTabSz="4173538" rtl="0" eaLnBrk="1" fontAlgn="base" latinLnBrk="0" hangingPunct="1">
-                        <a:lnSpc>
-                          <a:spcPct val="100000"/>
-                        </a:lnSpc>
-                        <a:spcBef>
-                          <a:spcPct val="20000"/>
-                        </a:spcBef>
-                        <a:spcAft>
-                          <a:spcPct val="0"/>
-                        </a:spcAft>
-                        <a:buClrTx/>
-                        <a:buSzTx/>
-                        <a:buFontTx/>
-                        <a:buNone/>
-                        <a:tabLst/>
-                        <a:defRPr/>
-                      </a:pPr>
                       <a:endParaRPr kumimoji="0" lang="en-US" sz="5000" b="0" i="0" u="none" strike="noStrike" kern="0" cap="none" normalizeH="0" baseline="0" dirty="0" smtClean="0">
                         <a:ln>
                           <a:noFill/>
@@ -6534,7 +6725,7 @@
                         <a:defRPr/>
                       </a:pPr>
                       <a:r>
-                        <a:rPr kumimoji="0" lang="en-US" sz="2400" b="0" i="0" u="none" strike="noStrike" kern="0" cap="none" normalizeH="0" baseline="0" dirty="0" smtClean="0">
+                        <a:rPr kumimoji="0" lang="en-US" sz="2400" b="0" i="1" u="none" strike="noStrike" kern="0" cap="none" normalizeH="0" baseline="0" dirty="0" smtClean="0">
                           <a:ln>
                             <a:noFill/>
                           </a:ln>
@@ -6548,7 +6739,7 @@
                         <a:t>A non-orthogonal 3D projection of Spin Waves in </a:t>
                       </a:r>
                       <a:r>
-                        <a:rPr kumimoji="0" lang="en-US" sz="2400" b="0" i="0" u="none" strike="noStrike" kern="0" cap="none" normalizeH="0" baseline="0" dirty="0" err="1" smtClean="0">
+                        <a:rPr kumimoji="0" lang="en-US" sz="2400" b="0" i="1" u="none" strike="noStrike" kern="0" cap="none" normalizeH="0" baseline="0" dirty="0" err="1" smtClean="0">
                           <a:ln>
                             <a:noFill/>
                           </a:ln>
@@ -6562,7 +6753,7 @@
                         <a:t>Gd</a:t>
                       </a:r>
                       <a:r>
-                        <a:rPr kumimoji="0" lang="en-US" sz="2400" b="0" i="0" u="none" strike="noStrike" kern="0" cap="none" normalizeH="0" baseline="0" dirty="0" smtClean="0">
+                        <a:rPr kumimoji="0" lang="en-US" sz="2400" b="0" i="1" u="none" strike="noStrike" kern="0" cap="none" normalizeH="0" baseline="0" dirty="0" smtClean="0">
                           <a:ln>
                             <a:noFill/>
                           </a:ln>
@@ -7016,7 +7207,7 @@
                         <a:defRPr/>
                       </a:pPr>
                       <a:r>
-                        <a:rPr lang="en-GB" sz="2400" kern="1200" dirty="0" smtClean="0">
+                        <a:rPr lang="en-GB" sz="2400" i="1" kern="1200" dirty="0" smtClean="0">
                           <a:solidFill>
                             <a:schemeClr val="tx1"/>
                           </a:solidFill>
@@ -7028,7 +7219,7 @@
                         <a:t>Simulation of MERLIN instrument resolution convolved with a Strontrium122 foreground model using </a:t>
                       </a:r>
                       <a:r>
-                        <a:rPr lang="en-GB" sz="2400" kern="1200" dirty="0" err="1" smtClean="0">
+                        <a:rPr lang="en-GB" sz="2400" i="1" kern="1200" dirty="0" err="1" smtClean="0">
                           <a:solidFill>
                             <a:schemeClr val="tx1"/>
                           </a:solidFill>
@@ -7040,7 +7231,7 @@
                         <a:t>Mantid</a:t>
                       </a:r>
                       <a:r>
-                        <a:rPr lang="en-GB" sz="2400" kern="1200" dirty="0" smtClean="0">
+                        <a:rPr lang="en-GB" sz="2400" i="1" kern="1200" dirty="0" smtClean="0">
                           <a:solidFill>
                             <a:schemeClr val="tx1"/>
                           </a:solidFill>
@@ -7052,7 +7243,7 @@
                         <a:t>. Visualised using</a:t>
                       </a:r>
                       <a:r>
-                        <a:rPr lang="en-GB" sz="2400" kern="1200" baseline="0" dirty="0" smtClean="0">
+                        <a:rPr lang="en-GB" sz="2400" i="1" kern="1200" baseline="0" dirty="0" smtClean="0">
                           <a:solidFill>
                             <a:schemeClr val="tx1"/>
                           </a:solidFill>
@@ -7064,7 +7255,7 @@
                         <a:t> our </a:t>
                       </a:r>
                       <a:r>
-                        <a:rPr lang="en-GB" sz="2400" kern="1200" baseline="0" dirty="0" err="1" smtClean="0">
+                        <a:rPr lang="en-GB" sz="2400" i="1" kern="1200" baseline="0" dirty="0" err="1" smtClean="0">
                           <a:solidFill>
                             <a:schemeClr val="tx1"/>
                           </a:solidFill>
@@ -7076,7 +7267,7 @@
                         <a:t>ParaView</a:t>
                       </a:r>
                       <a:r>
-                        <a:rPr lang="en-GB" sz="2400" kern="1200" baseline="0" dirty="0" smtClean="0">
+                        <a:rPr lang="en-GB" sz="2400" i="1" kern="1200" baseline="0" dirty="0" smtClean="0">
                           <a:solidFill>
                             <a:schemeClr val="tx1"/>
                           </a:solidFill>
@@ -7088,7 +7279,7 @@
                         <a:t> plugins combining </a:t>
                       </a:r>
                       <a:r>
-                        <a:rPr lang="en-GB" sz="2400" kern="1200" baseline="0" dirty="0" err="1" smtClean="0">
+                        <a:rPr lang="en-GB" sz="2400" i="1" kern="1200" baseline="0" dirty="0" err="1" smtClean="0">
                           <a:solidFill>
                             <a:schemeClr val="tx1"/>
                           </a:solidFill>
@@ -7100,7 +7291,7 @@
                         <a:t>volumentric</a:t>
                       </a:r>
                       <a:r>
-                        <a:rPr lang="en-GB" sz="2400" kern="1200" baseline="0" dirty="0" smtClean="0">
+                        <a:rPr lang="en-GB" sz="2400" i="1" kern="1200" baseline="0" dirty="0" smtClean="0">
                           <a:solidFill>
                             <a:schemeClr val="tx1"/>
                           </a:solidFill>
@@ -7111,7 +7302,7 @@
                         </a:rPr>
                         <a:t> plot with a 2D projection.</a:t>
                       </a:r>
-                      <a:endParaRPr lang="en-GB" sz="2400" kern="1200" dirty="0" smtClean="0">
+                      <a:endParaRPr lang="en-GB" sz="2400" i="1" kern="1200" dirty="0" smtClean="0">
                         <a:solidFill>
                           <a:schemeClr val="tx1"/>
                         </a:solidFill>
@@ -7391,7 +7582,7 @@
                         <a:tabLst/>
                         <a:defRPr/>
                       </a:pPr>
-                      <a:endParaRPr lang="en-GB" sz="2400" kern="1200" dirty="0" smtClean="0">
+                      <a:endParaRPr lang="en-GB" sz="2400" i="0" kern="1200" dirty="0" smtClean="0">
                         <a:solidFill>
                           <a:schemeClr val="tx1"/>
                         </a:solidFill>
@@ -7420,7 +7611,7 @@
                         <a:defRPr/>
                       </a:pPr>
                       <a:r>
-                        <a:rPr lang="en-GB" sz="2400" kern="1200" dirty="0" smtClean="0">
+                        <a:rPr lang="en-GB" sz="2400" i="1" kern="1200" dirty="0" smtClean="0">
                           <a:solidFill>
                             <a:schemeClr val="tx1"/>
                           </a:solidFill>
@@ -7432,7 +7623,7 @@
                         <a:t>Slices from simulation of MERLIN instrument resolution convolved with a Strontrium122 foreground model using </a:t>
                       </a:r>
                       <a:r>
-                        <a:rPr lang="en-GB" sz="2400" kern="1200" dirty="0" err="1" smtClean="0">
+                        <a:rPr lang="en-GB" sz="2400" i="1" kern="1200" dirty="0" err="1" smtClean="0">
                           <a:solidFill>
                             <a:schemeClr val="tx1"/>
                           </a:solidFill>
@@ -7444,7 +7635,7 @@
                         <a:t>Mantid</a:t>
                       </a:r>
                       <a:r>
-                        <a:rPr lang="en-GB" sz="2400" kern="1200" dirty="0" smtClean="0">
+                        <a:rPr lang="en-GB" sz="2400" i="1" kern="1200" dirty="0" smtClean="0">
                           <a:solidFill>
                             <a:schemeClr val="tx1"/>
                           </a:solidFill>
@@ -7453,10 +7644,10 @@
                           <a:ea typeface="+mn-ea"/>
                           <a:cs typeface="Arial"/>
                         </a:rPr>
-                        <a:t>(left) &amp; </a:t>
-                      </a:r>
-                      <a:r>
-                        <a:rPr lang="en-GB" sz="2400" kern="1200" dirty="0" err="1" smtClean="0">
+                        <a:t> (left) &amp; </a:t>
+                      </a:r>
+                      <a:r>
+                        <a:rPr lang="en-GB" sz="2400" i="1" kern="1200" dirty="0" err="1" smtClean="0">
                           <a:solidFill>
                             <a:schemeClr val="tx1"/>
                           </a:solidFill>
@@ -7468,7 +7659,7 @@
                         <a:t>TobyFit</a:t>
                       </a:r>
                       <a:r>
-                        <a:rPr lang="en-GB" sz="2400" kern="1200" dirty="0" smtClean="0">
+                        <a:rPr lang="en-GB" sz="2400" i="1" kern="1200" dirty="0" smtClean="0">
                           <a:solidFill>
                             <a:schemeClr val="tx1"/>
                           </a:solidFill>
@@ -7477,28 +7668,9 @@
                           <a:ea typeface="+mn-ea"/>
                           <a:cs typeface="Arial"/>
                         </a:rPr>
-                        <a:t>(right). The horizontal line shows the expected alignment of the peaks given that the sample itself was misaligned.</a:t>
-                      </a:r>
-                    </a:p>
-                    <a:p>
-                      <a:pPr marL="0" marR="0" lvl="0" indent="0" algn="l" defTabSz="4173538" rtl="0" eaLnBrk="1" fontAlgn="base" latinLnBrk="0" hangingPunct="1">
-                        <a:lnSpc>
-                          <a:spcPct val="100000"/>
-                        </a:lnSpc>
-                        <a:spcBef>
-                          <a:spcPct val="20000"/>
-                        </a:spcBef>
-                        <a:spcAft>
-                          <a:spcPct val="0"/>
-                        </a:spcAft>
-                        <a:buClrTx/>
-                        <a:buSzTx/>
-                        <a:buFontTx/>
-                        <a:buNone/>
-                        <a:tabLst/>
-                        <a:defRPr/>
-                      </a:pPr>
-                      <a:endParaRPr kumimoji="0" lang="en-US" sz="5000" b="0" i="0" u="none" strike="noStrike" kern="0" cap="none" normalizeH="0" baseline="0" dirty="0" smtClean="0">
+                        <a:t> (right). The horizontal line shows the expected alignment of the peaks given that the sample itself was misaligned.</a:t>
+                      </a:r>
+                      <a:endParaRPr kumimoji="0" lang="en-US" sz="2400" b="0" i="1" u="none" strike="noStrike" kern="0" cap="none" normalizeH="0" baseline="0" dirty="0" smtClean="0">
                         <a:ln>
                           <a:noFill/>
                         </a:ln>
@@ -7506,7 +7678,8 @@
                           <a:srgbClr val="002D55"/>
                         </a:solidFill>
                         <a:effectLst/>
-                        <a:latin typeface="Corisande" pitchFamily="2" charset="0"/>
+                        <a:latin typeface="Arial"/>
+                        <a:cs typeface="Arial"/>
                       </a:endParaRPr>
                     </a:p>
                     <a:p>
@@ -7538,10 +7711,27 @@
                           <a:effectLst/>
                           <a:latin typeface="Corisande" pitchFamily="2" charset="0"/>
                         </a:rPr>
-                        <a:t>Future Work</a:t>
-                      </a:r>
-                    </a:p>
-                    <a:p>
+                        <a:t>Future </a:t>
+                      </a:r>
+                    </a:p>
+                    <a:p>
+                      <a:pPr marL="0" marR="0" lvl="0" indent="0" algn="l" defTabSz="4173538" rtl="0" eaLnBrk="1" fontAlgn="base" latinLnBrk="0" hangingPunct="1">
+                        <a:lnSpc>
+                          <a:spcPct val="100000"/>
+                        </a:lnSpc>
+                        <a:spcBef>
+                          <a:spcPct val="20000"/>
+                        </a:spcBef>
+                        <a:spcAft>
+                          <a:spcPct val="0"/>
+                        </a:spcAft>
+                        <a:buClrTx/>
+                        <a:buSzTx/>
+                        <a:buFontTx/>
+                        <a:buNone/>
+                        <a:tabLst/>
+                        <a:defRPr/>
+                      </a:pPr>
                       <a:r>
                         <a:rPr lang="en-GB" sz="2400" kern="1200" dirty="0" smtClean="0">
                           <a:solidFill>
@@ -7552,7 +7742,31 @@
                           <a:ea typeface="+mn-ea"/>
                           <a:cs typeface="Arial"/>
                         </a:rPr>
-                        <a:t>The </a:t>
+                        <a:t>From the outset, we planned to fully roll VATES</a:t>
+                      </a:r>
+                      <a:r>
+                        <a:rPr lang="en-GB" sz="2400" kern="1200" baseline="0" dirty="0" smtClean="0">
+                          <a:solidFill>
+                            <a:schemeClr val="tx1"/>
+                          </a:solidFill>
+                          <a:effectLst/>
+                          <a:latin typeface="Arial"/>
+                          <a:ea typeface="+mn-ea"/>
+                          <a:cs typeface="Arial"/>
+                        </a:rPr>
+                        <a:t> </a:t>
+                      </a:r>
+                      <a:r>
+                        <a:rPr lang="en-GB" sz="2400" kern="1200" dirty="0" smtClean="0">
+                          <a:solidFill>
+                            <a:schemeClr val="tx1"/>
+                          </a:solidFill>
+                          <a:effectLst/>
+                          <a:latin typeface="Arial"/>
+                          <a:ea typeface="+mn-ea"/>
+                          <a:cs typeface="Arial"/>
+                        </a:rPr>
+                        <a:t>into the </a:t>
                       </a:r>
                       <a:r>
                         <a:rPr lang="en-GB" sz="2400" kern="1200" dirty="0" err="1" smtClean="0">
@@ -7564,7 +7778,7 @@
                           <a:ea typeface="+mn-ea"/>
                           <a:cs typeface="Arial"/>
                         </a:rPr>
-                        <a:t>Vates</a:t>
+                        <a:t>Mantid</a:t>
                       </a:r>
                       <a:r>
                         <a:rPr lang="en-GB" sz="2400" kern="1200" dirty="0" smtClean="0">
@@ -7576,7 +7790,31 @@
                           <a:ea typeface="+mn-ea"/>
                           <a:cs typeface="Arial"/>
                         </a:rPr>
-                        <a:t> project started out in 2010 as an independent entity, utilising the core </a:t>
+                        <a:t> project when it was suitably </a:t>
+                      </a:r>
+                      <a:r>
+                        <a:rPr lang="en-GB" sz="2400" kern="1200" dirty="0" smtClean="0">
+                          <a:solidFill>
+                            <a:schemeClr val="tx1"/>
+                          </a:solidFill>
+                          <a:effectLst/>
+                          <a:latin typeface="Arial"/>
+                          <a:ea typeface="+mn-ea"/>
+                          <a:cs typeface="Arial"/>
+                        </a:rPr>
+                        <a:t>mature, </a:t>
+                      </a:r>
+                      <a:r>
+                        <a:rPr lang="en-GB" sz="2400" kern="1200" dirty="0" smtClean="0">
+                          <a:solidFill>
+                            <a:schemeClr val="tx1"/>
+                          </a:solidFill>
+                          <a:effectLst/>
+                          <a:latin typeface="Arial"/>
+                          <a:ea typeface="+mn-ea"/>
+                          <a:cs typeface="Arial"/>
+                        </a:rPr>
+                        <a:t>in order to take advantage of the shared maintenance effort. Since 2012, we have been shipping </a:t>
                       </a:r>
                       <a:r>
                         <a:rPr lang="en-GB" sz="2400" kern="1200" dirty="0" err="1" smtClean="0">
@@ -7600,103 +7838,7 @@
                           <a:ea typeface="+mn-ea"/>
                           <a:cs typeface="Arial"/>
                         </a:rPr>
-                        <a:t>-Framework. From the outset, we planned to fully roll </a:t>
-                      </a:r>
-                      <a:r>
-                        <a:rPr lang="en-GB" sz="2400" kern="1200" dirty="0" err="1" smtClean="0">
-                          <a:solidFill>
-                            <a:schemeClr val="tx1"/>
-                          </a:solidFill>
-                          <a:effectLst/>
-                          <a:latin typeface="Arial"/>
-                          <a:ea typeface="+mn-ea"/>
-                          <a:cs typeface="Arial"/>
-                        </a:rPr>
-                        <a:t>Vates</a:t>
-                      </a:r>
-                      <a:r>
-                        <a:rPr lang="en-GB" sz="2400" kern="1200" dirty="0" smtClean="0">
-                          <a:solidFill>
-                            <a:schemeClr val="tx1"/>
-                          </a:solidFill>
-                          <a:effectLst/>
-                          <a:latin typeface="Arial"/>
-                          <a:ea typeface="+mn-ea"/>
-                          <a:cs typeface="Arial"/>
-                        </a:rPr>
-                        <a:t> into the </a:t>
-                      </a:r>
-                      <a:r>
-                        <a:rPr lang="en-GB" sz="2400" kern="1200" dirty="0" err="1" smtClean="0">
-                          <a:solidFill>
-                            <a:schemeClr val="tx1"/>
-                          </a:solidFill>
-                          <a:effectLst/>
-                          <a:latin typeface="Arial"/>
-                          <a:ea typeface="+mn-ea"/>
-                          <a:cs typeface="Arial"/>
-                        </a:rPr>
-                        <a:t>Mantid</a:t>
-                      </a:r>
-                      <a:r>
-                        <a:rPr lang="en-GB" sz="2400" kern="1200" dirty="0" smtClean="0">
-                          <a:solidFill>
-                            <a:schemeClr val="tx1"/>
-                          </a:solidFill>
-                          <a:effectLst/>
-                          <a:latin typeface="Arial"/>
-                          <a:ea typeface="+mn-ea"/>
-                          <a:cs typeface="Arial"/>
-                        </a:rPr>
-                        <a:t> project when it was suitably mature in order to take advantage of the shared maintenance effort. Since 2012, we have been shipping </a:t>
-                      </a:r>
-                      <a:r>
-                        <a:rPr lang="en-GB" sz="2400" kern="1200" dirty="0" err="1" smtClean="0">
-                          <a:solidFill>
-                            <a:schemeClr val="tx1"/>
-                          </a:solidFill>
-                          <a:effectLst/>
-                          <a:latin typeface="Arial"/>
-                          <a:ea typeface="+mn-ea"/>
-                          <a:cs typeface="Arial"/>
-                        </a:rPr>
-                        <a:t>Mantid</a:t>
-                      </a:r>
-                      <a:r>
-                        <a:rPr lang="en-GB" sz="2400" kern="1200" dirty="0" smtClean="0">
-                          <a:solidFill>
-                            <a:schemeClr val="tx1"/>
-                          </a:solidFill>
-                          <a:effectLst/>
-                          <a:latin typeface="Arial"/>
-                          <a:ea typeface="+mn-ea"/>
-                          <a:cs typeface="Arial"/>
-                        </a:rPr>
-                        <a:t> and </a:t>
-                      </a:r>
-                      <a:r>
-                        <a:rPr lang="en-GB" sz="2400" kern="1200" dirty="0" err="1" smtClean="0">
-                          <a:solidFill>
-                            <a:schemeClr val="tx1"/>
-                          </a:solidFill>
-                          <a:effectLst/>
-                          <a:latin typeface="Arial"/>
-                          <a:ea typeface="+mn-ea"/>
-                          <a:cs typeface="Arial"/>
-                        </a:rPr>
-                        <a:t>Vates</a:t>
-                      </a:r>
-                      <a:r>
-                        <a:rPr lang="en-GB" sz="2400" kern="1200" dirty="0" smtClean="0">
-                          <a:solidFill>
-                            <a:schemeClr val="tx1"/>
-                          </a:solidFill>
-                          <a:effectLst/>
-                          <a:latin typeface="Arial"/>
-                          <a:ea typeface="+mn-ea"/>
-                          <a:cs typeface="Arial"/>
-                        </a:rPr>
-                        <a:t> in a single package. Increasingly, we have seen innovation intended for the VATES project filtering into the mainstream </a:t>
+                        <a:t> and VATES in a single package. Increasingly, we have seen innovation intended for the VATES project filtering into the mainstream </a:t>
                       </a:r>
                       <a:r>
                         <a:rPr lang="en-GB" sz="2400" kern="1200" dirty="0" err="1" smtClean="0">
@@ -7757,7 +7899,31 @@
                           <a:ea typeface="+mn-ea"/>
                           <a:cs typeface="Arial"/>
                         </a:rPr>
-                        <a:t> long term objective are to develop the downstream simulation and fitting features. Equally as important, is aiding our users through the process of building their analysis workflows using the new tools, and extending the tools on both the visualisation and analysis side where needed.</a:t>
+                        <a:t> long term objective are to develop the downstream simulation and fitting features. Equally as important, is aiding our users through the process of building their analysis workflows using the new tools, and extending the tools on both the visualisation and analysis side where needed. In the medium term we will extend the range of our </a:t>
+                      </a:r>
+                      <a:r>
+                        <a:rPr lang="en-GB" sz="2400" kern="1200" baseline="0" dirty="0" err="1" smtClean="0">
+                          <a:solidFill>
+                            <a:schemeClr val="tx1"/>
+                          </a:solidFill>
+                          <a:effectLst/>
+                          <a:latin typeface="Arial"/>
+                          <a:ea typeface="+mn-ea"/>
+                          <a:cs typeface="Arial"/>
+                        </a:rPr>
+                        <a:t>scriptability</a:t>
+                      </a:r>
+                      <a:r>
+                        <a:rPr lang="en-GB" sz="2400" kern="1200" baseline="0" dirty="0" smtClean="0">
+                          <a:solidFill>
+                            <a:schemeClr val="tx1"/>
+                          </a:solidFill>
+                          <a:effectLst/>
+                          <a:latin typeface="Arial"/>
+                          <a:ea typeface="+mn-ea"/>
+                          <a:cs typeface="Arial"/>
+                        </a:rPr>
+                        <a:t>, and implement a HORACE style syntax for high-level control.</a:t>
                       </a:r>
                       <a:endParaRPr lang="en-GB" sz="2400" kern="1200" dirty="0" smtClean="0">
                         <a:solidFill>
@@ -7818,10 +7984,10 @@
                           <a:ea typeface="+mn-ea"/>
                           <a:cs typeface="Arial"/>
                         </a:rPr>
-                        <a:t> and </a:t>
-                      </a:r>
-                      <a:r>
-                        <a:rPr lang="en-GB" sz="2400" kern="1200" dirty="0" err="1" smtClean="0">
+                        <a:t> and VATES are being actively developed.  Frequent meetings with instrument scientists continue to provide a steady stream of additional requirements and challenges. Continuous </a:t>
+                      </a:r>
+                      <a:r>
+                        <a:rPr lang="en-GB" sz="2400" kern="1200" dirty="0" smtClean="0">
                           <a:solidFill>
                             <a:schemeClr val="tx1"/>
                           </a:solidFill>
@@ -7830,7 +7996,7 @@
                           <a:ea typeface="+mn-ea"/>
                           <a:cs typeface="Arial"/>
                         </a:rPr>
-                        <a:t>Vates</a:t>
+                        <a:t> application of specialist </a:t>
                       </a:r>
                       <a:r>
                         <a:rPr lang="en-GB" sz="2400" kern="1200" dirty="0" smtClean="0">
@@ -7842,7 +8008,230 @@
                           <a:ea typeface="+mn-ea"/>
                           <a:cs typeface="Arial"/>
                         </a:rPr>
-                        <a:t> are being actively developed.  Frequent meetings with instrument scientists continue to provide a steady stream of additional requirements and challenges. Continuous specialist knowledge and development effort from ISIS, the SNS and Tessella will be used to meet these challenges.</a:t>
+                        <a:t>knowledge and development effort from ISIS, the SNS and Tessella will be used to meet these challenges.</a:t>
+                      </a:r>
+                    </a:p>
+                    <a:p>
+                      <a:endParaRPr lang="en-GB" sz="2400" kern="1200" dirty="0" smtClean="0">
+                        <a:solidFill>
+                          <a:schemeClr val="tx1"/>
+                        </a:solidFill>
+                        <a:effectLst/>
+                        <a:latin typeface="Arial"/>
+                        <a:ea typeface="+mn-ea"/>
+                        <a:cs typeface="Arial"/>
+                      </a:endParaRPr>
+                    </a:p>
+                    <a:p>
+                      <a:endParaRPr lang="en-GB" sz="2400" kern="1200" dirty="0" smtClean="0">
+                        <a:solidFill>
+                          <a:schemeClr val="tx1"/>
+                        </a:solidFill>
+                        <a:effectLst/>
+                        <a:latin typeface="Arial"/>
+                        <a:ea typeface="+mn-ea"/>
+                        <a:cs typeface="Arial"/>
+                      </a:endParaRPr>
+                    </a:p>
+                    <a:p>
+                      <a:endParaRPr lang="en-GB" sz="2400" kern="1200" dirty="0" smtClean="0">
+                        <a:solidFill>
+                          <a:schemeClr val="tx1"/>
+                        </a:solidFill>
+                        <a:effectLst/>
+                        <a:latin typeface="Arial"/>
+                        <a:ea typeface="+mn-ea"/>
+                        <a:cs typeface="Arial"/>
+                      </a:endParaRPr>
+                    </a:p>
+                    <a:p>
+                      <a:endParaRPr lang="en-GB" sz="2400" kern="1200" dirty="0" smtClean="0">
+                        <a:solidFill>
+                          <a:schemeClr val="tx1"/>
+                        </a:solidFill>
+                        <a:effectLst/>
+                        <a:latin typeface="Arial"/>
+                        <a:ea typeface="+mn-ea"/>
+                        <a:cs typeface="Arial"/>
+                      </a:endParaRPr>
+                    </a:p>
+                    <a:p>
+                      <a:endParaRPr lang="en-GB" sz="2400" kern="1200" dirty="0" smtClean="0">
+                        <a:solidFill>
+                          <a:schemeClr val="tx1"/>
+                        </a:solidFill>
+                        <a:effectLst/>
+                        <a:latin typeface="Arial"/>
+                        <a:ea typeface="+mn-ea"/>
+                        <a:cs typeface="Arial"/>
+                      </a:endParaRPr>
+                    </a:p>
+                    <a:p>
+                      <a:endParaRPr lang="en-GB" sz="2400" kern="1200" dirty="0" smtClean="0">
+                        <a:solidFill>
+                          <a:schemeClr val="tx1"/>
+                        </a:solidFill>
+                        <a:effectLst/>
+                        <a:latin typeface="Arial"/>
+                        <a:ea typeface="+mn-ea"/>
+                        <a:cs typeface="Arial"/>
+                      </a:endParaRPr>
+                    </a:p>
+                    <a:p>
+                      <a:endParaRPr lang="en-GB" sz="2400" kern="1200" dirty="0" smtClean="0">
+                        <a:solidFill>
+                          <a:schemeClr val="tx1"/>
+                        </a:solidFill>
+                        <a:effectLst/>
+                        <a:latin typeface="Arial"/>
+                        <a:ea typeface="+mn-ea"/>
+                        <a:cs typeface="Arial"/>
+                      </a:endParaRPr>
+                    </a:p>
+                    <a:p>
+                      <a:endParaRPr lang="en-GB" sz="2400" kern="1200" dirty="0" smtClean="0">
+                        <a:solidFill>
+                          <a:schemeClr val="tx1"/>
+                        </a:solidFill>
+                        <a:effectLst/>
+                        <a:latin typeface="Arial"/>
+                        <a:ea typeface="+mn-ea"/>
+                        <a:cs typeface="Arial"/>
+                      </a:endParaRPr>
+                    </a:p>
+                    <a:p>
+                      <a:endParaRPr lang="en-GB" sz="2400" kern="1200" dirty="0" smtClean="0">
+                        <a:solidFill>
+                          <a:schemeClr val="tx1"/>
+                        </a:solidFill>
+                        <a:effectLst/>
+                        <a:latin typeface="Arial"/>
+                        <a:ea typeface="+mn-ea"/>
+                        <a:cs typeface="Arial"/>
+                      </a:endParaRPr>
+                    </a:p>
+                    <a:p>
+                      <a:endParaRPr lang="en-GB" sz="2400" kern="1200" dirty="0" smtClean="0">
+                        <a:solidFill>
+                          <a:schemeClr val="tx1"/>
+                        </a:solidFill>
+                        <a:effectLst/>
+                        <a:latin typeface="Arial"/>
+                        <a:ea typeface="+mn-ea"/>
+                        <a:cs typeface="Arial"/>
+                      </a:endParaRPr>
+                    </a:p>
+                    <a:p>
+                      <a:endParaRPr lang="en-GB" sz="2400" kern="1200" dirty="0" smtClean="0">
+                        <a:solidFill>
+                          <a:schemeClr val="tx1"/>
+                        </a:solidFill>
+                        <a:effectLst/>
+                        <a:latin typeface="Arial"/>
+                        <a:ea typeface="+mn-ea"/>
+                        <a:cs typeface="Arial"/>
+                      </a:endParaRPr>
+                    </a:p>
+                    <a:p>
+                      <a:endParaRPr lang="en-GB" sz="2400" kern="1200" dirty="0" smtClean="0">
+                        <a:solidFill>
+                          <a:schemeClr val="tx1"/>
+                        </a:solidFill>
+                        <a:effectLst/>
+                        <a:latin typeface="Arial"/>
+                        <a:ea typeface="+mn-ea"/>
+                        <a:cs typeface="Arial"/>
+                      </a:endParaRPr>
+                    </a:p>
+                    <a:p>
+                      <a:pPr marL="0" marR="0" lvl="0" indent="0" algn="l" defTabSz="4173538" rtl="0" eaLnBrk="1" fontAlgn="base" latinLnBrk="0" hangingPunct="1">
+                        <a:lnSpc>
+                          <a:spcPct val="100000"/>
+                        </a:lnSpc>
+                        <a:spcBef>
+                          <a:spcPct val="20000"/>
+                        </a:spcBef>
+                        <a:spcAft>
+                          <a:spcPct val="0"/>
+                        </a:spcAft>
+                        <a:buClrTx/>
+                        <a:buSzTx/>
+                        <a:buFontTx/>
+                        <a:buNone/>
+                        <a:tabLst/>
+                        <a:defRPr/>
+                      </a:pPr>
+                      <a:endParaRPr kumimoji="0" lang="en-US" sz="2400" b="0" i="1" u="none" strike="noStrike" kern="0" cap="none" normalizeH="0" baseline="0" dirty="0" smtClean="0">
+                        <a:ln>
+                          <a:noFill/>
+                        </a:ln>
+                        <a:solidFill>
+                          <a:srgbClr val="000000"/>
+                        </a:solidFill>
+                        <a:effectLst/>
+                        <a:latin typeface="Arial"/>
+                        <a:cs typeface="Arial"/>
+                      </a:endParaRPr>
+                    </a:p>
+                    <a:p>
+                      <a:pPr marL="0" marR="0" lvl="0" indent="0" algn="l" defTabSz="4173538" rtl="0" eaLnBrk="1" fontAlgn="base" latinLnBrk="0" hangingPunct="1">
+                        <a:lnSpc>
+                          <a:spcPct val="100000"/>
+                        </a:lnSpc>
+                        <a:spcBef>
+                          <a:spcPct val="20000"/>
+                        </a:spcBef>
+                        <a:spcAft>
+                          <a:spcPct val="0"/>
+                        </a:spcAft>
+                        <a:buClrTx/>
+                        <a:buSzTx/>
+                        <a:buFontTx/>
+                        <a:buNone/>
+                        <a:tabLst/>
+                        <a:defRPr/>
+                      </a:pPr>
+                      <a:r>
+                        <a:rPr kumimoji="0" lang="en-US" sz="2400" b="0" i="1" u="none" strike="noStrike" kern="0" cap="none" normalizeH="0" baseline="0" dirty="0" smtClean="0">
+                          <a:ln>
+                            <a:noFill/>
+                          </a:ln>
+                          <a:solidFill>
+                            <a:srgbClr val="000000"/>
+                          </a:solidFill>
+                          <a:effectLst/>
+                          <a:latin typeface="Arial"/>
+                          <a:cs typeface="Arial"/>
+                        </a:rPr>
+                        <a:t>Left shows slices through Spin Waves in </a:t>
+                      </a:r>
+                      <a:r>
+                        <a:rPr kumimoji="0" lang="en-US" sz="2400" b="0" i="1" u="none" strike="noStrike" kern="0" cap="none" normalizeH="0" baseline="0" dirty="0" err="1" smtClean="0">
+                          <a:ln>
+                            <a:noFill/>
+                          </a:ln>
+                          <a:solidFill>
+                            <a:srgbClr val="000000"/>
+                          </a:solidFill>
+                          <a:effectLst/>
+                          <a:latin typeface="Arial"/>
+                          <a:cs typeface="Arial"/>
+                        </a:rPr>
+                        <a:t>Gd</a:t>
+                      </a:r>
+                      <a:r>
+                        <a:rPr kumimoji="0" lang="en-US" sz="2400" b="0" i="1" u="none" strike="noStrike" kern="0" cap="none" normalizeH="0" baseline="0" dirty="0" smtClean="0">
+                          <a:ln>
+                            <a:noFill/>
+                          </a:ln>
+                          <a:solidFill>
+                            <a:srgbClr val="000000"/>
+                          </a:solidFill>
+                          <a:effectLst/>
+                          <a:latin typeface="Arial"/>
+                          <a:cs typeface="Arial"/>
+                        </a:rPr>
+                        <a:t> measured on SEQUOIA. Right shows VSI volumetric plot of a fly head.</a:t>
                       </a:r>
                     </a:p>
                     <a:p>
@@ -7950,6 +8339,35 @@
                       </a:endParaRPr>
                     </a:p>
                     <a:p>
+                      <a:pPr marL="0" marR="0" indent="0" algn="l" defTabSz="914400" rtl="0" eaLnBrk="1" fontAlgn="auto" latinLnBrk="0" hangingPunct="1">
+                        <a:lnSpc>
+                          <a:spcPct val="100000"/>
+                        </a:lnSpc>
+                        <a:spcBef>
+                          <a:spcPts val="0"/>
+                        </a:spcBef>
+                        <a:spcAft>
+                          <a:spcPts val="0"/>
+                        </a:spcAft>
+                        <a:buClrTx/>
+                        <a:buSzTx/>
+                        <a:buFontTx/>
+                        <a:buNone/>
+                        <a:tabLst/>
+                        <a:defRPr/>
+                      </a:pPr>
+                      <a:r>
+                        <a:rPr lang="en-GB" sz="2400" kern="1200" dirty="0" smtClean="0">
+                          <a:solidFill>
+                            <a:schemeClr val="tx1"/>
+                          </a:solidFill>
+                          <a:effectLst/>
+                          <a:latin typeface="Arial"/>
+                          <a:ea typeface="+mn-ea"/>
+                          <a:cs typeface="Arial"/>
+                        </a:rPr>
+                        <a:t>[3] </a:t>
+                      </a:r>
                       <a:r>
                         <a:rPr lang="en-GB" sz="2400" u="sng" kern="1200" dirty="0" smtClean="0">
                           <a:solidFill>
@@ -7960,7 +8378,50 @@
                           <a:ea typeface="+mn-ea"/>
                           <a:cs typeface="Arial"/>
                         </a:rPr>
-                        <a:t>[3] </a:t>
+                        <a:t>[ISAW]</a:t>
+                      </a:r>
+                      <a:r>
+                        <a:rPr lang="en-GB" sz="2400" u="none" kern="1200" dirty="0" smtClean="0">
+                          <a:solidFill>
+                            <a:schemeClr val="tx1"/>
+                          </a:solidFill>
+                          <a:effectLst/>
+                          <a:latin typeface="Arial"/>
+                          <a:ea typeface="+mn-ea"/>
+                          <a:cs typeface="Arial"/>
+                        </a:rPr>
+                        <a:t> </a:t>
+                      </a:r>
+                    </a:p>
+                    <a:p>
+                      <a:pPr marL="0" marR="0" indent="0" algn="l" defTabSz="914400" rtl="0" eaLnBrk="1" fontAlgn="auto" latinLnBrk="0" hangingPunct="1">
+                        <a:lnSpc>
+                          <a:spcPct val="100000"/>
+                        </a:lnSpc>
+                        <a:spcBef>
+                          <a:spcPts val="0"/>
+                        </a:spcBef>
+                        <a:spcAft>
+                          <a:spcPts val="0"/>
+                        </a:spcAft>
+                        <a:buClrTx/>
+                        <a:buSzTx/>
+                        <a:buFontTx/>
+                        <a:buNone/>
+                        <a:tabLst/>
+                        <a:defRPr/>
+                      </a:pPr>
+                      <a:r>
+                        <a:rPr lang="en-GB" sz="2400" u="none" kern="1200" dirty="0" smtClean="0">
+                          <a:solidFill>
+                            <a:schemeClr val="tx1"/>
+                          </a:solidFill>
+                          <a:effectLst/>
+                          <a:latin typeface="Arial"/>
+                          <a:ea typeface="+mn-ea"/>
+                          <a:cs typeface="Arial"/>
+                        </a:rPr>
+                        <a:t>[4] </a:t>
                       </a:r>
                       <a:r>
                         <a:rPr lang="en-US" sz="2400" kern="1200" dirty="0" smtClean="0">
@@ -8073,10 +8534,11 @@
                         </a:rPr>
                         <a:t>http://arxiv.org/abs/1306.1762</a:t>
                       </a:r>
-                      <a:endParaRPr lang="en-US" sz="2400" kern="1200" dirty="0" smtClean="0">
+                      <a:endParaRPr lang="en-GB" sz="2400" u="sng" kern="1200" dirty="0" smtClean="0">
                         <a:solidFill>
                           <a:schemeClr val="tx1"/>
                         </a:solidFill>
+                        <a:effectLst/>
                         <a:latin typeface="Arial"/>
                         <a:ea typeface="+mn-ea"/>
                         <a:cs typeface="Arial"/>
@@ -8084,6 +8546,125 @@
                     </a:p>
                     <a:p>
                       <a:r>
+                        <a:rPr lang="en-GB" sz="2400" u="none" kern="1200" dirty="0" smtClean="0">
+                          <a:solidFill>
+                            <a:schemeClr val="tx1"/>
+                          </a:solidFill>
+                          <a:effectLst/>
+                          <a:latin typeface="Arial"/>
+                          <a:ea typeface="+mn-ea"/>
+                          <a:cs typeface="Arial"/>
+                        </a:rPr>
+                        <a:t>[5]</a:t>
+                      </a:r>
+                      <a:r>
+                        <a:rPr lang="en-GB" sz="2400" u="none" kern="1200" baseline="0" dirty="0" smtClean="0">
+                          <a:solidFill>
+                            <a:schemeClr val="tx1"/>
+                          </a:solidFill>
+                          <a:effectLst/>
+                          <a:latin typeface="Arial"/>
+                          <a:ea typeface="+mn-ea"/>
+                          <a:cs typeface="Arial"/>
+                        </a:rPr>
+                        <a:t> </a:t>
+                      </a:r>
+                      <a:r>
+                        <a:rPr lang="en-GB" sz="2400" u="sng" kern="1200" dirty="0" smtClean="0">
+                          <a:solidFill>
+                            <a:schemeClr val="tx1"/>
+                          </a:solidFill>
+                          <a:effectLst/>
+                          <a:latin typeface="Arial"/>
+                          <a:ea typeface="+mn-ea"/>
+                          <a:cs typeface="Arial"/>
+                          <a:hlinkClick r:id="rId6"/>
+                        </a:rPr>
+                        <a:t>horace.isis.rl.ac.uk</a:t>
+                      </a:r>
+                      <a:endParaRPr lang="en-GB" sz="2400" u="sng" kern="1200" dirty="0" smtClean="0">
+                        <a:solidFill>
+                          <a:schemeClr val="tx1"/>
+                        </a:solidFill>
+                        <a:effectLst/>
+                        <a:latin typeface="Arial"/>
+                        <a:ea typeface="+mn-ea"/>
+                        <a:cs typeface="Arial"/>
+                      </a:endParaRPr>
+                    </a:p>
+                    <a:p>
+                      <a:r>
+                        <a:rPr lang="en-GB" sz="2400" u="sng" kern="1200" dirty="0" smtClean="0">
+                          <a:solidFill>
+                            <a:schemeClr val="tx1"/>
+                          </a:solidFill>
+                          <a:effectLst/>
+                          <a:latin typeface="Arial"/>
+                          <a:ea typeface="+mn-ea"/>
+                          <a:cs typeface="Arial"/>
+                        </a:rPr>
+                        <a:t>[</a:t>
+                      </a:r>
+                      <a:r>
+                        <a:rPr lang="en-GB" sz="2400" u="none" kern="1200" dirty="0" smtClean="0">
+                          <a:solidFill>
+                            <a:schemeClr val="tx1"/>
+                          </a:solidFill>
+                          <a:effectLst/>
+                          <a:latin typeface="Arial"/>
+                          <a:ea typeface="+mn-ea"/>
+                          <a:cs typeface="Arial"/>
+                        </a:rPr>
+                        <a:t>6]</a:t>
+                      </a:r>
+                      <a:r>
+                        <a:rPr lang="en-GB" sz="2400" u="none" kern="1200" baseline="0" dirty="0" smtClean="0">
+                          <a:solidFill>
+                            <a:schemeClr val="tx1"/>
+                          </a:solidFill>
+                          <a:effectLst/>
+                          <a:latin typeface="Arial"/>
+                          <a:ea typeface="+mn-ea"/>
+                          <a:cs typeface="Arial"/>
+                        </a:rPr>
+                        <a:t> </a:t>
+                      </a:r>
+                      <a:r>
+                        <a:rPr lang="en-GB" sz="2400" u="sng" kern="1200" dirty="0" smtClean="0">
+                          <a:solidFill>
+                            <a:schemeClr val="tx1"/>
+                          </a:solidFill>
+                          <a:effectLst/>
+                          <a:latin typeface="Arial"/>
+                          <a:ea typeface="+mn-ea"/>
+                          <a:cs typeface="Arial"/>
+                          <a:hlinkClick r:id="rId7"/>
+                        </a:rPr>
+                        <a:t>www.ncnr.nist.gov/dave</a:t>
+                      </a:r>
+                      <a:r>
+                        <a:rPr lang="en-GB" sz="2400" u="sng" kern="1200" dirty="0" smtClean="0">
+                          <a:solidFill>
+                            <a:schemeClr val="tx1"/>
+                          </a:solidFill>
+                          <a:effectLst/>
+                          <a:latin typeface="Arial"/>
+                          <a:ea typeface="+mn-ea"/>
+                          <a:cs typeface="Arial"/>
+                        </a:rPr>
+                        <a:t> </a:t>
+                      </a:r>
+                      <a:endParaRPr lang="en-US" sz="2400" kern="1200" dirty="0" smtClean="0">
+                        <a:solidFill>
+                          <a:schemeClr val="tx1"/>
+                        </a:solidFill>
+                        <a:latin typeface="Arial"/>
+                        <a:ea typeface="+mn-ea"/>
+                        <a:cs typeface="Arial"/>
+                      </a:endParaRPr>
+                    </a:p>
+                    <a:p>
+                      <a:r>
                         <a:rPr lang="en-US" sz="2400" kern="1200" dirty="0" smtClean="0">
                           <a:solidFill>
                             <a:schemeClr val="tx1"/>
@@ -8092,7 +8673,7 @@
                           <a:ea typeface="+mn-ea"/>
                           <a:cs typeface="Arial"/>
                         </a:rPr>
-                        <a:t>[4]</a:t>
+                        <a:t>[7]</a:t>
                       </a:r>
                       <a:r>
                         <a:rPr lang="en-GB" sz="2400" u="sng" kern="1200" baseline="0" dirty="0" smtClean="0">
@@ -8458,7 +9039,7 @@
                 </a:solidFill>
                 <a:latin typeface="Corisande Light" pitchFamily="2" charset="0"/>
               </a:rPr>
-              <a:t>Owen Arnold</a:t>
+              <a:t>Owen Arnold (Tessella), Michael Reuter (SNS Oakridge)</a:t>
             </a:r>
             <a:endParaRPr lang="en-US" dirty="0">
               <a:solidFill>
@@ -8653,7 +9234,7 @@
           <p:nvPr/>
         </p:nvPicPr>
         <p:blipFill>
-          <a:blip r:embed="rId6" cstate="print"/>
+          <a:blip r:embed="rId8" cstate="print"/>
           <a:srcRect/>
           <a:stretch>
             <a:fillRect/>
@@ -8661,7 +9242,7 @@
         </p:blipFill>
         <p:spPr bwMode="auto">
           <a:xfrm>
-            <a:off x="573734" y="39331873"/>
+            <a:off x="573734" y="39682642"/>
             <a:ext cx="4354168" cy="1949117"/>
           </a:xfrm>
           <a:prstGeom prst="rect">
@@ -8679,7 +9260,7 @@
           <p:nvPr/>
         </p:nvPicPr>
         <p:blipFill>
-          <a:blip r:embed="rId7" cstate="print"/>
+          <a:blip r:embed="rId9" cstate="print"/>
           <a:srcRect/>
           <a:stretch>
             <a:fillRect/>
@@ -8687,7 +9268,7 @@
         </p:blipFill>
         <p:spPr bwMode="auto">
           <a:xfrm>
-            <a:off x="5398270" y="39907937"/>
+            <a:off x="5398270" y="40258706"/>
             <a:ext cx="3615712" cy="1600397"/>
           </a:xfrm>
           <a:prstGeom prst="rect">
@@ -8705,7 +9286,7 @@
           <p:nvPr/>
         </p:nvPicPr>
         <p:blipFill>
-          <a:blip r:embed="rId8" cstate="print"/>
+          <a:blip r:embed="rId10" cstate="print"/>
           <a:srcRect/>
           <a:stretch>
             <a:fillRect/>
@@ -8713,7 +9294,7 @@
         </p:blipFill>
         <p:spPr bwMode="auto">
           <a:xfrm>
-            <a:off x="9430718" y="39619905"/>
+            <a:off x="9430718" y="39970674"/>
             <a:ext cx="3670562" cy="2457543"/>
           </a:xfrm>
           <a:prstGeom prst="rect">
@@ -8725,66 +9306,6 @@
       <p:pic>
         <p:nvPicPr>
           <p:cNvPr id="4" name="Picture 3" descr="Tessella_Logo.gif"/>
-          <p:cNvPicPr>
-            <a:picLocks noChangeAspect="1"/>
-          </p:cNvPicPr>
-          <p:nvPr/>
-        </p:nvPicPr>
-        <p:blipFill>
-          <a:blip r:embed="rId9">
-            <a:extLst>
-              <a:ext uri="{28A0092B-C50C-407E-A947-70E740481C1C}">
-                <a14:useLocalDpi xmlns:a14="http://schemas.microsoft.com/office/drawing/2010/main" val="0"/>
-              </a:ext>
-            </a:extLst>
-          </a:blip>
-          <a:stretch>
-            <a:fillRect/>
-          </a:stretch>
-        </p:blipFill>
-        <p:spPr>
-          <a:xfrm>
-            <a:off x="13679190" y="39619905"/>
-            <a:ext cx="5904756" cy="2363985"/>
-          </a:xfrm>
-          <a:prstGeom prst="rect">
-            <a:avLst/>
-          </a:prstGeom>
-        </p:spPr>
-      </p:pic>
-      <p:pic>
-        <p:nvPicPr>
-          <p:cNvPr id="5" name="Picture 4" descr="InstrumentViewPeakOverlay1.png"/>
-          <p:cNvPicPr>
-            <a:picLocks noChangeAspect="1"/>
-          </p:cNvPicPr>
-          <p:nvPr/>
-        </p:nvPicPr>
-        <p:blipFill>
-          <a:blip r:embed="rId10">
-            <a:extLst>
-              <a:ext uri="{28A0092B-C50C-407E-A947-70E740481C1C}">
-                <a14:useLocalDpi xmlns:a14="http://schemas.microsoft.com/office/drawing/2010/main" val="0"/>
-              </a:ext>
-            </a:extLst>
-          </a:blip>
-          <a:stretch>
-            <a:fillRect/>
-          </a:stretch>
-        </p:blipFill>
-        <p:spPr>
-          <a:xfrm>
-            <a:off x="1149798" y="26082401"/>
-            <a:ext cx="9289032" cy="5412834"/>
-          </a:xfrm>
-          <a:prstGeom prst="rect">
-            <a:avLst/>
-          </a:prstGeom>
-        </p:spPr>
-      </p:pic>
-      <p:pic>
-        <p:nvPicPr>
-          <p:cNvPr id="7" name="Picture 6" descr="Screen Shot 2013-07-01 at 14.00.44.png"/>
           <p:cNvPicPr>
             <a:picLocks noChangeAspect="1"/>
           </p:cNvPicPr>
@@ -8804,8 +9325,8 @@
         </p:blipFill>
         <p:spPr>
           <a:xfrm>
-            <a:off x="1149799" y="32779145"/>
-            <a:ext cx="4589216" cy="3528392"/>
+            <a:off x="13679190" y="39970674"/>
+            <a:ext cx="5904756" cy="2363985"/>
           </a:xfrm>
           <a:prstGeom prst="rect">
             <a:avLst/>
@@ -8814,7 +9335,7 @@
       </p:pic>
       <p:pic>
         <p:nvPicPr>
-          <p:cNvPr id="8" name="Picture 7" descr="NaCl_VSI.png"/>
+          <p:cNvPr id="5" name="Picture 4" descr="InstrumentViewPeakOverlay1.png"/>
           <p:cNvPicPr>
             <a:picLocks noChangeAspect="1"/>
           </p:cNvPicPr>
@@ -8834,8 +9355,8 @@
         </p:blipFill>
         <p:spPr>
           <a:xfrm>
-            <a:off x="5902326" y="32707137"/>
-            <a:ext cx="4551330" cy="3528392"/>
+            <a:off x="1077790" y="29466777"/>
+            <a:ext cx="9289032" cy="5412834"/>
           </a:xfrm>
           <a:prstGeom prst="rect">
             <a:avLst/>
@@ -8844,7 +9365,7 @@
       </p:pic>
       <p:pic>
         <p:nvPicPr>
-          <p:cNvPr id="10" name="Picture 9" descr="590px-SimulationImage.png"/>
+          <p:cNvPr id="7" name="Picture 6" descr="Screen Shot 2013-07-01 at 14.00.44.png"/>
           <p:cNvPicPr>
             <a:picLocks noChangeAspect="1"/>
           </p:cNvPicPr>
@@ -8864,8 +9385,8 @@
         </p:blipFill>
         <p:spPr>
           <a:xfrm>
-            <a:off x="19943887" y="9592570"/>
-            <a:ext cx="4968551" cy="5052764"/>
+            <a:off x="10438830" y="9016505"/>
+            <a:ext cx="4589216" cy="3528392"/>
           </a:xfrm>
           <a:prstGeom prst="rect">
             <a:avLst/>
@@ -8874,7 +9395,7 @@
       </p:pic>
       <p:pic>
         <p:nvPicPr>
-          <p:cNvPr id="11" name="Picture 10" descr="NonOrthogonalProjection.png"/>
+          <p:cNvPr id="8" name="Picture 7" descr="NaCl_VSI.png"/>
           <p:cNvPicPr>
             <a:picLocks noChangeAspect="1"/>
           </p:cNvPicPr>
@@ -8894,8 +9415,8 @@
         </p:blipFill>
         <p:spPr>
           <a:xfrm>
-            <a:off x="10726862" y="20609793"/>
-            <a:ext cx="5544616" cy="6947470"/>
+            <a:off x="15191357" y="8944497"/>
+            <a:ext cx="4551330" cy="3528392"/>
           </a:xfrm>
           <a:prstGeom prst="rect">
             <a:avLst/>
@@ -8904,7 +9425,7 @@
       </p:pic>
       <p:pic>
         <p:nvPicPr>
-          <p:cNvPr id="12" name="Picture 11" descr="3sliceTopaz.png"/>
+          <p:cNvPr id="10" name="Picture 9" descr="590px-SimulationImage.png"/>
           <p:cNvPicPr>
             <a:picLocks noChangeAspect="1"/>
           </p:cNvPicPr>
@@ -8924,7 +9445,67 @@
         </p:blipFill>
         <p:spPr>
           <a:xfrm>
-            <a:off x="10582846" y="9736585"/>
+            <a:off x="19943887" y="10024618"/>
+            <a:ext cx="4036047" cy="4104455"/>
+          </a:xfrm>
+          <a:prstGeom prst="rect">
+            <a:avLst/>
+          </a:prstGeom>
+        </p:spPr>
+      </p:pic>
+      <p:pic>
+        <p:nvPicPr>
+          <p:cNvPr id="11" name="Picture 10" descr="NonOrthogonalProjection.png"/>
+          <p:cNvPicPr>
+            <a:picLocks noChangeAspect="1"/>
+          </p:cNvPicPr>
+          <p:nvPr/>
+        </p:nvPicPr>
+        <p:blipFill>
+          <a:blip r:embed="rId16">
+            <a:extLst>
+              <a:ext uri="{28A0092B-C50C-407E-A947-70E740481C1C}">
+                <a14:useLocalDpi xmlns:a14="http://schemas.microsoft.com/office/drawing/2010/main" val="0"/>
+              </a:ext>
+            </a:extLst>
+          </a:blip>
+          <a:stretch>
+            <a:fillRect/>
+          </a:stretch>
+        </p:blipFill>
+        <p:spPr>
+          <a:xfrm>
+            <a:off x="10582846" y="30978945"/>
+            <a:ext cx="5904656" cy="7398604"/>
+          </a:xfrm>
+          <a:prstGeom prst="rect">
+            <a:avLst/>
+          </a:prstGeom>
+        </p:spPr>
+      </p:pic>
+      <p:pic>
+        <p:nvPicPr>
+          <p:cNvPr id="12" name="Picture 11" descr="3sliceTopaz.png"/>
+          <p:cNvPicPr>
+            <a:picLocks noChangeAspect="1"/>
+          </p:cNvPicPr>
+          <p:nvPr/>
+        </p:nvPicPr>
+        <p:blipFill>
+          <a:blip r:embed="rId17">
+            <a:extLst>
+              <a:ext uri="{28A0092B-C50C-407E-A947-70E740481C1C}">
+                <a14:useLocalDpi xmlns:a14="http://schemas.microsoft.com/office/drawing/2010/main" val="0"/>
+              </a:ext>
+            </a:extLst>
+          </a:blip>
+          <a:stretch>
+            <a:fillRect/>
+          </a:stretch>
+        </p:blipFill>
+        <p:spPr>
+          <a:xfrm>
+            <a:off x="10582846" y="15497225"/>
             <a:ext cx="9145016" cy="4175747"/>
           </a:xfrm>
           <a:prstGeom prst="rect">
@@ -8941,7 +9522,7 @@
           <p:nvPr/>
         </p:nvPicPr>
         <p:blipFill>
-          <a:blip r:embed="rId16">
+          <a:blip r:embed="rId18">
             <a:extLst>
               <a:ext uri="{28A0092B-C50C-407E-A947-70E740481C1C}">
                 <a14:useLocalDpi xmlns:a14="http://schemas.microsoft.com/office/drawing/2010/main" val="0"/>
@@ -8970,8 +9551,8 @@
         </p:nvSpPr>
         <p:spPr>
           <a:xfrm>
-            <a:off x="25272478" y="9592569"/>
-            <a:ext cx="3888432" cy="3857660"/>
+            <a:off x="24120350" y="9520561"/>
+            <a:ext cx="5328592" cy="4967513"/>
           </a:xfrm>
           <a:prstGeom prst="rect">
             <a:avLst/>
@@ -8993,36 +9574,285 @@
             <a:r>
               <a:rPr lang="en-US" kern="0" dirty="0">
                 <a:solidFill>
-                  <a:srgbClr val="002D55"/>
+                  <a:srgbClr val="000000"/>
                 </a:solidFill>
                 <a:latin typeface="Arial"/>
                 <a:cs typeface="Arial"/>
               </a:rPr>
-              <a:t>Our work thus far has been based on TobyFit</a:t>
+              <a:t>Our work thus far has been based on </a:t>
+            </a:r>
+            <a:r>
+              <a:rPr lang="en-US" kern="0" dirty="0" smtClean="0">
+                <a:solidFill>
+                  <a:srgbClr val="000000"/>
+                </a:solidFill>
+                <a:latin typeface="Arial"/>
+                <a:cs typeface="Arial"/>
+              </a:rPr>
+              <a:t>TobyFit</a:t>
             </a:r>
             <a:r>
               <a:rPr lang="en-US" kern="0" baseline="30000" dirty="0">
                 <a:solidFill>
-                  <a:srgbClr val="002D55"/>
+                  <a:srgbClr val="000000"/>
                 </a:solidFill>
                 <a:latin typeface="Arial"/>
                 <a:cs typeface="Arial"/>
               </a:rPr>
-              <a:t>4</a:t>
+              <a:t>7</a:t>
+            </a:r>
+            <a:r>
+              <a:rPr lang="en-US" kern="0" dirty="0" smtClean="0">
+                <a:solidFill>
+                  <a:srgbClr val="000000"/>
+                </a:solidFill>
+                <a:latin typeface="Arial"/>
+                <a:cs typeface="Arial"/>
+              </a:rPr>
+              <a:t>, </a:t>
             </a:r>
             <a:r>
               <a:rPr lang="en-US" kern="0" dirty="0">
                 <a:solidFill>
-                  <a:srgbClr val="002D55"/>
+                  <a:srgbClr val="000000"/>
                 </a:solidFill>
                 <a:latin typeface="Arial"/>
                 <a:cs typeface="Arial"/>
               </a:rPr>
-              <a:t>, which is program for simulation and least squared fitting of single crystal neutron diffraction data. Our framework allows the flexible addition of foreground and background models. </a:t>
+              <a:t>which is program for simulation and least squared fitting of single crystal neutron diffraction </a:t>
             </a:r>
+            <a:r>
+              <a:rPr lang="en-US" kern="0" dirty="0" smtClean="0">
+                <a:solidFill>
+                  <a:srgbClr val="000000"/>
+                </a:solidFill>
+                <a:latin typeface="Arial"/>
+                <a:cs typeface="Arial"/>
+              </a:rPr>
+              <a:t>data. </a:t>
+            </a:r>
+            <a:r>
+              <a:rPr lang="en-US" dirty="0" smtClean="0">
+                <a:latin typeface="Arial"/>
+                <a:cs typeface="Arial"/>
+              </a:rPr>
+              <a:t>The </a:t>
+            </a:r>
+            <a:r>
+              <a:rPr lang="en-US" dirty="0">
+                <a:latin typeface="Arial"/>
+                <a:cs typeface="Arial"/>
+              </a:rPr>
+              <a:t>quantification aspects of the </a:t>
+            </a:r>
+            <a:r>
+              <a:rPr lang="en-US" dirty="0" err="1">
+                <a:latin typeface="Arial"/>
+                <a:cs typeface="Arial"/>
+              </a:rPr>
+              <a:t>Mantid</a:t>
+            </a:r>
+            <a:r>
+              <a:rPr lang="en-US" dirty="0">
+                <a:latin typeface="Arial"/>
+                <a:cs typeface="Arial"/>
+              </a:rPr>
+              <a:t>/VATES framework allow both simulation and fitting of multi-dimensional scattering data. The framework allows resolution, foreground &amp; background models to be completely customized to those required by the type of experiment that the fit is aiming to reproduce.</a:t>
+            </a:r>
+            <a:r>
+              <a:rPr lang="en-US" kern="0" dirty="0" smtClean="0">
+                <a:solidFill>
+                  <a:srgbClr val="000000"/>
+                </a:solidFill>
+                <a:latin typeface="Arial"/>
+                <a:cs typeface="Arial"/>
+              </a:rPr>
+              <a:t> </a:t>
+            </a:r>
+            <a:endParaRPr lang="en-US" kern="0" dirty="0">
+              <a:solidFill>
+                <a:srgbClr val="000000"/>
+              </a:solidFill>
+              <a:latin typeface="Arial"/>
+              <a:cs typeface="Arial"/>
+            </a:endParaRPr>
           </a:p>
         </p:txBody>
       </p:sp>
+      <p:sp>
+        <p:nvSpPr>
+          <p:cNvPr id="19" name="TextBox 18"/>
+          <p:cNvSpPr txBox="1"/>
+          <p:nvPr/>
+        </p:nvSpPr>
+        <p:spPr>
+          <a:xfrm>
+            <a:off x="16487502" y="31050953"/>
+            <a:ext cx="3312368" cy="5410711"/>
+          </a:xfrm>
+          <a:prstGeom prst="rect">
+            <a:avLst/>
+          </a:prstGeom>
+          <a:noFill/>
+        </p:spPr>
+        <p:txBody>
+          <a:bodyPr wrap="square" rtlCol="0">
+            <a:spAutoFit/>
+          </a:bodyPr>
+          <a:lstStyle/>
+          <a:p>
+            <a:pPr defTabSz="4173538" eaLnBrk="1" hangingPunct="1">
+              <a:spcBef>
+                <a:spcPct val="20000"/>
+              </a:spcBef>
+              <a:defRPr/>
+            </a:pPr>
+            <a:r>
+              <a:rPr lang="en-US" kern="0" dirty="0">
+                <a:latin typeface="Arial"/>
+                <a:cs typeface="Arial"/>
+              </a:rPr>
+              <a:t>Combination of n-dimensional across many runs leads to massive data volumes, so both algorithm performance, and data compression issues have been critical. </a:t>
+            </a:r>
+            <a:endParaRPr lang="en-US" kern="0" dirty="0" smtClean="0">
+              <a:latin typeface="Arial"/>
+              <a:cs typeface="Arial"/>
+            </a:endParaRPr>
+          </a:p>
+          <a:p>
+            <a:pPr defTabSz="4173538" eaLnBrk="1" hangingPunct="1">
+              <a:spcBef>
+                <a:spcPct val="20000"/>
+              </a:spcBef>
+              <a:defRPr/>
+            </a:pPr>
+            <a:endParaRPr lang="en-US" kern="0" dirty="0" smtClean="0">
+              <a:latin typeface="Arial"/>
+              <a:cs typeface="Arial"/>
+            </a:endParaRPr>
+          </a:p>
+          <a:p>
+            <a:pPr defTabSz="4173538" eaLnBrk="1" hangingPunct="1">
+              <a:spcBef>
+                <a:spcPct val="20000"/>
+              </a:spcBef>
+              <a:defRPr/>
+            </a:pPr>
+            <a:r>
+              <a:rPr lang="en-US" kern="0" dirty="0" smtClean="0">
+                <a:latin typeface="Arial"/>
+                <a:cs typeface="Arial"/>
+              </a:rPr>
+              <a:t>We have built upon the experience gained from HORACE</a:t>
+            </a:r>
+            <a:r>
+              <a:rPr lang="en-US" kern="0" baseline="30000" dirty="0" smtClean="0">
+                <a:latin typeface="Arial"/>
+                <a:cs typeface="Arial"/>
+              </a:rPr>
+              <a:t>5</a:t>
+            </a:r>
+            <a:r>
+              <a:rPr lang="en-US" kern="0" dirty="0" smtClean="0">
+                <a:latin typeface="Arial"/>
+                <a:cs typeface="Arial"/>
+              </a:rPr>
+              <a:t> and DAVE</a:t>
+            </a:r>
+            <a:r>
+              <a:rPr lang="en-US" kern="0" baseline="30000" dirty="0" smtClean="0">
+                <a:latin typeface="Arial"/>
+                <a:cs typeface="Arial"/>
+              </a:rPr>
+              <a:t>6</a:t>
+            </a:r>
+            <a:r>
+              <a:rPr lang="en-US" kern="0" dirty="0" smtClean="0">
+                <a:latin typeface="Arial"/>
+                <a:cs typeface="Arial"/>
+              </a:rPr>
+              <a:t> in this area of VATES.</a:t>
+            </a:r>
+            <a:endParaRPr lang="en-US" kern="0" dirty="0">
+              <a:latin typeface="Arial"/>
+              <a:cs typeface="Arial"/>
+            </a:endParaRPr>
+          </a:p>
+        </p:txBody>
+      </p:sp>
+      <p:grpSp>
+        <p:nvGrpSpPr>
+          <p:cNvPr id="6" name="Group 5"/>
+          <p:cNvGrpSpPr/>
+          <p:nvPr/>
+        </p:nvGrpSpPr>
+        <p:grpSpPr>
+          <a:xfrm>
+            <a:off x="20015894" y="30330873"/>
+            <a:ext cx="9028932" cy="4681609"/>
+            <a:chOff x="20142199" y="30833840"/>
+            <a:chExt cx="9028932" cy="4681609"/>
+          </a:xfrm>
+        </p:grpSpPr>
+        <p:pic>
+          <p:nvPicPr>
+            <p:cNvPr id="2" name="Picture 1" descr="672px-ReleasePic.png"/>
+            <p:cNvPicPr>
+              <a:picLocks noChangeAspect="1"/>
+            </p:cNvPicPr>
+            <p:nvPr/>
+          </p:nvPicPr>
+          <p:blipFill rotWithShape="1">
+            <a:blip r:embed="rId19">
+              <a:extLst>
+                <a:ext uri="{28A0092B-C50C-407E-A947-70E740481C1C}">
+                  <a14:useLocalDpi xmlns:a14="http://schemas.microsoft.com/office/drawing/2010/main" val="0"/>
+                </a:ext>
+              </a:extLst>
+            </a:blip>
+            <a:srcRect l="2353" r="3924"/>
+            <a:stretch/>
+          </p:blipFill>
+          <p:spPr>
+            <a:xfrm>
+              <a:off x="20142199" y="30833840"/>
+              <a:ext cx="4914255" cy="4681609"/>
+            </a:xfrm>
+            <a:prstGeom prst="rect">
+              <a:avLst/>
+            </a:prstGeom>
+          </p:spPr>
+        </p:pic>
+        <p:pic>
+          <p:nvPicPr>
+            <p:cNvPr id="3" name="Picture 2" descr="flyhead.png"/>
+            <p:cNvPicPr>
+              <a:picLocks noChangeAspect="1"/>
+            </p:cNvPicPr>
+            <p:nvPr/>
+          </p:nvPicPr>
+          <p:blipFill rotWithShape="1">
+            <a:blip r:embed="rId20">
+              <a:extLst>
+                <a:ext uri="{28A0092B-C50C-407E-A947-70E740481C1C}">
+                  <a14:useLocalDpi xmlns:a14="http://schemas.microsoft.com/office/drawing/2010/main" val="0"/>
+                </a:ext>
+              </a:extLst>
+            </a:blip>
+            <a:srcRect l="38625" t="25779" r="22558" b="7625"/>
+            <a:stretch/>
+          </p:blipFill>
+          <p:spPr>
+            <a:xfrm>
+              <a:off x="25189926" y="30834929"/>
+              <a:ext cx="3981205" cy="4664077"/>
+            </a:xfrm>
+            <a:prstGeom prst="rect">
+              <a:avLst/>
+            </a:prstGeom>
+          </p:spPr>
+        </p:pic>
+      </p:grpSp>
     </p:spTree>
   </p:cSld>
   <p:clrMapOvr>

</xml_diff>